<commit_message>
added model accuracy test
</commit_message>
<xml_diff>
--- a/NBA-Draft-Scouting.pptx
+++ b/NBA-Draft-Scouting.pptx
@@ -205,7 +205,8 @@
           <a:p>
             <a:fld id="{8017A0A4-B233-440E-B5C4-66498F24515F}" type="datetimeFigureOut">
               <a:rPr lang="en-US" smtClean="0"/>
-              <a:t>9/12/2016</a:t>
+              <a:pPr/>
+              <a:t>9/13/2016</a:t>
             </a:fld>
             <a:endParaRPr lang="en-US" dirty="0"/>
           </a:p>
@@ -366,6 +367,7 @@
           <a:p>
             <a:fld id="{1D31E19A-19C0-4500-93C6-52F34EF7549A}" type="slidenum">
               <a:rPr lang="en-US" smtClean="0"/>
+              <a:pPr/>
               <a:t>‹#›</a:t>
             </a:fld>
             <a:endParaRPr lang="en-US" dirty="0"/>
@@ -696,7 +698,8 @@
           <a:p>
             <a:fld id="{272070E0-19FA-42E7-A14D-7AAA8E3D8015}" type="datetime1">
               <a:rPr lang="en-US" smtClean="0"/>
-              <a:t>9/12/2016</a:t>
+              <a:pPr/>
+              <a:t>9/13/2016</a:t>
             </a:fld>
             <a:endParaRPr lang="en-US" dirty="0"/>
           </a:p>
@@ -904,7 +907,8 @@
           <a:p>
             <a:fld id="{24982A6A-BB1C-4E36-8BBF-A4E9185A4C94}" type="datetime1">
               <a:rPr lang="en-US" smtClean="0"/>
-              <a:t>9/12/2016</a:t>
+              <a:pPr/>
+              <a:t>9/13/2016</a:t>
             </a:fld>
             <a:endParaRPr lang="en-US" dirty="0"/>
           </a:p>
@@ -1160,7 +1164,8 @@
           <a:p>
             <a:fld id="{0FF0B491-FA27-4F2C-91DF-5131D7232A7E}" type="datetime1">
               <a:rPr lang="en-US" smtClean="0"/>
-              <a:t>9/12/2016</a:t>
+              <a:pPr/>
+              <a:t>9/13/2016</a:t>
             </a:fld>
             <a:endParaRPr lang="en-US" dirty="0"/>
           </a:p>
@@ -1334,7 +1339,8 @@
           <a:p>
             <a:fld id="{38760DFB-E819-4906-B6F3-1E512F7EF445}" type="datetime1">
               <a:rPr lang="en-US" smtClean="0"/>
-              <a:t>9/12/2016</a:t>
+              <a:pPr/>
+              <a:t>9/13/2016</a:t>
             </a:fld>
             <a:endParaRPr lang="en-US" dirty="0"/>
           </a:p>
@@ -1677,7 +1683,8 @@
           <a:p>
             <a:fld id="{68EBB65B-B722-4308-A938-A080543A84D0}" type="datetime1">
               <a:rPr lang="en-US" smtClean="0"/>
-              <a:t>9/12/2016</a:t>
+              <a:pPr/>
+              <a:t>9/13/2016</a:t>
             </a:fld>
             <a:endParaRPr lang="en-US" dirty="0"/>
           </a:p>
@@ -1952,7 +1959,8 @@
           <a:p>
             <a:fld id="{99B6280E-2F5A-4E91-B5C3-6DF230DF610F}" type="datetime1">
               <a:rPr lang="en-US" smtClean="0"/>
-              <a:t>9/12/2016</a:t>
+              <a:pPr/>
+              <a:t>9/13/2016</a:t>
             </a:fld>
             <a:endParaRPr lang="en-US" dirty="0"/>
           </a:p>
@@ -2331,7 +2339,8 @@
           <a:p>
             <a:fld id="{02F3BAD2-7BC1-4DB3-AC05-D2EB96E74654}" type="datetime1">
               <a:rPr lang="en-US" smtClean="0"/>
-              <a:t>9/12/2016</a:t>
+              <a:pPr/>
+              <a:t>9/13/2016</a:t>
             </a:fld>
             <a:endParaRPr lang="en-US" dirty="0"/>
           </a:p>
@@ -2449,7 +2458,8 @@
           <a:p>
             <a:fld id="{ADE28265-8FD0-48A8-A3E0-BE5C71EA2A0B}" type="datetime1">
               <a:rPr lang="en-US" smtClean="0"/>
-              <a:t>9/12/2016</a:t>
+              <a:pPr/>
+              <a:t>9/13/2016</a:t>
             </a:fld>
             <a:endParaRPr lang="en-US" dirty="0"/>
           </a:p>
@@ -2620,7 +2630,8 @@
           <a:p>
             <a:fld id="{F1426E64-C49E-483A-A1E7-FB677D74B245}" type="datetime1">
               <a:rPr lang="en-US" smtClean="0"/>
-              <a:t>9/12/2016</a:t>
+              <a:pPr/>
+              <a:t>9/13/2016</a:t>
             </a:fld>
             <a:endParaRPr lang="en-US" dirty="0"/>
           </a:p>
@@ -2974,7 +2985,8 @@
           <a:p>
             <a:fld id="{DCAE782F-3659-4CAD-B6B6-F05EA40A666E}" type="datetime1">
               <a:rPr lang="en-US" smtClean="0"/>
-              <a:t>9/12/2016</a:t>
+              <a:pPr/>
+              <a:t>9/13/2016</a:t>
             </a:fld>
             <a:endParaRPr lang="en-US" dirty="0"/>
           </a:p>
@@ -3353,7 +3365,8 @@
           <a:p>
             <a:fld id="{436EFD29-8B74-4188-908A-6D2C9BFB72BD}" type="datetime1">
               <a:rPr lang="en-US" smtClean="0"/>
-              <a:t>9/12/2016</a:t>
+              <a:pPr/>
+              <a:t>9/13/2016</a:t>
             </a:fld>
             <a:endParaRPr lang="en-US" dirty="0"/>
           </a:p>
@@ -3640,7 +3653,8 @@
           <a:p>
             <a:fld id="{9D0BA1F6-C614-43DB-89DA-83B3C90B5AD9}" type="datetime1">
               <a:rPr lang="en-US" smtClean="0"/>
-              <a:t>9/12/2016</a:t>
+              <a:pPr/>
+              <a:t>9/13/2016</a:t>
             </a:fld>
             <a:endParaRPr lang="en-US" dirty="0"/>
           </a:p>
@@ -4210,46 +4224,7 @@
                 </a:effectLst>
                 <a:latin typeface="Lucida Console" pitchFamily="49" charset="0"/>
               </a:rPr>
-              <a:t>NBA </a:t>
-            </a:r>
-            <a:r>
-              <a:rPr lang="en-US" sz="4800" dirty="0" smtClean="0">
-                <a:effectLst>
-                  <a:outerShdw blurRad="50800" dist="50800" dir="5400000" algn="ctr" rotWithShape="0">
-                    <a:schemeClr val="bg1">
-                      <a:lumMod val="75000"/>
-                    </a:schemeClr>
-                  </a:outerShdw>
-                </a:effectLst>
-                <a:latin typeface="Lucida Console" pitchFamily="49" charset="0"/>
-              </a:rPr>
-              <a:t>SCOUTING </a:t>
-            </a:r>
-            <a:r>
-              <a:rPr lang="en-US" sz="4800" dirty="0" smtClean="0">
-                <a:effectLst>
-                  <a:outerShdw blurRad="50800" dist="50800" dir="5400000" algn="ctr" rotWithShape="0">
-                    <a:schemeClr val="bg1">
-                      <a:lumMod val="75000"/>
-                    </a:schemeClr>
-                  </a:outerShdw>
-                </a:effectLst>
-                <a:latin typeface="Lucida Console" pitchFamily="49" charset="0"/>
-              </a:rPr>
-              <a:t>DRAFT STRATEGY FOR </a:t>
-            </a:r>
-            <a:r>
-              <a:rPr lang="en-US" sz="4800" dirty="0" smtClean="0">
-                <a:effectLst>
-                  <a:outerShdw blurRad="50800" dist="50800" dir="5400000" algn="ctr" rotWithShape="0">
-                    <a:schemeClr val="bg1">
-                      <a:lumMod val="75000"/>
-                    </a:schemeClr>
-                  </a:outerShdw>
-                </a:effectLst>
-                <a:latin typeface="Lucida Console" pitchFamily="49" charset="0"/>
-              </a:rPr>
-              <a:t>2016-17 SEASON</a:t>
+              <a:t>NBA SCOUTING DRAFT STRATEGY FOR 2016-17 SEASON</a:t>
             </a:r>
             <a:endParaRPr lang="en-US" sz="4800" dirty="0">
               <a:effectLst>
@@ -4290,13 +4265,7 @@
               <a:rPr lang="en-US" sz="2400" dirty="0" smtClean="0">
                 <a:latin typeface="Lucida Console" pitchFamily="49" charset="0"/>
               </a:rPr>
-              <a:t>An analytics based approach </a:t>
-            </a:r>
-            <a:r>
-              <a:rPr lang="en-US" sz="2400" dirty="0" smtClean="0">
-                <a:latin typeface="Lucida Console" pitchFamily="49" charset="0"/>
-              </a:rPr>
-              <a:t>for NBA draft scouting for the 2016-17 season </a:t>
+              <a:t>An analytics based approach for NBA draft scouting for the 2016-17 season </a:t>
             </a:r>
             <a:endParaRPr lang="en-US" sz="2400" dirty="0">
               <a:latin typeface="Lucida Console" pitchFamily="49" charset="0"/>
@@ -4375,7 +4344,7 @@
     </p:spTree>
     <p:extLst>
       <p:ext uri="{BB962C8B-B14F-4D97-AF65-F5344CB8AC3E}">
-        <p14:creationId xmlns="" xmlns:p14="http://schemas.microsoft.com/office/powerpoint/2010/main" val="2929381990"/>
+        <p14:creationId xmlns:p14="http://schemas.microsoft.com/office/powerpoint/2010/main" xmlns="" val="2929381990"/>
       </p:ext>
     </p:extLst>
   </p:cSld>
@@ -4517,7 +4486,7 @@
                 </a:solidFill>
                 <a:latin typeface="Lucida Console" pitchFamily="49" charset="0"/>
               </a:rPr>
-              <a:t>The Problem Statement</a:t>
+              <a:t>Model Accuracy Test Results</a:t>
             </a:r>
             <a:endParaRPr lang="en-US" sz="3600" dirty="0">
               <a:solidFill>
@@ -4596,6 +4565,628 @@
               <a:latin typeface="Lucida Console" pitchFamily="49" charset="0"/>
               <a:ea typeface="+mn-ea"/>
               <a:cs typeface="+mn-cs"/>
+            </a:endParaRPr>
+          </a:p>
+        </p:txBody>
+      </p:sp>
+      <p:sp>
+        <p:nvSpPr>
+          <p:cNvPr id="6" name="TextBox 5"/>
+          <p:cNvSpPr txBox="1"/>
+          <p:nvPr/>
+        </p:nvSpPr>
+        <p:spPr>
+          <a:xfrm>
+            <a:off x="195940" y="927463"/>
+            <a:ext cx="4728757" cy="800219"/>
+          </a:xfrm>
+          <a:prstGeom prst="rect">
+            <a:avLst/>
+          </a:prstGeom>
+          <a:noFill/>
+        </p:spPr>
+        <p:txBody>
+          <a:bodyPr wrap="square" rtlCol="0">
+            <a:spAutoFit/>
+          </a:bodyPr>
+          <a:lstStyle/>
+          <a:p>
+            <a:r>
+              <a:rPr lang="en-US" dirty="0" smtClean="0">
+                <a:latin typeface="Lucida Console" pitchFamily="49" charset="0"/>
+              </a:rPr>
+              <a:t>Actual NBA Draft top picks for 2015 season</a:t>
+            </a:r>
+          </a:p>
+          <a:p>
+            <a:r>
+              <a:rPr lang="en-US" sz="1000" dirty="0" smtClean="0">
+                <a:latin typeface="Lucida Console" pitchFamily="49" charset="0"/>
+              </a:rPr>
+              <a:t>Courtesy: http://www.nba.com/draft/2015/</a:t>
+            </a:r>
+            <a:endParaRPr lang="en-US" sz="1000" dirty="0">
+              <a:latin typeface="Lucida Console" pitchFamily="49" charset="0"/>
+            </a:endParaRPr>
+          </a:p>
+        </p:txBody>
+      </p:sp>
+      <p:graphicFrame>
+        <p:nvGraphicFramePr>
+          <p:cNvPr id="8" name="Table 7"/>
+          <p:cNvGraphicFramePr>
+            <a:graphicFrameLocks noGrp="1"/>
+          </p:cNvGraphicFramePr>
+          <p:nvPr/>
+        </p:nvGraphicFramePr>
+        <p:xfrm>
+          <a:off x="307702" y="1712442"/>
+          <a:ext cx="4133669" cy="4450080"/>
+        </p:xfrm>
+        <a:graphic>
+          <a:graphicData uri="http://schemas.openxmlformats.org/drawingml/2006/table">
+            <a:tbl>
+              <a:tblPr firstRow="1" bandRow="1">
+                <a:tableStyleId>{5C22544A-7EE6-4342-B048-85BDC9FD1C3A}</a:tableStyleId>
+              </a:tblPr>
+              <a:tblGrid>
+                <a:gridCol w="1325154"/>
+                <a:gridCol w="2808515"/>
+              </a:tblGrid>
+              <a:tr h="370840">
+                <a:tc>
+                  <a:txBody>
+                    <a:bodyPr/>
+                    <a:lstStyle/>
+                    <a:p>
+                      <a:r>
+                        <a:rPr lang="en-US" sz="1200" dirty="0" smtClean="0">
+                          <a:solidFill>
+                            <a:schemeClr val="tx1"/>
+                          </a:solidFill>
+                          <a:latin typeface="Lucida Console" pitchFamily="49" charset="0"/>
+                        </a:rPr>
+                        <a:t>Position</a:t>
+                      </a:r>
+                      <a:endParaRPr lang="en-US" sz="1200" dirty="0">
+                        <a:solidFill>
+                          <a:schemeClr val="tx1"/>
+                        </a:solidFill>
+                        <a:latin typeface="Lucida Console" pitchFamily="49" charset="0"/>
+                      </a:endParaRPr>
+                    </a:p>
+                  </a:txBody>
+                  <a:tcPr/>
+                </a:tc>
+                <a:tc>
+                  <a:txBody>
+                    <a:bodyPr/>
+                    <a:lstStyle/>
+                    <a:p>
+                      <a:r>
+                        <a:rPr lang="en-US" sz="1200" dirty="0" smtClean="0">
+                          <a:solidFill>
+                            <a:schemeClr val="tx1"/>
+                          </a:solidFill>
+                          <a:latin typeface="Lucida Console" pitchFamily="49" charset="0"/>
+                        </a:rPr>
+                        <a:t>Player Name</a:t>
+                      </a:r>
+                      <a:endParaRPr lang="en-US" sz="1200" dirty="0">
+                        <a:solidFill>
+                          <a:schemeClr val="tx1"/>
+                        </a:solidFill>
+                        <a:latin typeface="Lucida Console" pitchFamily="49" charset="0"/>
+                      </a:endParaRPr>
+                    </a:p>
+                  </a:txBody>
+                  <a:tcPr/>
+                </a:tc>
+              </a:tr>
+              <a:tr h="370840">
+                <a:tc>
+                  <a:txBody>
+                    <a:bodyPr/>
+                    <a:lstStyle/>
+                    <a:p>
+                      <a:r>
+                        <a:rPr lang="en-US" sz="1200" dirty="0" smtClean="0">
+                          <a:latin typeface="Lucida Console" pitchFamily="49" charset="0"/>
+                        </a:rPr>
+                        <a:t>C</a:t>
+                      </a:r>
+                      <a:endParaRPr lang="en-US" sz="1200" dirty="0">
+                        <a:latin typeface="Lucida Console" pitchFamily="49" charset="0"/>
+                      </a:endParaRPr>
+                    </a:p>
+                  </a:txBody>
+                  <a:tcPr/>
+                </a:tc>
+                <a:tc>
+                  <a:txBody>
+                    <a:bodyPr/>
+                    <a:lstStyle/>
+                    <a:p>
+                      <a:r>
+                        <a:rPr lang="en-US" sz="1200" dirty="0" smtClean="0">
+                          <a:latin typeface="Lucida Console" pitchFamily="49" charset="0"/>
+                        </a:rPr>
+                        <a:t>Karl-Anthony Towns</a:t>
+                      </a:r>
+                      <a:endParaRPr lang="en-US" sz="1200" dirty="0">
+                        <a:latin typeface="Lucida Console" pitchFamily="49" charset="0"/>
+                      </a:endParaRPr>
+                    </a:p>
+                  </a:txBody>
+                  <a:tcPr/>
+                </a:tc>
+              </a:tr>
+              <a:tr h="370840">
+                <a:tc>
+                  <a:txBody>
+                    <a:bodyPr/>
+                    <a:lstStyle/>
+                    <a:p>
+                      <a:r>
+                        <a:rPr lang="en-US" sz="1200" dirty="0" smtClean="0">
+                          <a:latin typeface="Lucida Console" pitchFamily="49" charset="0"/>
+                        </a:rPr>
+                        <a:t>C</a:t>
+                      </a:r>
+                      <a:endParaRPr lang="en-US" sz="1200" dirty="0">
+                        <a:latin typeface="Lucida Console" pitchFamily="49" charset="0"/>
+                      </a:endParaRPr>
+                    </a:p>
+                  </a:txBody>
+                  <a:tcPr/>
+                </a:tc>
+                <a:tc>
+                  <a:txBody>
+                    <a:bodyPr/>
+                    <a:lstStyle/>
+                    <a:p>
+                      <a:r>
+                        <a:rPr lang="en-US" sz="1200" dirty="0" smtClean="0">
+                          <a:latin typeface="Lucida Console" pitchFamily="49" charset="0"/>
+                        </a:rPr>
+                        <a:t>Jahlil Okafor</a:t>
+                      </a:r>
+                      <a:endParaRPr lang="en-US" sz="1200" dirty="0">
+                        <a:latin typeface="Lucida Console" pitchFamily="49" charset="0"/>
+                      </a:endParaRPr>
+                    </a:p>
+                  </a:txBody>
+                  <a:tcPr/>
+                </a:tc>
+              </a:tr>
+              <a:tr h="370840">
+                <a:tc>
+                  <a:txBody>
+                    <a:bodyPr/>
+                    <a:lstStyle/>
+                    <a:p>
+                      <a:r>
+                        <a:rPr lang="en-US" sz="1200" dirty="0" smtClean="0">
+                          <a:latin typeface="Lucida Console" pitchFamily="49" charset="0"/>
+                        </a:rPr>
+                        <a:t>C</a:t>
+                      </a:r>
+                      <a:endParaRPr lang="en-US" sz="1200" dirty="0">
+                        <a:latin typeface="Lucida Console" pitchFamily="49" charset="0"/>
+                      </a:endParaRPr>
+                    </a:p>
+                  </a:txBody>
+                  <a:tcPr/>
+                </a:tc>
+                <a:tc>
+                  <a:txBody>
+                    <a:bodyPr/>
+                    <a:lstStyle/>
+                    <a:p>
+                      <a:r>
+                        <a:rPr lang="lv-LV" sz="1200" dirty="0" smtClean="0">
+                          <a:latin typeface="Lucida Console" pitchFamily="49" charset="0"/>
+                        </a:rPr>
+                        <a:t>Kristaps Porziņģis</a:t>
+                      </a:r>
+                      <a:endParaRPr lang="en-US" sz="1200" dirty="0">
+                        <a:latin typeface="Lucida Console" pitchFamily="49" charset="0"/>
+                      </a:endParaRPr>
+                    </a:p>
+                  </a:txBody>
+                  <a:tcPr/>
+                </a:tc>
+              </a:tr>
+              <a:tr h="370840">
+                <a:tc>
+                  <a:txBody>
+                    <a:bodyPr/>
+                    <a:lstStyle/>
+                    <a:p>
+                      <a:r>
+                        <a:rPr lang="en-US" sz="1200" dirty="0" smtClean="0">
+                          <a:latin typeface="Lucida Console" pitchFamily="49" charset="0"/>
+                        </a:rPr>
+                        <a:t>C</a:t>
+                      </a:r>
+                      <a:endParaRPr lang="en-US" sz="1200" dirty="0">
+                        <a:latin typeface="Lucida Console" pitchFamily="49" charset="0"/>
+                      </a:endParaRPr>
+                    </a:p>
+                  </a:txBody>
+                  <a:tcPr/>
+                </a:tc>
+                <a:tc>
+                  <a:txBody>
+                    <a:bodyPr/>
+                    <a:lstStyle/>
+                    <a:p>
+                      <a:r>
+                        <a:rPr lang="en-US" sz="1200" dirty="0" smtClean="0">
+                          <a:latin typeface="Lucida Console" pitchFamily="49" charset="0"/>
+                        </a:rPr>
+                        <a:t>Willie Cauley-Stein</a:t>
+                      </a:r>
+                      <a:endParaRPr lang="en-US" sz="1200" dirty="0">
+                        <a:latin typeface="Lucida Console" pitchFamily="49" charset="0"/>
+                      </a:endParaRPr>
+                    </a:p>
+                  </a:txBody>
+                  <a:tcPr/>
+                </a:tc>
+              </a:tr>
+              <a:tr h="370840">
+                <a:tc>
+                  <a:txBody>
+                    <a:bodyPr/>
+                    <a:lstStyle/>
+                    <a:p>
+                      <a:pPr marL="0" algn="l" defTabSz="914400" rtl="0" eaLnBrk="1" latinLnBrk="0" hangingPunct="1"/>
+                      <a:r>
+                        <a:rPr lang="en-US" sz="1200" kern="1200" dirty="0" smtClean="0">
+                          <a:solidFill>
+                            <a:schemeClr val="dk1"/>
+                          </a:solidFill>
+                          <a:latin typeface="Lucida Console" pitchFamily="49" charset="0"/>
+                          <a:ea typeface="+mn-ea"/>
+                          <a:cs typeface="+mn-cs"/>
+                        </a:rPr>
+                        <a:t>C</a:t>
+                      </a:r>
+                    </a:p>
+                  </a:txBody>
+                  <a:tcPr/>
+                </a:tc>
+                <a:tc>
+                  <a:txBody>
+                    <a:bodyPr/>
+                    <a:lstStyle/>
+                    <a:p>
+                      <a:pPr marL="0" algn="l" defTabSz="914400" rtl="0" eaLnBrk="1" latinLnBrk="0" hangingPunct="1"/>
+                      <a:r>
+                        <a:rPr lang="en-US" sz="1200" kern="1200" dirty="0" smtClean="0">
+                          <a:solidFill>
+                            <a:schemeClr val="dk1"/>
+                          </a:solidFill>
+                          <a:latin typeface="Lucida Console" pitchFamily="49" charset="0"/>
+                          <a:ea typeface="+mn-ea"/>
+                          <a:cs typeface="+mn-cs"/>
+                        </a:rPr>
+                        <a:t>Myles Turner</a:t>
+                      </a:r>
+                    </a:p>
+                  </a:txBody>
+                  <a:tcPr/>
+                </a:tc>
+              </a:tr>
+              <a:tr h="370840">
+                <a:tc>
+                  <a:txBody>
+                    <a:bodyPr/>
+                    <a:lstStyle/>
+                    <a:p>
+                      <a:pPr marL="0" algn="l" defTabSz="914400" rtl="0" eaLnBrk="1" latinLnBrk="0" hangingPunct="1"/>
+                      <a:endParaRPr lang="en-US" sz="1200" kern="1200" dirty="0" smtClean="0">
+                        <a:solidFill>
+                          <a:schemeClr val="dk1"/>
+                        </a:solidFill>
+                        <a:latin typeface="Lucida Console" pitchFamily="49" charset="0"/>
+                        <a:ea typeface="+mn-ea"/>
+                        <a:cs typeface="+mn-cs"/>
+                      </a:endParaRPr>
+                    </a:p>
+                  </a:txBody>
+                  <a:tcPr>
+                    <a:solidFill>
+                      <a:srgbClr val="92D050"/>
+                    </a:solidFill>
+                  </a:tcPr>
+                </a:tc>
+                <a:tc>
+                  <a:txBody>
+                    <a:bodyPr/>
+                    <a:lstStyle/>
+                    <a:p>
+                      <a:pPr marL="0" algn="l" defTabSz="914400" rtl="0" eaLnBrk="1" latinLnBrk="0" hangingPunct="1"/>
+                      <a:endParaRPr lang="en-US" sz="1200" kern="1200" dirty="0" smtClean="0">
+                        <a:solidFill>
+                          <a:schemeClr val="dk1"/>
+                        </a:solidFill>
+                        <a:latin typeface="Lucida Console" pitchFamily="49" charset="0"/>
+                        <a:ea typeface="+mn-ea"/>
+                        <a:cs typeface="+mn-cs"/>
+                      </a:endParaRPr>
+                    </a:p>
+                  </a:txBody>
+                  <a:tcPr>
+                    <a:solidFill>
+                      <a:srgbClr val="92D050"/>
+                    </a:solidFill>
+                  </a:tcPr>
+                </a:tc>
+              </a:tr>
+              <a:tr h="370840">
+                <a:tc>
+                  <a:txBody>
+                    <a:bodyPr/>
+                    <a:lstStyle/>
+                    <a:p>
+                      <a:pPr marL="0" algn="l" defTabSz="914400" rtl="0" eaLnBrk="1" latinLnBrk="0" hangingPunct="1"/>
+                      <a:r>
+                        <a:rPr lang="en-US" sz="1200" kern="1200" dirty="0" smtClean="0">
+                          <a:solidFill>
+                            <a:schemeClr val="dk1"/>
+                          </a:solidFill>
+                          <a:latin typeface="Lucida Console" pitchFamily="49" charset="0"/>
+                          <a:ea typeface="+mn-ea"/>
+                          <a:cs typeface="+mn-cs"/>
+                        </a:rPr>
+                        <a:t>PG</a:t>
+                      </a:r>
+                    </a:p>
+                  </a:txBody>
+                  <a:tcPr/>
+                </a:tc>
+                <a:tc>
+                  <a:txBody>
+                    <a:bodyPr/>
+                    <a:lstStyle/>
+                    <a:p>
+                      <a:pPr marL="0" algn="l" defTabSz="914400" rtl="0" eaLnBrk="1" latinLnBrk="0" hangingPunct="1"/>
+                      <a:r>
+                        <a:rPr lang="en-US" sz="1200" kern="1200" dirty="0" smtClean="0">
+                          <a:solidFill>
+                            <a:schemeClr val="dk1"/>
+                          </a:solidFill>
+                          <a:latin typeface="Lucida Console" pitchFamily="49" charset="0"/>
+                          <a:ea typeface="+mn-ea"/>
+                          <a:cs typeface="+mn-cs"/>
+                        </a:rPr>
+                        <a:t>D'Angelo Russell</a:t>
+                      </a:r>
+                    </a:p>
+                  </a:txBody>
+                  <a:tcPr/>
+                </a:tc>
+              </a:tr>
+              <a:tr h="370840">
+                <a:tc>
+                  <a:txBody>
+                    <a:bodyPr/>
+                    <a:lstStyle/>
+                    <a:p>
+                      <a:pPr marL="0" algn="l" defTabSz="914400" rtl="0" eaLnBrk="1" latinLnBrk="0" hangingPunct="1"/>
+                      <a:r>
+                        <a:rPr lang="en-US" sz="1200" kern="1200" dirty="0" smtClean="0">
+                          <a:solidFill>
+                            <a:schemeClr val="dk1"/>
+                          </a:solidFill>
+                          <a:latin typeface="Lucida Console" pitchFamily="49" charset="0"/>
+                          <a:ea typeface="+mn-ea"/>
+                          <a:cs typeface="+mn-cs"/>
+                        </a:rPr>
+                        <a:t>PG</a:t>
+                      </a:r>
+                    </a:p>
+                  </a:txBody>
+                  <a:tcPr/>
+                </a:tc>
+                <a:tc>
+                  <a:txBody>
+                    <a:bodyPr/>
+                    <a:lstStyle/>
+                    <a:p>
+                      <a:pPr marL="0" algn="l" defTabSz="914400" rtl="0" eaLnBrk="1" latinLnBrk="0" hangingPunct="1"/>
+                      <a:r>
+                        <a:rPr lang="lv-LV" sz="1200" kern="1200" dirty="0" smtClean="0">
+                          <a:solidFill>
+                            <a:schemeClr val="dk1"/>
+                          </a:solidFill>
+                          <a:latin typeface="Lucida Console" pitchFamily="49" charset="0"/>
+                          <a:ea typeface="+mn-ea"/>
+                          <a:cs typeface="+mn-cs"/>
+                        </a:rPr>
+                        <a:t>Emmanuel Mudiay</a:t>
+                      </a:r>
+                      <a:endParaRPr lang="en-US" sz="1200" kern="1200" dirty="0" smtClean="0">
+                        <a:solidFill>
+                          <a:schemeClr val="dk1"/>
+                        </a:solidFill>
+                        <a:latin typeface="Lucida Console" pitchFamily="49" charset="0"/>
+                        <a:ea typeface="+mn-ea"/>
+                        <a:cs typeface="+mn-cs"/>
+                      </a:endParaRPr>
+                    </a:p>
+                  </a:txBody>
+                  <a:tcPr/>
+                </a:tc>
+              </a:tr>
+              <a:tr h="370840">
+                <a:tc>
+                  <a:txBody>
+                    <a:bodyPr/>
+                    <a:lstStyle/>
+                    <a:p>
+                      <a:pPr marL="0" algn="l" defTabSz="914400" rtl="0" eaLnBrk="1" latinLnBrk="0" hangingPunct="1"/>
+                      <a:r>
+                        <a:rPr lang="en-US" sz="1200" kern="1200" dirty="0" smtClean="0">
+                          <a:solidFill>
+                            <a:schemeClr val="dk1"/>
+                          </a:solidFill>
+                          <a:latin typeface="Lucida Console" pitchFamily="49" charset="0"/>
+                          <a:ea typeface="+mn-ea"/>
+                          <a:cs typeface="+mn-cs"/>
+                        </a:rPr>
+                        <a:t>PG</a:t>
+                      </a:r>
+                    </a:p>
+                  </a:txBody>
+                  <a:tcPr/>
+                </a:tc>
+                <a:tc>
+                  <a:txBody>
+                    <a:bodyPr/>
+                    <a:lstStyle/>
+                    <a:p>
+                      <a:pPr marL="0" algn="l" defTabSz="914400" rtl="0" eaLnBrk="1" latinLnBrk="0" hangingPunct="1"/>
+                      <a:r>
+                        <a:rPr lang="en-US" sz="1200" kern="1200" dirty="0" smtClean="0">
+                          <a:solidFill>
+                            <a:schemeClr val="dk1"/>
+                          </a:solidFill>
+                          <a:latin typeface="Lucida Console" pitchFamily="49" charset="0"/>
+                          <a:ea typeface="+mn-ea"/>
+                          <a:cs typeface="+mn-cs"/>
+                        </a:rPr>
+                        <a:t>Cameron Payne</a:t>
+                      </a:r>
+                    </a:p>
+                  </a:txBody>
+                  <a:tcPr/>
+                </a:tc>
+              </a:tr>
+              <a:tr h="370840">
+                <a:tc>
+                  <a:txBody>
+                    <a:bodyPr/>
+                    <a:lstStyle/>
+                    <a:p>
+                      <a:pPr marL="0" algn="l" defTabSz="914400" rtl="0" eaLnBrk="1" latinLnBrk="0" hangingPunct="1"/>
+                      <a:r>
+                        <a:rPr lang="en-US" sz="1200" kern="1200" dirty="0" smtClean="0">
+                          <a:solidFill>
+                            <a:schemeClr val="dk1"/>
+                          </a:solidFill>
+                          <a:latin typeface="Lucida Console" pitchFamily="49" charset="0"/>
+                          <a:ea typeface="+mn-ea"/>
+                          <a:cs typeface="+mn-cs"/>
+                        </a:rPr>
+                        <a:t>PG</a:t>
+                      </a:r>
+                    </a:p>
+                  </a:txBody>
+                  <a:tcPr/>
+                </a:tc>
+                <a:tc>
+                  <a:txBody>
+                    <a:bodyPr/>
+                    <a:lstStyle/>
+                    <a:p>
+                      <a:pPr marL="0" algn="l" defTabSz="914400" rtl="0" eaLnBrk="1" latinLnBrk="0" hangingPunct="1"/>
+                      <a:r>
+                        <a:rPr lang="en-US" sz="1200" kern="1200" dirty="0" smtClean="0">
+                          <a:solidFill>
+                            <a:schemeClr val="dk1"/>
+                          </a:solidFill>
+                          <a:latin typeface="Lucida Console" pitchFamily="49" charset="0"/>
+                          <a:ea typeface="+mn-ea"/>
+                          <a:cs typeface="+mn-cs"/>
+                        </a:rPr>
+                        <a:t>Terry Rozier</a:t>
+                      </a:r>
+                    </a:p>
+                  </a:txBody>
+                  <a:tcPr/>
+                </a:tc>
+              </a:tr>
+              <a:tr h="370840">
+                <a:tc>
+                  <a:txBody>
+                    <a:bodyPr/>
+                    <a:lstStyle/>
+                    <a:p>
+                      <a:pPr marL="0" algn="l" defTabSz="914400" rtl="0" eaLnBrk="1" latinLnBrk="0" hangingPunct="1"/>
+                      <a:r>
+                        <a:rPr lang="en-US" sz="1200" kern="1200" dirty="0" smtClean="0">
+                          <a:solidFill>
+                            <a:schemeClr val="dk1"/>
+                          </a:solidFill>
+                          <a:latin typeface="Lucida Console" pitchFamily="49" charset="0"/>
+                          <a:ea typeface="+mn-ea"/>
+                          <a:cs typeface="+mn-cs"/>
+                        </a:rPr>
+                        <a:t>PG</a:t>
+                      </a:r>
+                    </a:p>
+                  </a:txBody>
+                  <a:tcPr/>
+                </a:tc>
+                <a:tc>
+                  <a:txBody>
+                    <a:bodyPr/>
+                    <a:lstStyle/>
+                    <a:p>
+                      <a:pPr marL="0" algn="l" defTabSz="914400" rtl="0" eaLnBrk="1" latinLnBrk="0" hangingPunct="1"/>
+                      <a:r>
+                        <a:rPr lang="en-US" sz="1200" kern="1200" dirty="0" smtClean="0">
+                          <a:solidFill>
+                            <a:schemeClr val="dk1"/>
+                          </a:solidFill>
+                          <a:latin typeface="Lucida Console" pitchFamily="49" charset="0"/>
+                          <a:ea typeface="+mn-ea"/>
+                          <a:cs typeface="+mn-cs"/>
+                        </a:rPr>
+                        <a:t>Jerian Grant</a:t>
+                      </a:r>
+                    </a:p>
+                  </a:txBody>
+                  <a:tcPr/>
+                </a:tc>
+              </a:tr>
+            </a:tbl>
+          </a:graphicData>
+        </a:graphic>
+      </p:graphicFrame>
+      <p:sp>
+        <p:nvSpPr>
+          <p:cNvPr id="10" name="TextBox 9"/>
+          <p:cNvSpPr txBox="1"/>
+          <p:nvPr/>
+        </p:nvSpPr>
+        <p:spPr>
+          <a:xfrm>
+            <a:off x="5277395" y="1031966"/>
+            <a:ext cx="6165669" cy="369332"/>
+          </a:xfrm>
+          <a:prstGeom prst="rect">
+            <a:avLst/>
+          </a:prstGeom>
+          <a:noFill/>
+        </p:spPr>
+        <p:txBody>
+          <a:bodyPr wrap="square" rtlCol="0">
+            <a:spAutoFit/>
+          </a:bodyPr>
+          <a:lstStyle/>
+          <a:p>
+            <a:r>
+              <a:rPr lang="en-US" dirty="0" smtClean="0">
+                <a:latin typeface="Lucida Console" pitchFamily="49" charset="0"/>
+              </a:rPr>
+              <a:t>Player Ranking based on normalized PPI</a:t>
+            </a:r>
+            <a:endParaRPr lang="en-US" dirty="0">
+              <a:latin typeface="Lucida Console" pitchFamily="49" charset="0"/>
             </a:endParaRPr>
           </a:p>
         </p:txBody>
@@ -4740,7 +5331,16 @@
                 </a:solidFill>
                 <a:latin typeface="Lucida Console" pitchFamily="49" charset="0"/>
               </a:rPr>
-              <a:t>The Problem Statement</a:t>
+              <a:t>Model Accuracy Test </a:t>
+            </a:r>
+            <a:r>
+              <a:rPr lang="en-US" sz="3600" dirty="0" smtClean="0">
+                <a:solidFill>
+                  <a:schemeClr val="tx1"/>
+                </a:solidFill>
+                <a:latin typeface="Lucida Console" pitchFamily="49" charset="0"/>
+              </a:rPr>
+              <a:t>Results (2)</a:t>
             </a:r>
             <a:endParaRPr lang="en-US" sz="3600" dirty="0">
               <a:solidFill>
@@ -4823,6 +5423,560 @@
           </a:p>
         </p:txBody>
       </p:sp>
+      <p:graphicFrame>
+        <p:nvGraphicFramePr>
+          <p:cNvPr id="8" name="Table 7"/>
+          <p:cNvGraphicFramePr>
+            <a:graphicFrameLocks noGrp="1"/>
+          </p:cNvGraphicFramePr>
+          <p:nvPr/>
+        </p:nvGraphicFramePr>
+        <p:xfrm>
+          <a:off x="294640" y="1137678"/>
+          <a:ext cx="4133669" cy="4450080"/>
+        </p:xfrm>
+        <a:graphic>
+          <a:graphicData uri="http://schemas.openxmlformats.org/drawingml/2006/table">
+            <a:tbl>
+              <a:tblPr firstRow="1" bandRow="1">
+                <a:tableStyleId>{5C22544A-7EE6-4342-B048-85BDC9FD1C3A}</a:tableStyleId>
+              </a:tblPr>
+              <a:tblGrid>
+                <a:gridCol w="1325154"/>
+                <a:gridCol w="2808515"/>
+              </a:tblGrid>
+              <a:tr h="370840">
+                <a:tc>
+                  <a:txBody>
+                    <a:bodyPr/>
+                    <a:lstStyle/>
+                    <a:p>
+                      <a:r>
+                        <a:rPr lang="en-US" sz="1200" dirty="0" smtClean="0">
+                          <a:solidFill>
+                            <a:schemeClr val="tx1"/>
+                          </a:solidFill>
+                          <a:latin typeface="Lucida Console" pitchFamily="49" charset="0"/>
+                        </a:rPr>
+                        <a:t>Position</a:t>
+                      </a:r>
+                      <a:endParaRPr lang="en-US" sz="1200" dirty="0">
+                        <a:solidFill>
+                          <a:schemeClr val="tx1"/>
+                        </a:solidFill>
+                        <a:latin typeface="Lucida Console" pitchFamily="49" charset="0"/>
+                      </a:endParaRPr>
+                    </a:p>
+                  </a:txBody>
+                  <a:tcPr/>
+                </a:tc>
+                <a:tc>
+                  <a:txBody>
+                    <a:bodyPr/>
+                    <a:lstStyle/>
+                    <a:p>
+                      <a:r>
+                        <a:rPr lang="en-US" sz="1200" dirty="0" smtClean="0">
+                          <a:solidFill>
+                            <a:schemeClr val="tx1"/>
+                          </a:solidFill>
+                          <a:latin typeface="Lucida Console" pitchFamily="49" charset="0"/>
+                        </a:rPr>
+                        <a:t>Payer Name</a:t>
+                      </a:r>
+                      <a:endParaRPr lang="en-US" sz="1200" dirty="0">
+                        <a:solidFill>
+                          <a:schemeClr val="tx1"/>
+                        </a:solidFill>
+                        <a:latin typeface="Lucida Console" pitchFamily="49" charset="0"/>
+                      </a:endParaRPr>
+                    </a:p>
+                  </a:txBody>
+                  <a:tcPr/>
+                </a:tc>
+              </a:tr>
+              <a:tr h="370840">
+                <a:tc>
+                  <a:txBody>
+                    <a:bodyPr/>
+                    <a:lstStyle/>
+                    <a:p>
+                      <a:r>
+                        <a:rPr lang="en-US" sz="1200" dirty="0" smtClean="0">
+                          <a:latin typeface="Lucida Console" pitchFamily="49" charset="0"/>
+                        </a:rPr>
+                        <a:t>PF</a:t>
+                      </a:r>
+                      <a:endParaRPr lang="en-US" sz="1200" dirty="0">
+                        <a:latin typeface="Lucida Console" pitchFamily="49" charset="0"/>
+                      </a:endParaRPr>
+                    </a:p>
+                  </a:txBody>
+                  <a:tcPr/>
+                </a:tc>
+                <a:tc>
+                  <a:txBody>
+                    <a:bodyPr/>
+                    <a:lstStyle/>
+                    <a:p>
+                      <a:r>
+                        <a:rPr lang="en-US" sz="1200" dirty="0" smtClean="0">
+                          <a:latin typeface="Lucida Console" pitchFamily="49" charset="0"/>
+                        </a:rPr>
+                        <a:t>Trey Lyles</a:t>
+                      </a:r>
+                      <a:endParaRPr lang="en-US" sz="1200" dirty="0">
+                        <a:latin typeface="Lucida Console" pitchFamily="49" charset="0"/>
+                      </a:endParaRPr>
+                    </a:p>
+                  </a:txBody>
+                  <a:tcPr/>
+                </a:tc>
+              </a:tr>
+              <a:tr h="370840">
+                <a:tc>
+                  <a:txBody>
+                    <a:bodyPr/>
+                    <a:lstStyle/>
+                    <a:p>
+                      <a:r>
+                        <a:rPr lang="en-US" sz="1200" dirty="0" smtClean="0">
+                          <a:latin typeface="Lucida Console" pitchFamily="49" charset="0"/>
+                        </a:rPr>
+                        <a:t>PF</a:t>
+                      </a:r>
+                      <a:endParaRPr lang="en-US" sz="1200" dirty="0">
+                        <a:latin typeface="Lucida Console" pitchFamily="49" charset="0"/>
+                      </a:endParaRPr>
+                    </a:p>
+                  </a:txBody>
+                  <a:tcPr/>
+                </a:tc>
+                <a:tc>
+                  <a:txBody>
+                    <a:bodyPr/>
+                    <a:lstStyle/>
+                    <a:p>
+                      <a:r>
+                        <a:rPr lang="en-US" sz="1200" dirty="0" smtClean="0">
+                          <a:latin typeface="Lucida Console" pitchFamily="49" charset="0"/>
+                        </a:rPr>
+                        <a:t>Bobby Portis</a:t>
+                      </a:r>
+                      <a:endParaRPr lang="en-US" sz="1200" dirty="0">
+                        <a:latin typeface="Lucida Console" pitchFamily="49" charset="0"/>
+                      </a:endParaRPr>
+                    </a:p>
+                  </a:txBody>
+                  <a:tcPr/>
+                </a:tc>
+              </a:tr>
+              <a:tr h="370840">
+                <a:tc>
+                  <a:txBody>
+                    <a:bodyPr/>
+                    <a:lstStyle/>
+                    <a:p>
+                      <a:pPr marL="0" marR="0" indent="0" algn="l" defTabSz="914400" rtl="0" eaLnBrk="1" fontAlgn="auto" latinLnBrk="0" hangingPunct="1">
+                        <a:lnSpc>
+                          <a:spcPct val="100000"/>
+                        </a:lnSpc>
+                        <a:spcBef>
+                          <a:spcPts val="0"/>
+                        </a:spcBef>
+                        <a:spcAft>
+                          <a:spcPts val="0"/>
+                        </a:spcAft>
+                        <a:buClrTx/>
+                        <a:buSzTx/>
+                        <a:buFontTx/>
+                        <a:buNone/>
+                        <a:tabLst/>
+                        <a:defRPr/>
+                      </a:pPr>
+                      <a:r>
+                        <a:rPr lang="en-US" sz="1200" dirty="0" smtClean="0">
+                          <a:latin typeface="Lucida Console" pitchFamily="49" charset="0"/>
+                        </a:rPr>
+                        <a:t>PF</a:t>
+                      </a:r>
+                      <a:endParaRPr lang="en-US" sz="1200" dirty="0">
+                        <a:latin typeface="Lucida Console" pitchFamily="49" charset="0"/>
+                      </a:endParaRPr>
+                    </a:p>
+                  </a:txBody>
+                  <a:tcPr/>
+                </a:tc>
+                <a:tc>
+                  <a:txBody>
+                    <a:bodyPr/>
+                    <a:lstStyle/>
+                    <a:p>
+                      <a:r>
+                        <a:rPr lang="lv-LV" sz="1200" dirty="0" smtClean="0">
+                          <a:latin typeface="Lucida Console" pitchFamily="49" charset="0"/>
+                        </a:rPr>
+                        <a:t>Jarell Martin</a:t>
+                      </a:r>
+                      <a:endParaRPr lang="en-US" sz="1200" dirty="0">
+                        <a:latin typeface="Lucida Console" pitchFamily="49" charset="0"/>
+                      </a:endParaRPr>
+                    </a:p>
+                  </a:txBody>
+                  <a:tcPr/>
+                </a:tc>
+              </a:tr>
+              <a:tr h="370840">
+                <a:tc>
+                  <a:txBody>
+                    <a:bodyPr/>
+                    <a:lstStyle/>
+                    <a:p>
+                      <a:r>
+                        <a:rPr lang="en-US" sz="1200" dirty="0" smtClean="0">
+                          <a:latin typeface="Lucida Console" pitchFamily="49" charset="0"/>
+                        </a:rPr>
+                        <a:t>PF</a:t>
+                      </a:r>
+                      <a:endParaRPr lang="en-US" sz="1200" dirty="0">
+                        <a:latin typeface="Lucida Console" pitchFamily="49" charset="0"/>
+                      </a:endParaRPr>
+                    </a:p>
+                  </a:txBody>
+                  <a:tcPr/>
+                </a:tc>
+                <a:tc>
+                  <a:txBody>
+                    <a:bodyPr/>
+                    <a:lstStyle/>
+                    <a:p>
+                      <a:r>
+                        <a:rPr lang="en-US" sz="1200" dirty="0" smtClean="0">
+                          <a:latin typeface="Lucida Console" pitchFamily="49" charset="0"/>
+                        </a:rPr>
+                        <a:t>Larry Nance, Jr.</a:t>
+                      </a:r>
+                      <a:endParaRPr lang="en-US" sz="1200" dirty="0">
+                        <a:latin typeface="Lucida Console" pitchFamily="49" charset="0"/>
+                      </a:endParaRPr>
+                    </a:p>
+                  </a:txBody>
+                  <a:tcPr/>
+                </a:tc>
+              </a:tr>
+              <a:tr h="370840">
+                <a:tc>
+                  <a:txBody>
+                    <a:bodyPr/>
+                    <a:lstStyle/>
+                    <a:p>
+                      <a:r>
+                        <a:rPr lang="en-US" sz="1200" dirty="0" smtClean="0">
+                          <a:latin typeface="Lucida Console" pitchFamily="49" charset="0"/>
+                        </a:rPr>
+                        <a:t>PF</a:t>
+                      </a:r>
+                      <a:endParaRPr lang="en-US" sz="1200" dirty="0">
+                        <a:latin typeface="Lucida Console" pitchFamily="49" charset="0"/>
+                      </a:endParaRPr>
+                    </a:p>
+                  </a:txBody>
+                  <a:tcPr/>
+                </a:tc>
+                <a:tc>
+                  <a:txBody>
+                    <a:bodyPr/>
+                    <a:lstStyle/>
+                    <a:p>
+                      <a:pPr marL="0" algn="l" defTabSz="914400" rtl="0" eaLnBrk="1" latinLnBrk="0" hangingPunct="1"/>
+                      <a:r>
+                        <a:rPr lang="en-US" sz="1200" kern="1200" dirty="0" smtClean="0">
+                          <a:solidFill>
+                            <a:schemeClr val="dk1"/>
+                          </a:solidFill>
+                          <a:latin typeface="Lucida Console" pitchFamily="49" charset="0"/>
+                          <a:ea typeface="+mn-ea"/>
+                          <a:cs typeface="+mn-cs"/>
+                        </a:rPr>
+                        <a:t>Chris McCullough</a:t>
+                      </a:r>
+                    </a:p>
+                  </a:txBody>
+                  <a:tcPr/>
+                </a:tc>
+              </a:tr>
+              <a:tr h="370840">
+                <a:tc>
+                  <a:txBody>
+                    <a:bodyPr/>
+                    <a:lstStyle/>
+                    <a:p>
+                      <a:endParaRPr lang="en-US" sz="1200" dirty="0">
+                        <a:latin typeface="Lucida Console" pitchFamily="49" charset="0"/>
+                      </a:endParaRPr>
+                    </a:p>
+                  </a:txBody>
+                  <a:tcPr>
+                    <a:solidFill>
+                      <a:srgbClr val="92D050"/>
+                    </a:solidFill>
+                  </a:tcPr>
+                </a:tc>
+                <a:tc>
+                  <a:txBody>
+                    <a:bodyPr/>
+                    <a:lstStyle/>
+                    <a:p>
+                      <a:pPr marL="0" algn="l" defTabSz="914400" rtl="0" eaLnBrk="1" latinLnBrk="0" hangingPunct="1"/>
+                      <a:endParaRPr lang="en-US" sz="1200" kern="1200" dirty="0" smtClean="0">
+                        <a:solidFill>
+                          <a:schemeClr val="dk1"/>
+                        </a:solidFill>
+                        <a:latin typeface="Lucida Console" pitchFamily="49" charset="0"/>
+                        <a:ea typeface="+mn-ea"/>
+                        <a:cs typeface="+mn-cs"/>
+                      </a:endParaRPr>
+                    </a:p>
+                  </a:txBody>
+                  <a:tcPr>
+                    <a:solidFill>
+                      <a:srgbClr val="92D050"/>
+                    </a:solidFill>
+                  </a:tcPr>
+                </a:tc>
+              </a:tr>
+              <a:tr h="370840">
+                <a:tc>
+                  <a:txBody>
+                    <a:bodyPr/>
+                    <a:lstStyle/>
+                    <a:p>
+                      <a:pPr marL="0" algn="l" defTabSz="914400" rtl="0" eaLnBrk="1" latinLnBrk="0" hangingPunct="1"/>
+                      <a:r>
+                        <a:rPr lang="en-US" sz="1200" kern="1200" dirty="0" smtClean="0">
+                          <a:solidFill>
+                            <a:schemeClr val="dk1"/>
+                          </a:solidFill>
+                          <a:latin typeface="Lucida Console" pitchFamily="49" charset="0"/>
+                          <a:ea typeface="+mn-ea"/>
+                          <a:cs typeface="+mn-cs"/>
+                        </a:rPr>
+                        <a:t>SF</a:t>
+                      </a:r>
+                    </a:p>
+                  </a:txBody>
+                  <a:tcPr/>
+                </a:tc>
+                <a:tc>
+                  <a:txBody>
+                    <a:bodyPr/>
+                    <a:lstStyle/>
+                    <a:p>
+                      <a:pPr marL="0" algn="l" defTabSz="914400" rtl="0" eaLnBrk="1" latinLnBrk="0" hangingPunct="1"/>
+                      <a:r>
+                        <a:rPr lang="en-US" sz="1200" kern="1200" dirty="0" smtClean="0">
+                          <a:solidFill>
+                            <a:schemeClr val="dk1"/>
+                          </a:solidFill>
+                          <a:latin typeface="Lucida Console" pitchFamily="49" charset="0"/>
+                          <a:ea typeface="+mn-ea"/>
+                          <a:cs typeface="+mn-cs"/>
+                        </a:rPr>
+                        <a:t>Stanley Johnson</a:t>
+                      </a:r>
+                    </a:p>
+                  </a:txBody>
+                  <a:tcPr/>
+                </a:tc>
+              </a:tr>
+              <a:tr h="370840">
+                <a:tc>
+                  <a:txBody>
+                    <a:bodyPr/>
+                    <a:lstStyle/>
+                    <a:p>
+                      <a:pPr marL="0" algn="l" defTabSz="914400" rtl="0" eaLnBrk="1" latinLnBrk="0" hangingPunct="1"/>
+                      <a:r>
+                        <a:rPr lang="en-US" sz="1200" kern="1200" dirty="0" smtClean="0">
+                          <a:solidFill>
+                            <a:schemeClr val="dk1"/>
+                          </a:solidFill>
+                          <a:latin typeface="Lucida Console" pitchFamily="49" charset="0"/>
+                          <a:ea typeface="+mn-ea"/>
+                          <a:cs typeface="+mn-cs"/>
+                        </a:rPr>
+                        <a:t>SF</a:t>
+                      </a:r>
+                    </a:p>
+                  </a:txBody>
+                  <a:tcPr/>
+                </a:tc>
+                <a:tc>
+                  <a:txBody>
+                    <a:bodyPr/>
+                    <a:lstStyle/>
+                    <a:p>
+                      <a:pPr marL="0" algn="l" defTabSz="914400" rtl="0" eaLnBrk="1" latinLnBrk="0" hangingPunct="1"/>
+                      <a:r>
+                        <a:rPr lang="lv-LV" sz="1200" kern="1200" dirty="0" smtClean="0">
+                          <a:solidFill>
+                            <a:schemeClr val="dk1"/>
+                          </a:solidFill>
+                          <a:latin typeface="Lucida Console" pitchFamily="49" charset="0"/>
+                          <a:ea typeface="+mn-ea"/>
+                          <a:cs typeface="+mn-cs"/>
+                        </a:rPr>
+                        <a:t>Justise Winslow</a:t>
+                      </a:r>
+                      <a:endParaRPr lang="en-US" sz="1200" kern="1200" dirty="0" smtClean="0">
+                        <a:solidFill>
+                          <a:schemeClr val="dk1"/>
+                        </a:solidFill>
+                        <a:latin typeface="Lucida Console" pitchFamily="49" charset="0"/>
+                        <a:ea typeface="+mn-ea"/>
+                        <a:cs typeface="+mn-cs"/>
+                      </a:endParaRPr>
+                    </a:p>
+                  </a:txBody>
+                  <a:tcPr/>
+                </a:tc>
+              </a:tr>
+              <a:tr h="370840">
+                <a:tc>
+                  <a:txBody>
+                    <a:bodyPr/>
+                    <a:lstStyle/>
+                    <a:p>
+                      <a:pPr marL="0" algn="l" defTabSz="914400" rtl="0" eaLnBrk="1" latinLnBrk="0" hangingPunct="1"/>
+                      <a:r>
+                        <a:rPr lang="en-US" sz="1200" kern="1200" dirty="0" smtClean="0">
+                          <a:solidFill>
+                            <a:schemeClr val="dk1"/>
+                          </a:solidFill>
+                          <a:latin typeface="Lucida Console" pitchFamily="49" charset="0"/>
+                          <a:ea typeface="+mn-ea"/>
+                          <a:cs typeface="+mn-cs"/>
+                        </a:rPr>
+                        <a:t>SF</a:t>
+                      </a:r>
+                    </a:p>
+                  </a:txBody>
+                  <a:tcPr/>
+                </a:tc>
+                <a:tc>
+                  <a:txBody>
+                    <a:bodyPr/>
+                    <a:lstStyle/>
+                    <a:p>
+                      <a:pPr marL="0" algn="l" defTabSz="914400" rtl="0" eaLnBrk="1" latinLnBrk="0" hangingPunct="1"/>
+                      <a:r>
+                        <a:rPr lang="en-US" sz="1200" kern="1200" dirty="0" smtClean="0">
+                          <a:solidFill>
+                            <a:schemeClr val="dk1"/>
+                          </a:solidFill>
+                          <a:latin typeface="Lucida Console" pitchFamily="49" charset="0"/>
+                          <a:ea typeface="+mn-ea"/>
+                          <a:cs typeface="+mn-cs"/>
+                        </a:rPr>
+                        <a:t>Sam Dekker</a:t>
+                      </a:r>
+                    </a:p>
+                  </a:txBody>
+                  <a:tcPr/>
+                </a:tc>
+              </a:tr>
+              <a:tr h="370840">
+                <a:tc>
+                  <a:txBody>
+                    <a:bodyPr/>
+                    <a:lstStyle/>
+                    <a:p>
+                      <a:pPr marL="0" algn="l" defTabSz="914400" rtl="0" eaLnBrk="1" latinLnBrk="0" hangingPunct="1"/>
+                      <a:r>
+                        <a:rPr lang="en-US" sz="1200" kern="1200" dirty="0" smtClean="0">
+                          <a:solidFill>
+                            <a:schemeClr val="dk1"/>
+                          </a:solidFill>
+                          <a:latin typeface="Lucida Console" pitchFamily="49" charset="0"/>
+                          <a:ea typeface="+mn-ea"/>
+                          <a:cs typeface="+mn-cs"/>
+                        </a:rPr>
+                        <a:t>SF</a:t>
+                      </a:r>
+                    </a:p>
+                  </a:txBody>
+                  <a:tcPr/>
+                </a:tc>
+                <a:tc>
+                  <a:txBody>
+                    <a:bodyPr/>
+                    <a:lstStyle/>
+                    <a:p>
+                      <a:pPr marL="0" algn="l" defTabSz="914400" rtl="0" eaLnBrk="1" latinLnBrk="0" hangingPunct="1"/>
+                      <a:r>
+                        <a:rPr lang="en-US" sz="1200" kern="1200" dirty="0" smtClean="0">
+                          <a:solidFill>
+                            <a:schemeClr val="dk1"/>
+                          </a:solidFill>
+                          <a:latin typeface="Lucida Console" pitchFamily="49" charset="0"/>
+                          <a:ea typeface="+mn-ea"/>
+                          <a:cs typeface="+mn-cs"/>
+                        </a:rPr>
+                        <a:t>Justin Anderson</a:t>
+                      </a:r>
+                    </a:p>
+                  </a:txBody>
+                  <a:tcPr/>
+                </a:tc>
+              </a:tr>
+              <a:tr h="370840">
+                <a:tc>
+                  <a:txBody>
+                    <a:bodyPr/>
+                    <a:lstStyle/>
+                    <a:p>
+                      <a:pPr marL="0" algn="l" defTabSz="914400" rtl="0" eaLnBrk="1" latinLnBrk="0" hangingPunct="1"/>
+                      <a:r>
+                        <a:rPr lang="en-US" sz="1200" kern="1200" dirty="0" smtClean="0">
+                          <a:solidFill>
+                            <a:schemeClr val="dk1"/>
+                          </a:solidFill>
+                          <a:latin typeface="Lucida Console" pitchFamily="49" charset="0"/>
+                          <a:ea typeface="+mn-ea"/>
+                          <a:cs typeface="+mn-cs"/>
+                        </a:rPr>
+                        <a:t>SF</a:t>
+                      </a:r>
+                    </a:p>
+                  </a:txBody>
+                  <a:tcPr/>
+                </a:tc>
+                <a:tc>
+                  <a:txBody>
+                    <a:bodyPr/>
+                    <a:lstStyle/>
+                    <a:p>
+                      <a:pPr marL="0" algn="l" defTabSz="914400" rtl="0" eaLnBrk="1" latinLnBrk="0" hangingPunct="1"/>
+                      <a:r>
+                        <a:rPr lang="en-US" sz="1200" kern="1200" dirty="0" smtClean="0">
+                          <a:solidFill>
+                            <a:schemeClr val="dk1"/>
+                          </a:solidFill>
+                          <a:latin typeface="Lucida Console" pitchFamily="49" charset="0"/>
+                          <a:ea typeface="+mn-ea"/>
+                          <a:cs typeface="+mn-cs"/>
+                        </a:rPr>
+                        <a:t>Rondae Hollis-Jefferson</a:t>
+                      </a:r>
+                    </a:p>
+                  </a:txBody>
+                  <a:tcPr/>
+                </a:tc>
+              </a:tr>
+            </a:tbl>
+          </a:graphicData>
+        </a:graphic>
+      </p:graphicFrame>
     </p:spTree>
   </p:cSld>
   <p:clrMapOvr>
@@ -4963,7 +6117,16 @@
                 </a:solidFill>
                 <a:latin typeface="Lucida Console" pitchFamily="49" charset="0"/>
               </a:rPr>
-              <a:t>The Problem Statement</a:t>
+              <a:t>Model Accuracy Test Results </a:t>
+            </a:r>
+            <a:r>
+              <a:rPr lang="en-US" sz="3600" dirty="0" smtClean="0">
+                <a:solidFill>
+                  <a:schemeClr val="tx1"/>
+                </a:solidFill>
+                <a:latin typeface="Lucida Console" pitchFamily="49" charset="0"/>
+              </a:rPr>
+              <a:t>(3)</a:t>
             </a:r>
             <a:endParaRPr lang="en-US" sz="3600" dirty="0">
               <a:solidFill>
@@ -5046,6 +6209,310 @@
           </a:p>
         </p:txBody>
       </p:sp>
+      <p:graphicFrame>
+        <p:nvGraphicFramePr>
+          <p:cNvPr id="6" name="Table 5"/>
+          <p:cNvGraphicFramePr>
+            <a:graphicFrameLocks noGrp="1"/>
+          </p:cNvGraphicFramePr>
+          <p:nvPr/>
+        </p:nvGraphicFramePr>
+        <p:xfrm>
+          <a:off x="294640" y="1137680"/>
+          <a:ext cx="4133669" cy="2376834"/>
+        </p:xfrm>
+        <a:graphic>
+          <a:graphicData uri="http://schemas.openxmlformats.org/drawingml/2006/table">
+            <a:tbl>
+              <a:tblPr firstRow="1" bandRow="1">
+                <a:tableStyleId>{5C22544A-7EE6-4342-B048-85BDC9FD1C3A}</a:tableStyleId>
+              </a:tblPr>
+              <a:tblGrid>
+                <a:gridCol w="1325154"/>
+                <a:gridCol w="2808515"/>
+              </a:tblGrid>
+              <a:tr h="396139">
+                <a:tc>
+                  <a:txBody>
+                    <a:bodyPr/>
+                    <a:lstStyle/>
+                    <a:p>
+                      <a:r>
+                        <a:rPr lang="en-US" sz="1200" dirty="0" smtClean="0">
+                          <a:solidFill>
+                            <a:schemeClr val="tx1"/>
+                          </a:solidFill>
+                          <a:latin typeface="Lucida Console" pitchFamily="49" charset="0"/>
+                        </a:rPr>
+                        <a:t>Position</a:t>
+                      </a:r>
+                      <a:endParaRPr lang="en-US" sz="1200" dirty="0">
+                        <a:solidFill>
+                          <a:schemeClr val="tx1"/>
+                        </a:solidFill>
+                        <a:latin typeface="Lucida Console" pitchFamily="49" charset="0"/>
+                      </a:endParaRPr>
+                    </a:p>
+                  </a:txBody>
+                  <a:tcPr/>
+                </a:tc>
+                <a:tc>
+                  <a:txBody>
+                    <a:bodyPr/>
+                    <a:lstStyle/>
+                    <a:p>
+                      <a:r>
+                        <a:rPr lang="en-US" sz="1200" dirty="0" smtClean="0">
+                          <a:solidFill>
+                            <a:schemeClr val="tx1"/>
+                          </a:solidFill>
+                          <a:latin typeface="Lucida Console" pitchFamily="49" charset="0"/>
+                        </a:rPr>
+                        <a:t>Payer Name</a:t>
+                      </a:r>
+                      <a:endParaRPr lang="en-US" sz="1200" dirty="0">
+                        <a:solidFill>
+                          <a:schemeClr val="tx1"/>
+                        </a:solidFill>
+                        <a:latin typeface="Lucida Console" pitchFamily="49" charset="0"/>
+                      </a:endParaRPr>
+                    </a:p>
+                  </a:txBody>
+                  <a:tcPr/>
+                </a:tc>
+              </a:tr>
+              <a:tr h="396139">
+                <a:tc>
+                  <a:txBody>
+                    <a:bodyPr/>
+                    <a:lstStyle/>
+                    <a:p>
+                      <a:pPr marL="0" algn="l" defTabSz="914400" rtl="0" eaLnBrk="1" latinLnBrk="0" hangingPunct="1"/>
+                      <a:r>
+                        <a:rPr lang="en-US" sz="1200" kern="1200" dirty="0" smtClean="0">
+                          <a:solidFill>
+                            <a:schemeClr val="dk1"/>
+                          </a:solidFill>
+                          <a:latin typeface="Lucida Console" pitchFamily="49" charset="0"/>
+                          <a:ea typeface="+mn-ea"/>
+                          <a:cs typeface="+mn-cs"/>
+                        </a:rPr>
+                        <a:t>SG</a:t>
+                      </a:r>
+                    </a:p>
+                  </a:txBody>
+                  <a:tcPr/>
+                </a:tc>
+                <a:tc>
+                  <a:txBody>
+                    <a:bodyPr/>
+                    <a:lstStyle/>
+                    <a:p>
+                      <a:pPr marL="0" algn="l" defTabSz="914400" rtl="0" eaLnBrk="1" latinLnBrk="0" hangingPunct="1"/>
+                      <a:r>
+                        <a:rPr lang="en-US" sz="1200" kern="1200" dirty="0" smtClean="0">
+                          <a:solidFill>
+                            <a:schemeClr val="dk1"/>
+                          </a:solidFill>
+                          <a:latin typeface="Lucida Console" pitchFamily="49" charset="0"/>
+                          <a:ea typeface="+mn-ea"/>
+                          <a:cs typeface="+mn-cs"/>
+                        </a:rPr>
+                        <a:t>Devin Booker</a:t>
+                      </a:r>
+                    </a:p>
+                  </a:txBody>
+                  <a:tcPr/>
+                </a:tc>
+              </a:tr>
+              <a:tr h="396139">
+                <a:tc>
+                  <a:txBody>
+                    <a:bodyPr/>
+                    <a:lstStyle/>
+                    <a:p>
+                      <a:pPr marL="0" algn="l" defTabSz="914400" rtl="0" eaLnBrk="1" latinLnBrk="0" hangingPunct="1"/>
+                      <a:r>
+                        <a:rPr lang="en-US" sz="1200" kern="1200" dirty="0" smtClean="0">
+                          <a:solidFill>
+                            <a:schemeClr val="dk1"/>
+                          </a:solidFill>
+                          <a:latin typeface="Lucida Console" pitchFamily="49" charset="0"/>
+                          <a:ea typeface="+mn-ea"/>
+                          <a:cs typeface="+mn-cs"/>
+                        </a:rPr>
+                        <a:t>SG</a:t>
+                      </a:r>
+                    </a:p>
+                  </a:txBody>
+                  <a:tcPr/>
+                </a:tc>
+                <a:tc>
+                  <a:txBody>
+                    <a:bodyPr/>
+                    <a:lstStyle/>
+                    <a:p>
+                      <a:pPr marL="0" algn="l" defTabSz="914400" rtl="0" eaLnBrk="1" latinLnBrk="0" hangingPunct="1"/>
+                      <a:r>
+                        <a:rPr lang="lv-LV" sz="1200" kern="1200" dirty="0" smtClean="0">
+                          <a:solidFill>
+                            <a:schemeClr val="dk1"/>
+                          </a:solidFill>
+                          <a:latin typeface="Lucida Console" pitchFamily="49" charset="0"/>
+                          <a:ea typeface="+mn-ea"/>
+                          <a:cs typeface="+mn-cs"/>
+                        </a:rPr>
+                        <a:t>Kelly Oubre Jr.</a:t>
+                      </a:r>
+                      <a:endParaRPr lang="en-US" sz="1200" kern="1200" dirty="0" smtClean="0">
+                        <a:solidFill>
+                          <a:schemeClr val="dk1"/>
+                        </a:solidFill>
+                        <a:latin typeface="Lucida Console" pitchFamily="49" charset="0"/>
+                        <a:ea typeface="+mn-ea"/>
+                        <a:cs typeface="+mn-cs"/>
+                      </a:endParaRPr>
+                    </a:p>
+                  </a:txBody>
+                  <a:tcPr/>
+                </a:tc>
+              </a:tr>
+              <a:tr h="396139">
+                <a:tc>
+                  <a:txBody>
+                    <a:bodyPr/>
+                    <a:lstStyle/>
+                    <a:p>
+                      <a:pPr marL="0" algn="l" defTabSz="914400" rtl="0" eaLnBrk="1" latinLnBrk="0" hangingPunct="1"/>
+                      <a:r>
+                        <a:rPr lang="en-US" sz="1200" kern="1200" dirty="0" smtClean="0">
+                          <a:solidFill>
+                            <a:schemeClr val="dk1"/>
+                          </a:solidFill>
+                          <a:latin typeface="Lucida Console" pitchFamily="49" charset="0"/>
+                          <a:ea typeface="+mn-ea"/>
+                          <a:cs typeface="+mn-cs"/>
+                        </a:rPr>
+                        <a:t>SG</a:t>
+                      </a:r>
+                    </a:p>
+                  </a:txBody>
+                  <a:tcPr/>
+                </a:tc>
+                <a:tc>
+                  <a:txBody>
+                    <a:bodyPr/>
+                    <a:lstStyle/>
+                    <a:p>
+                      <a:pPr marL="0" algn="l" defTabSz="914400" rtl="0" eaLnBrk="1" latinLnBrk="0" hangingPunct="1"/>
+                      <a:r>
+                        <a:rPr lang="en-US" sz="1200" kern="1200" dirty="0" smtClean="0">
+                          <a:solidFill>
+                            <a:schemeClr val="dk1"/>
+                          </a:solidFill>
+                          <a:latin typeface="Lucida Console" pitchFamily="49" charset="0"/>
+                          <a:ea typeface="+mn-ea"/>
+                          <a:cs typeface="+mn-cs"/>
+                        </a:rPr>
+                        <a:t>Rashad Vaughn</a:t>
+                      </a:r>
+                    </a:p>
+                  </a:txBody>
+                  <a:tcPr/>
+                </a:tc>
+              </a:tr>
+              <a:tr h="396139">
+                <a:tc>
+                  <a:txBody>
+                    <a:bodyPr/>
+                    <a:lstStyle/>
+                    <a:p>
+                      <a:pPr marL="0" algn="l" defTabSz="914400" rtl="0" eaLnBrk="1" latinLnBrk="0" hangingPunct="1"/>
+                      <a:r>
+                        <a:rPr lang="en-US" sz="1200" kern="1200" dirty="0" smtClean="0">
+                          <a:solidFill>
+                            <a:schemeClr val="dk1"/>
+                          </a:solidFill>
+                          <a:latin typeface="Lucida Console" pitchFamily="49" charset="0"/>
+                          <a:ea typeface="+mn-ea"/>
+                          <a:cs typeface="+mn-cs"/>
+                        </a:rPr>
+                        <a:t>SG</a:t>
+                      </a:r>
+                    </a:p>
+                  </a:txBody>
+                  <a:tcPr/>
+                </a:tc>
+                <a:tc>
+                  <a:txBody>
+                    <a:bodyPr/>
+                    <a:lstStyle/>
+                    <a:p>
+                      <a:pPr marL="0" algn="l" defTabSz="914400" rtl="0" eaLnBrk="1" latinLnBrk="0" hangingPunct="1"/>
+                      <a:r>
+                        <a:rPr lang="en-US" sz="1200" kern="1200" dirty="0" smtClean="0">
+                          <a:solidFill>
+                            <a:schemeClr val="dk1"/>
+                          </a:solidFill>
+                          <a:latin typeface="Lucida Console" pitchFamily="49" charset="0"/>
+                          <a:ea typeface="+mn-ea"/>
+                          <a:cs typeface="+mn-cs"/>
+                        </a:rPr>
+                        <a:t>R. J. Hunter</a:t>
+                      </a:r>
+                    </a:p>
+                  </a:txBody>
+                  <a:tcPr/>
+                </a:tc>
+              </a:tr>
+              <a:tr h="396139">
+                <a:tc>
+                  <a:txBody>
+                    <a:bodyPr/>
+                    <a:lstStyle/>
+                    <a:p>
+                      <a:pPr marL="0" algn="l" defTabSz="914400" rtl="0" eaLnBrk="1" latinLnBrk="0" hangingPunct="1"/>
+                      <a:r>
+                        <a:rPr lang="en-US" sz="1200" kern="1200" dirty="0" smtClean="0">
+                          <a:solidFill>
+                            <a:schemeClr val="dk1"/>
+                          </a:solidFill>
+                          <a:latin typeface="Lucida Console" pitchFamily="49" charset="0"/>
+                          <a:ea typeface="+mn-ea"/>
+                          <a:cs typeface="+mn-cs"/>
+                        </a:rPr>
+                        <a:t>SG</a:t>
+                      </a:r>
+                    </a:p>
+                  </a:txBody>
+                  <a:tcPr/>
+                </a:tc>
+                <a:tc>
+                  <a:txBody>
+                    <a:bodyPr/>
+                    <a:lstStyle/>
+                    <a:p>
+                      <a:pPr marL="0" algn="l" defTabSz="914400" rtl="0" eaLnBrk="1" latinLnBrk="0" hangingPunct="1"/>
+                      <a:r>
+                        <a:rPr lang="en-US" sz="1200" kern="1200" dirty="0" smtClean="0">
+                          <a:solidFill>
+                            <a:schemeClr val="dk1"/>
+                          </a:solidFill>
+                          <a:latin typeface="Lucida Console" pitchFamily="49" charset="0"/>
+                          <a:ea typeface="+mn-ea"/>
+                          <a:cs typeface="+mn-cs"/>
+                        </a:rPr>
+                        <a:t>Darrun Hilliard</a:t>
+                      </a:r>
+                    </a:p>
+                  </a:txBody>
+                  <a:tcPr/>
+                </a:tc>
+              </a:tr>
+            </a:tbl>
+          </a:graphicData>
+        </a:graphic>
+      </p:graphicFrame>
     </p:spTree>
   </p:cSld>
   <p:clrMapOvr>
@@ -5186,7 +6653,7 @@
                 </a:solidFill>
                 <a:latin typeface="Lucida Console" pitchFamily="49" charset="0"/>
               </a:rPr>
-              <a:t>The Problem Statement</a:t>
+              <a:t>Proposed 2016-17 Draft</a:t>
             </a:r>
             <a:endParaRPr lang="en-US" sz="3600" dirty="0">
               <a:solidFill>
@@ -6184,9 +7651,6 @@
               </a:rPr>
               <a:t>There are 5 playing positions point guard (PG), shooting guard (SG), small forward (SF), power forward (PF), and center (C) in a NBA basket ball team. </a:t>
             </a:r>
-            <a:endParaRPr lang="en-US" sz="2800" dirty="0" smtClean="0">
-              <a:latin typeface="Lucida Console" pitchFamily="49" charset="0"/>
-            </a:endParaRPr>
           </a:p>
           <a:p>
             <a:pPr>
@@ -6220,9 +7684,6 @@
               </a:rPr>
               <a:t>Based on key historical data create a player performance index (PPI) for each player.</a:t>
             </a:r>
-            <a:endParaRPr lang="en-US" sz="2800" dirty="0" smtClean="0">
-              <a:latin typeface="Lucida Console" pitchFamily="49" charset="0"/>
-            </a:endParaRPr>
           </a:p>
           <a:p>
             <a:pPr>
@@ -6450,16 +7911,7 @@
                 </a:solidFill>
                 <a:latin typeface="Lucida Console" pitchFamily="49" charset="0"/>
               </a:rPr>
-              <a:t>Proposed </a:t>
-            </a:r>
-            <a:r>
-              <a:rPr lang="en-US" sz="3600" dirty="0" smtClean="0">
-                <a:solidFill>
-                  <a:schemeClr val="tx1"/>
-                </a:solidFill>
-                <a:latin typeface="Lucida Console" pitchFamily="49" charset="0"/>
-              </a:rPr>
-              <a:t>Solution (2)</a:t>
+              <a:t>Proposed Solution (2)</a:t>
             </a:r>
             <a:endParaRPr lang="en-US" sz="3600" dirty="0">
               <a:solidFill>
@@ -6593,23 +8045,8 @@
               <a:rPr lang="en-US" sz="2800" dirty="0" smtClean="0">
                 <a:latin typeface="Lucida Console" pitchFamily="49" charset="0"/>
               </a:rPr>
-              <a:t>Create a pool of top 15 </a:t>
-            </a:r>
-            <a:r>
-              <a:rPr lang="en-US" sz="2800" dirty="0" smtClean="0">
-                <a:latin typeface="Lucida Console" pitchFamily="49" charset="0"/>
-              </a:rPr>
-              <a:t>players within each playing </a:t>
-            </a:r>
-            <a:r>
-              <a:rPr lang="en-US" sz="2800" dirty="0" smtClean="0">
-                <a:latin typeface="Lucida Console" pitchFamily="49" charset="0"/>
-              </a:rPr>
-              <a:t>positions, in a manner that selection within the group will produce a performance swing of +-2%. </a:t>
-            </a:r>
-            <a:endParaRPr lang="en-US" sz="2800" dirty="0" smtClean="0">
-              <a:latin typeface="Lucida Console" pitchFamily="49" charset="0"/>
-            </a:endParaRPr>
+              <a:t>Create a pool of top 15 players within each playing positions, in a manner that selection within the group will produce a performance swing of +-2%. </a:t>
+            </a:r>
           </a:p>
           <a:p>
             <a:pPr>
@@ -6641,37 +8078,7 @@
               <a:rPr lang="en-US" sz="2800" dirty="0" smtClean="0">
                 <a:latin typeface="Lucida Console" pitchFamily="49" charset="0"/>
               </a:rPr>
-              <a:t>Pool creation gives flexibility to the team </a:t>
-            </a:r>
-            <a:r>
-              <a:rPr lang="en-US" sz="2800" dirty="0" smtClean="0">
-                <a:latin typeface="Lucida Console" pitchFamily="49" charset="0"/>
-              </a:rPr>
-              <a:t>management </a:t>
-            </a:r>
-            <a:r>
-              <a:rPr lang="en-US" sz="2800" dirty="0" smtClean="0">
-                <a:latin typeface="Lucida Console" pitchFamily="49" charset="0"/>
-              </a:rPr>
-              <a:t>to select a player on non quantifiable </a:t>
-            </a:r>
-            <a:r>
-              <a:rPr lang="en-US" sz="2800" dirty="0" smtClean="0">
-                <a:latin typeface="Lucida Console" pitchFamily="49" charset="0"/>
-              </a:rPr>
-              <a:t>parameters, </a:t>
-            </a:r>
-            <a:r>
-              <a:rPr lang="en-US" sz="2800" dirty="0" smtClean="0">
-                <a:latin typeface="Lucida Console" pitchFamily="49" charset="0"/>
-              </a:rPr>
-              <a:t>which include, but not limited to the team budget, coach's personal preference, mental and social health of the </a:t>
-            </a:r>
-            <a:r>
-              <a:rPr lang="en-US" sz="2800" dirty="0" smtClean="0">
-                <a:latin typeface="Lucida Console" pitchFamily="49" charset="0"/>
-              </a:rPr>
-              <a:t>players.</a:t>
+              <a:t>Pool creation gives flexibility to the team management to select a player on non quantifiable parameters, which include, but not limited to the team budget, coach's personal preference, mental and social health of the players.</a:t>
             </a:r>
             <a:endParaRPr lang="en-US" sz="2800" dirty="0" smtClean="0">
               <a:solidFill>
@@ -6981,13 +8388,7 @@
               <a:rPr lang="en-US" sz="1600" dirty="0" smtClean="0">
                 <a:hlinkClick r:id="rId2"/>
               </a:rPr>
-              <a:t>http://stats.nba.com</a:t>
-            </a:r>
-            <a:r>
-              <a:rPr lang="en-US" sz="1600" dirty="0" smtClean="0">
-                <a:hlinkClick r:id="rId2"/>
-              </a:rPr>
-              <a:t>/</a:t>
+              <a:t>http://stats.nba.com/</a:t>
             </a:r>
             <a:r>
               <a:rPr lang="en-US" sz="1600" dirty="0" smtClean="0"/>
@@ -7522,34 +8923,7 @@
                 </a:solidFill>
                 <a:latin typeface="Lucida Console" pitchFamily="49" charset="0"/>
               </a:rPr>
-              <a:t>Method </a:t>
-            </a:r>
-            <a:r>
-              <a:rPr lang="en-US" sz="3600" dirty="0" smtClean="0">
-                <a:solidFill>
-                  <a:schemeClr val="tx1"/>
-                </a:solidFill>
-                <a:latin typeface="Lucida Console" pitchFamily="49" charset="0"/>
-              </a:rPr>
-              <a:t>used </a:t>
-            </a:r>
-            <a:r>
-              <a:rPr lang="en-US" sz="3600" dirty="0" smtClean="0">
-                <a:solidFill>
-                  <a:schemeClr val="tx1"/>
-                </a:solidFill>
-                <a:latin typeface="Lucida Console" pitchFamily="49" charset="0"/>
-              </a:rPr>
-              <a:t>to </a:t>
-            </a:r>
-            <a:r>
-              <a:rPr lang="en-US" sz="3600" dirty="0" smtClean="0">
-                <a:solidFill>
-                  <a:schemeClr val="tx1"/>
-                </a:solidFill>
-                <a:latin typeface="Lucida Console" pitchFamily="49" charset="0"/>
-              </a:rPr>
-              <a:t>build predictive mode</a:t>
+              <a:t>Method used to build predictive mode</a:t>
             </a:r>
             <a:endParaRPr lang="en-US" sz="3600" dirty="0">
               <a:solidFill>
@@ -7683,25 +9057,7 @@
               <a:rPr lang="en-US" sz="2800" dirty="0" smtClean="0">
                 <a:latin typeface="Lucida Console" pitchFamily="49" charset="0"/>
               </a:rPr>
-              <a:t>Data </a:t>
-            </a:r>
-            <a:r>
-              <a:rPr lang="en-US" sz="2800" dirty="0" smtClean="0">
-                <a:latin typeface="Lucida Console" pitchFamily="49" charset="0"/>
-              </a:rPr>
-              <a:t>from different CSV files were merged and grouped </a:t>
-            </a:r>
-            <a:r>
-              <a:rPr lang="en-US" sz="2800" dirty="0" smtClean="0">
-                <a:latin typeface="Lucida Console" pitchFamily="49" charset="0"/>
-              </a:rPr>
-              <a:t>as per the player </a:t>
-            </a:r>
-            <a:r>
-              <a:rPr lang="en-US" sz="2800" dirty="0" smtClean="0">
-                <a:latin typeface="Lucida Console" pitchFamily="49" charset="0"/>
-              </a:rPr>
-              <a:t>positions.</a:t>
+              <a:t>Data from different CSV files were merged and grouped as per the player positions.</a:t>
             </a:r>
           </a:p>
           <a:p>
@@ -7734,13 +9090,7 @@
               <a:rPr lang="en-US" sz="2800" dirty="0" smtClean="0">
                 <a:latin typeface="Lucida Console" pitchFamily="49" charset="0"/>
               </a:rPr>
-              <a:t>All categorical factors were converted to dummy numerical variables to represent each level</a:t>
-            </a:r>
-            <a:r>
-              <a:rPr lang="en-US" sz="2800" dirty="0" smtClean="0">
-                <a:latin typeface="Lucida Console" pitchFamily="49" charset="0"/>
-              </a:rPr>
-              <a:t>.</a:t>
+              <a:t>All categorical factors were converted to dummy numerical variables to represent each level.</a:t>
             </a:r>
           </a:p>
           <a:p>
@@ -7769,25 +9119,7 @@
               <a:rPr lang="en-US" sz="2800" dirty="0" smtClean="0">
                 <a:latin typeface="Lucida Console" pitchFamily="49" charset="0"/>
               </a:rPr>
-              <a:t>Normalization of numerical data is carried out to </a:t>
-            </a:r>
-            <a:r>
-              <a:rPr lang="en-US" sz="2800" dirty="0" smtClean="0">
-                <a:latin typeface="Lucida Console" pitchFamily="49" charset="0"/>
-              </a:rPr>
-              <a:t>exclude </a:t>
-            </a:r>
-            <a:r>
-              <a:rPr lang="en-US" sz="2800" dirty="0" smtClean="0">
-                <a:latin typeface="Lucida Console" pitchFamily="49" charset="0"/>
-              </a:rPr>
-              <a:t>any outlier and any data that has an undue bias to the final </a:t>
-            </a:r>
-            <a:r>
-              <a:rPr lang="en-US" sz="2800" dirty="0" smtClean="0">
-                <a:latin typeface="Lucida Console" pitchFamily="49" charset="0"/>
-              </a:rPr>
-              <a:t>outcome.</a:t>
+              <a:t>Normalization of numerical data is carried out to exclude any outlier and any data that has an undue bias to the final outcome.</a:t>
             </a:r>
             <a:endParaRPr lang="en-US" sz="2800" dirty="0" smtClean="0">
               <a:solidFill>
@@ -7962,16 +9294,7 @@
                 </a:solidFill>
                 <a:latin typeface="Lucida Console" pitchFamily="49" charset="0"/>
               </a:rPr>
-              <a:t>Method used to build predictive </a:t>
-            </a:r>
-            <a:r>
-              <a:rPr lang="en-US" sz="3600" dirty="0" smtClean="0">
-                <a:solidFill>
-                  <a:schemeClr val="tx1"/>
-                </a:solidFill>
-                <a:latin typeface="Lucida Console" pitchFamily="49" charset="0"/>
-              </a:rPr>
-              <a:t>model (2)</a:t>
+              <a:t>Method used to build predictive model (2)</a:t>
             </a:r>
             <a:endParaRPr lang="en-US" sz="3600" dirty="0">
               <a:solidFill>
@@ -8105,65 +9428,20 @@
               <a:rPr lang="en-US" sz="2800" dirty="0" smtClean="0">
                 <a:latin typeface="Lucida Console" pitchFamily="49" charset="0"/>
               </a:rPr>
-              <a:t>Dimensionality </a:t>
+              <a:t>Dimensionality reductionnality of the factors is carried out to  remove multi using </a:t>
+            </a:r>
+            <a:r>
+              <a:rPr lang="en-US" sz="2800" i="1" dirty="0" smtClean="0">
+                <a:latin typeface="Lucida Console" pitchFamily="49" charset="0"/>
+              </a:rPr>
+              <a:t>Principal Component Analysis (PCA)</a:t>
             </a:r>
             <a:r>
               <a:rPr lang="en-US" sz="2800" dirty="0" smtClean="0">
                 <a:latin typeface="Lucida Console" pitchFamily="49" charset="0"/>
               </a:rPr>
-              <a:t>reductionnality</a:t>
-            </a:r>
-            <a:r>
-              <a:rPr lang="en-US" sz="2800" dirty="0" smtClean="0">
-                <a:latin typeface="Lucida Console" pitchFamily="49" charset="0"/>
-              </a:rPr>
-              <a:t> of the factors is carried out to  remove multi </a:t>
-            </a:r>
-            <a:r>
-              <a:rPr lang="en-US" sz="2800" dirty="0" smtClean="0">
-                <a:latin typeface="Lucida Console" pitchFamily="49" charset="0"/>
-              </a:rPr>
-              <a:t>using </a:t>
-            </a:r>
-            <a:r>
-              <a:rPr lang="en-US" sz="2800" i="1" dirty="0" smtClean="0">
-                <a:latin typeface="Lucida Console" pitchFamily="49" charset="0"/>
-              </a:rPr>
-              <a:t>Principal Component </a:t>
-            </a:r>
-            <a:r>
-              <a:rPr lang="en-US" sz="2800" i="1" dirty="0" smtClean="0">
-                <a:latin typeface="Lucida Console" pitchFamily="49" charset="0"/>
-              </a:rPr>
-              <a:t>Analysis (PCA)</a:t>
-            </a:r>
-            <a:r>
-              <a:rPr lang="en-US" sz="2800" dirty="0" smtClean="0">
-                <a:latin typeface="Lucida Console" pitchFamily="49" charset="0"/>
-              </a:rPr>
-              <a:t> </a:t>
-            </a:r>
-            <a:r>
-              <a:rPr lang="en-US" sz="2800" dirty="0" smtClean="0">
-                <a:latin typeface="Lucida Console" pitchFamily="49" charset="0"/>
-              </a:rPr>
-              <a:t>technique. This step brings out the strongly </a:t>
-            </a:r>
-            <a:r>
-              <a:rPr lang="en-US" sz="2800" dirty="0" smtClean="0">
-                <a:latin typeface="Lucida Console" pitchFamily="49" charset="0"/>
-              </a:rPr>
-              <a:t>influencing </a:t>
-            </a:r>
-            <a:r>
-              <a:rPr lang="en-US" sz="2800" dirty="0" smtClean="0">
-                <a:latin typeface="Lucida Console" pitchFamily="49" charset="0"/>
-              </a:rPr>
-              <a:t>factors that affect the PPI.</a:t>
-            </a:r>
-            <a:endParaRPr lang="en-US" sz="2800" dirty="0" smtClean="0">
-              <a:latin typeface="Lucida Console" pitchFamily="49" charset="0"/>
-            </a:endParaRPr>
+              <a:t> technique. This step brings out the strongly influencing factors that affect the PPI.</a:t>
+            </a:r>
           </a:p>
           <a:p>
             <a:endParaRPr lang="en-US" sz="2800" dirty="0" smtClean="0">
@@ -8191,23 +9469,8 @@
               <a:rPr lang="en-US" sz="2800" dirty="0" smtClean="0">
                 <a:latin typeface="Lucida Console" pitchFamily="49" charset="0"/>
               </a:rPr>
-              <a:t>A multiple linear regression model is developed </a:t>
-            </a:r>
-            <a:r>
-              <a:rPr lang="en-US" sz="2800" dirty="0" smtClean="0">
-                <a:latin typeface="Lucida Console" pitchFamily="49" charset="0"/>
-              </a:rPr>
-              <a:t>to determine </a:t>
-            </a:r>
-            <a:r>
-              <a:rPr lang="en-US" sz="2800" dirty="0" smtClean="0">
-                <a:latin typeface="Lucida Console" pitchFamily="49" charset="0"/>
-              </a:rPr>
-              <a:t>the dependent variable, PPI.</a:t>
-            </a:r>
-            <a:endParaRPr lang="en-US" sz="2800" dirty="0" smtClean="0">
-              <a:latin typeface="Lucida Console" pitchFamily="49" charset="0"/>
-            </a:endParaRPr>
+              <a:t>A multiple linear regression model is developed to determine the dependent variable, PPI.</a:t>
+            </a:r>
           </a:p>
           <a:p>
             <a:r>
@@ -8235,25 +9498,7 @@
               <a:rPr lang="en-US" sz="2800" dirty="0" smtClean="0">
                 <a:latin typeface="Lucida Console" pitchFamily="49" charset="0"/>
               </a:rPr>
-              <a:t>Based on PPI ratings a cluster </a:t>
-            </a:r>
-            <a:r>
-              <a:rPr lang="en-US" sz="2800" dirty="0" smtClean="0">
-                <a:latin typeface="Lucida Console" pitchFamily="49" charset="0"/>
-              </a:rPr>
-              <a:t>of similar ranking players is </a:t>
-            </a:r>
-            <a:r>
-              <a:rPr lang="en-US" sz="2800" dirty="0" smtClean="0">
-                <a:latin typeface="Lucida Console" pitchFamily="49" charset="0"/>
-              </a:rPr>
-              <a:t>created for each player </a:t>
-            </a:r>
-            <a:r>
-              <a:rPr lang="en-US" sz="2800" dirty="0" smtClean="0">
-                <a:latin typeface="Lucida Console" pitchFamily="49" charset="0"/>
-              </a:rPr>
-              <a:t>position.</a:t>
+              <a:t>Based on PPI ratings a cluster of similar ranking players is created for each player position.</a:t>
             </a:r>
             <a:endParaRPr lang="en-US" sz="2800" dirty="0" smtClean="0">
               <a:solidFill>
@@ -8428,7 +9673,7 @@
                 </a:solidFill>
                 <a:latin typeface="Lucida Console" pitchFamily="49" charset="0"/>
               </a:rPr>
-              <a:t>The Problem Statement</a:t>
+              <a:t>Multiple Regression Analysis Results</a:t>
             </a:r>
             <a:endParaRPr lang="en-US" sz="3600" dirty="0">
               <a:solidFill>
@@ -8511,6 +9756,966 @@
           </a:p>
         </p:txBody>
       </p:sp>
+      <p:sp>
+        <p:nvSpPr>
+          <p:cNvPr id="8" name="TextBox 7"/>
+          <p:cNvSpPr txBox="1"/>
+          <p:nvPr/>
+        </p:nvSpPr>
+        <p:spPr>
+          <a:xfrm>
+            <a:off x="261258" y="2129245"/>
+            <a:ext cx="10985862" cy="461665"/>
+          </a:xfrm>
+          <a:prstGeom prst="rect">
+            <a:avLst/>
+          </a:prstGeom>
+          <a:noFill/>
+        </p:spPr>
+        <p:txBody>
+          <a:bodyPr wrap="square" rtlCol="0">
+            <a:spAutoFit/>
+          </a:bodyPr>
+          <a:lstStyle/>
+          <a:p>
+            <a:r>
+              <a:rPr lang="en-US" sz="2400" dirty="0" smtClean="0">
+                <a:latin typeface="Lucida Console" pitchFamily="49" charset="0"/>
+              </a:rPr>
+              <a:t> </a:t>
+            </a:r>
+            <a:r>
+              <a:rPr lang="en-US" sz="2400" dirty="0" smtClean="0">
+                <a:solidFill>
+                  <a:srgbClr val="FF0000"/>
+                </a:solidFill>
+                <a:latin typeface="Lucida Console" pitchFamily="49" charset="0"/>
+              </a:rPr>
+              <a:t>For PG							For SG							For SF</a:t>
+            </a:r>
+            <a:endParaRPr lang="en-US" sz="2400" dirty="0">
+              <a:solidFill>
+                <a:srgbClr val="FF0000"/>
+              </a:solidFill>
+              <a:latin typeface="Lucida Console" pitchFamily="49" charset="0"/>
+            </a:endParaRPr>
+          </a:p>
+        </p:txBody>
+      </p:sp>
+      <p:graphicFrame>
+        <p:nvGraphicFramePr>
+          <p:cNvPr id="9" name="Table 8"/>
+          <p:cNvGraphicFramePr>
+            <a:graphicFrameLocks noGrp="1"/>
+          </p:cNvGraphicFramePr>
+          <p:nvPr/>
+        </p:nvGraphicFramePr>
+        <p:xfrm>
+          <a:off x="229323" y="2731346"/>
+          <a:ext cx="2788203" cy="2352040"/>
+        </p:xfrm>
+        <a:graphic>
+          <a:graphicData uri="http://schemas.openxmlformats.org/drawingml/2006/table">
+            <a:tbl>
+              <a:tblPr firstRow="1" bandRow="1">
+                <a:tableStyleId>{5C22544A-7EE6-4342-B048-85BDC9FD1C3A}</a:tableStyleId>
+              </a:tblPr>
+              <a:tblGrid>
+                <a:gridCol w="1734942"/>
+                <a:gridCol w="1053261"/>
+              </a:tblGrid>
+              <a:tr h="370840">
+                <a:tc>
+                  <a:txBody>
+                    <a:bodyPr/>
+                    <a:lstStyle/>
+                    <a:p>
+                      <a:r>
+                        <a:rPr lang="en-US" sz="1600" dirty="0" smtClean="0">
+                          <a:solidFill>
+                            <a:schemeClr val="tx1"/>
+                          </a:solidFill>
+                          <a:latin typeface="Lucida Console" pitchFamily="49" charset="0"/>
+                        </a:rPr>
+                        <a:t>Statistic</a:t>
+                      </a:r>
+                      <a:endParaRPr lang="en-US" sz="1600" dirty="0">
+                        <a:solidFill>
+                          <a:schemeClr val="tx1"/>
+                        </a:solidFill>
+                        <a:latin typeface="Lucida Console" pitchFamily="49" charset="0"/>
+                      </a:endParaRPr>
+                    </a:p>
+                  </a:txBody>
+                  <a:tcPr/>
+                </a:tc>
+                <a:tc>
+                  <a:txBody>
+                    <a:bodyPr/>
+                    <a:lstStyle/>
+                    <a:p>
+                      <a:r>
+                        <a:rPr lang="en-US" sz="1600" dirty="0" smtClean="0">
+                          <a:solidFill>
+                            <a:schemeClr val="tx1"/>
+                          </a:solidFill>
+                          <a:latin typeface="Lucida Console" pitchFamily="49" charset="0"/>
+                        </a:rPr>
+                        <a:t>Value</a:t>
+                      </a:r>
+                      <a:endParaRPr lang="en-US" sz="1600" dirty="0">
+                        <a:solidFill>
+                          <a:schemeClr val="tx1"/>
+                        </a:solidFill>
+                        <a:latin typeface="Lucida Console" pitchFamily="49" charset="0"/>
+                      </a:endParaRPr>
+                    </a:p>
+                  </a:txBody>
+                  <a:tcPr/>
+                </a:tc>
+              </a:tr>
+              <a:tr h="370840">
+                <a:tc>
+                  <a:txBody>
+                    <a:bodyPr/>
+                    <a:lstStyle/>
+                    <a:p>
+                      <a:r>
+                        <a:rPr lang="en-US" sz="1600" dirty="0" smtClean="0">
+                          <a:latin typeface="Lucida Console" pitchFamily="49" charset="0"/>
+                        </a:rPr>
+                        <a:t>Residual standard error</a:t>
+                      </a:r>
+                      <a:endParaRPr lang="en-US" sz="1600" dirty="0">
+                        <a:latin typeface="Lucida Console" pitchFamily="49" charset="0"/>
+                      </a:endParaRPr>
+                    </a:p>
+                  </a:txBody>
+                  <a:tcPr/>
+                </a:tc>
+                <a:tc>
+                  <a:txBody>
+                    <a:bodyPr/>
+                    <a:lstStyle/>
+                    <a:p>
+                      <a:r>
+                        <a:rPr lang="en-US" sz="1600" dirty="0" smtClean="0">
+                          <a:latin typeface="Lucida Console" pitchFamily="49" charset="0"/>
+                        </a:rPr>
+                        <a:t>0.07059</a:t>
+                      </a:r>
+                      <a:endParaRPr lang="en-US" sz="1600" dirty="0">
+                        <a:latin typeface="Lucida Console" pitchFamily="49" charset="0"/>
+                      </a:endParaRPr>
+                    </a:p>
+                  </a:txBody>
+                  <a:tcPr/>
+                </a:tc>
+              </a:tr>
+              <a:tr h="370840">
+                <a:tc>
+                  <a:txBody>
+                    <a:bodyPr/>
+                    <a:lstStyle/>
+                    <a:p>
+                      <a:r>
+                        <a:rPr lang="en-US" sz="1600" dirty="0" smtClean="0">
+                          <a:latin typeface="Lucida Console" pitchFamily="49" charset="0"/>
+                        </a:rPr>
+                        <a:t>Multiple R-squared</a:t>
+                      </a:r>
+                      <a:endParaRPr lang="en-US" sz="1600" dirty="0">
+                        <a:latin typeface="Lucida Console" pitchFamily="49" charset="0"/>
+                      </a:endParaRPr>
+                    </a:p>
+                  </a:txBody>
+                  <a:tcPr/>
+                </a:tc>
+                <a:tc>
+                  <a:txBody>
+                    <a:bodyPr/>
+                    <a:lstStyle/>
+                    <a:p>
+                      <a:r>
+                        <a:rPr lang="en-US" sz="1600" dirty="0" smtClean="0">
+                          <a:latin typeface="Lucida Console" pitchFamily="49" charset="0"/>
+                        </a:rPr>
+                        <a:t>0.9984</a:t>
+                      </a:r>
+                      <a:endParaRPr lang="en-US" sz="1600" dirty="0">
+                        <a:latin typeface="Lucida Console" pitchFamily="49" charset="0"/>
+                      </a:endParaRPr>
+                    </a:p>
+                  </a:txBody>
+                  <a:tcPr/>
+                </a:tc>
+              </a:tr>
+              <a:tr h="370840">
+                <a:tc>
+                  <a:txBody>
+                    <a:bodyPr/>
+                    <a:lstStyle/>
+                    <a:p>
+                      <a:r>
+                        <a:rPr lang="en-US" sz="1600" dirty="0" smtClean="0">
+                          <a:latin typeface="Lucida Console" pitchFamily="49" charset="0"/>
+                        </a:rPr>
+                        <a:t>Adjusted R-squared</a:t>
+                      </a:r>
+                      <a:endParaRPr lang="en-US" sz="1600" dirty="0">
+                        <a:latin typeface="Lucida Console" pitchFamily="49" charset="0"/>
+                      </a:endParaRPr>
+                    </a:p>
+                  </a:txBody>
+                  <a:tcPr/>
+                </a:tc>
+                <a:tc>
+                  <a:txBody>
+                    <a:bodyPr/>
+                    <a:lstStyle/>
+                    <a:p>
+                      <a:r>
+                        <a:rPr lang="en-US" sz="1600" dirty="0" smtClean="0">
+                          <a:latin typeface="Lucida Console" pitchFamily="49" charset="0"/>
+                        </a:rPr>
+                        <a:t>0.9983</a:t>
+                      </a:r>
+                      <a:endParaRPr lang="en-US" sz="1600" dirty="0">
+                        <a:latin typeface="Lucida Console" pitchFamily="49" charset="0"/>
+                      </a:endParaRPr>
+                    </a:p>
+                  </a:txBody>
+                  <a:tcPr/>
+                </a:tc>
+              </a:tr>
+            </a:tbl>
+          </a:graphicData>
+        </a:graphic>
+      </p:graphicFrame>
+      <p:sp>
+        <p:nvSpPr>
+          <p:cNvPr id="11" name="TextBox 10"/>
+          <p:cNvSpPr txBox="1"/>
+          <p:nvPr/>
+        </p:nvSpPr>
+        <p:spPr>
+          <a:xfrm>
+            <a:off x="574766" y="1254034"/>
+            <a:ext cx="8530045" cy="707886"/>
+          </a:xfrm>
+          <a:prstGeom prst="rect">
+            <a:avLst/>
+          </a:prstGeom>
+          <a:noFill/>
+        </p:spPr>
+        <p:txBody>
+          <a:bodyPr wrap="square" rtlCol="0">
+            <a:spAutoFit/>
+          </a:bodyPr>
+          <a:lstStyle/>
+          <a:p>
+            <a:r>
+              <a:rPr lang="en-US" sz="2000" dirty="0" smtClean="0">
+                <a:latin typeface="Lucida Console" pitchFamily="49" charset="0"/>
+              </a:rPr>
+              <a:t>For acceptance of the Regression model Multiple R^2 and Adjusted R^2 &gt; 0.6</a:t>
+            </a:r>
+            <a:endParaRPr lang="en-US" sz="2000" dirty="0">
+              <a:latin typeface="Lucida Console" pitchFamily="49" charset="0"/>
+            </a:endParaRPr>
+          </a:p>
+        </p:txBody>
+      </p:sp>
+      <p:graphicFrame>
+        <p:nvGraphicFramePr>
+          <p:cNvPr id="12" name="Table 11"/>
+          <p:cNvGraphicFramePr>
+            <a:graphicFrameLocks noGrp="1"/>
+          </p:cNvGraphicFramePr>
+          <p:nvPr/>
+        </p:nvGraphicFramePr>
+        <p:xfrm>
+          <a:off x="4235268" y="2726991"/>
+          <a:ext cx="2788203" cy="2352040"/>
+        </p:xfrm>
+        <a:graphic>
+          <a:graphicData uri="http://schemas.openxmlformats.org/drawingml/2006/table">
+            <a:tbl>
+              <a:tblPr firstRow="1" bandRow="1">
+                <a:tableStyleId>{5C22544A-7EE6-4342-B048-85BDC9FD1C3A}</a:tableStyleId>
+              </a:tblPr>
+              <a:tblGrid>
+                <a:gridCol w="1734942"/>
+                <a:gridCol w="1053261"/>
+              </a:tblGrid>
+              <a:tr h="370840">
+                <a:tc>
+                  <a:txBody>
+                    <a:bodyPr/>
+                    <a:lstStyle/>
+                    <a:p>
+                      <a:r>
+                        <a:rPr lang="en-US" sz="1600" dirty="0" smtClean="0">
+                          <a:solidFill>
+                            <a:schemeClr val="tx1"/>
+                          </a:solidFill>
+                          <a:latin typeface="Lucida Console" pitchFamily="49" charset="0"/>
+                        </a:rPr>
+                        <a:t>Statistic</a:t>
+                      </a:r>
+                      <a:endParaRPr lang="en-US" sz="1600" dirty="0">
+                        <a:solidFill>
+                          <a:schemeClr val="tx1"/>
+                        </a:solidFill>
+                        <a:latin typeface="Lucida Console" pitchFamily="49" charset="0"/>
+                      </a:endParaRPr>
+                    </a:p>
+                  </a:txBody>
+                  <a:tcPr/>
+                </a:tc>
+                <a:tc>
+                  <a:txBody>
+                    <a:bodyPr/>
+                    <a:lstStyle/>
+                    <a:p>
+                      <a:r>
+                        <a:rPr lang="en-US" sz="1600" dirty="0" smtClean="0">
+                          <a:solidFill>
+                            <a:schemeClr val="tx1"/>
+                          </a:solidFill>
+                          <a:latin typeface="Lucida Console" pitchFamily="49" charset="0"/>
+                        </a:rPr>
+                        <a:t>Value</a:t>
+                      </a:r>
+                      <a:endParaRPr lang="en-US" sz="1600" dirty="0">
+                        <a:solidFill>
+                          <a:schemeClr val="tx1"/>
+                        </a:solidFill>
+                        <a:latin typeface="Lucida Console" pitchFamily="49" charset="0"/>
+                      </a:endParaRPr>
+                    </a:p>
+                  </a:txBody>
+                  <a:tcPr/>
+                </a:tc>
+              </a:tr>
+              <a:tr h="370840">
+                <a:tc>
+                  <a:txBody>
+                    <a:bodyPr/>
+                    <a:lstStyle/>
+                    <a:p>
+                      <a:r>
+                        <a:rPr lang="en-US" sz="1600" dirty="0" smtClean="0">
+                          <a:latin typeface="Lucida Console" pitchFamily="49" charset="0"/>
+                        </a:rPr>
+                        <a:t>Residual standard error</a:t>
+                      </a:r>
+                      <a:endParaRPr lang="en-US" sz="1600" dirty="0">
+                        <a:latin typeface="Lucida Console" pitchFamily="49" charset="0"/>
+                      </a:endParaRPr>
+                    </a:p>
+                  </a:txBody>
+                  <a:tcPr/>
+                </a:tc>
+                <a:tc>
+                  <a:txBody>
+                    <a:bodyPr/>
+                    <a:lstStyle/>
+                    <a:p>
+                      <a:r>
+                        <a:rPr lang="en-US" sz="1600" dirty="0" smtClean="0">
+                          <a:latin typeface="Lucida Console" pitchFamily="49" charset="0"/>
+                        </a:rPr>
+                        <a:t>0.08029</a:t>
+                      </a:r>
+                      <a:endParaRPr lang="en-US" sz="1600" dirty="0">
+                        <a:latin typeface="Lucida Console" pitchFamily="49" charset="0"/>
+                      </a:endParaRPr>
+                    </a:p>
+                  </a:txBody>
+                  <a:tcPr/>
+                </a:tc>
+              </a:tr>
+              <a:tr h="370840">
+                <a:tc>
+                  <a:txBody>
+                    <a:bodyPr/>
+                    <a:lstStyle/>
+                    <a:p>
+                      <a:r>
+                        <a:rPr lang="en-US" sz="1600" dirty="0" smtClean="0">
+                          <a:latin typeface="Lucida Console" pitchFamily="49" charset="0"/>
+                        </a:rPr>
+                        <a:t>Multiple R-squared</a:t>
+                      </a:r>
+                      <a:endParaRPr lang="en-US" sz="1600" dirty="0">
+                        <a:latin typeface="Lucida Console" pitchFamily="49" charset="0"/>
+                      </a:endParaRPr>
+                    </a:p>
+                  </a:txBody>
+                  <a:tcPr/>
+                </a:tc>
+                <a:tc>
+                  <a:txBody>
+                    <a:bodyPr/>
+                    <a:lstStyle/>
+                    <a:p>
+                      <a:r>
+                        <a:rPr lang="en-US" sz="1600" dirty="0" smtClean="0">
+                          <a:latin typeface="Lucida Console" pitchFamily="49" charset="0"/>
+                        </a:rPr>
+                        <a:t>0.9732</a:t>
+                      </a:r>
+                      <a:endParaRPr lang="en-US" sz="1600" dirty="0">
+                        <a:latin typeface="Lucida Console" pitchFamily="49" charset="0"/>
+                      </a:endParaRPr>
+                    </a:p>
+                  </a:txBody>
+                  <a:tcPr/>
+                </a:tc>
+              </a:tr>
+              <a:tr h="370840">
+                <a:tc>
+                  <a:txBody>
+                    <a:bodyPr/>
+                    <a:lstStyle/>
+                    <a:p>
+                      <a:r>
+                        <a:rPr lang="en-US" sz="1600" dirty="0" smtClean="0">
+                          <a:latin typeface="Lucida Console" pitchFamily="49" charset="0"/>
+                        </a:rPr>
+                        <a:t>Adjusted R-squared</a:t>
+                      </a:r>
+                      <a:endParaRPr lang="en-US" sz="1600" dirty="0">
+                        <a:latin typeface="Lucida Console" pitchFamily="49" charset="0"/>
+                      </a:endParaRPr>
+                    </a:p>
+                  </a:txBody>
+                  <a:tcPr/>
+                </a:tc>
+                <a:tc>
+                  <a:txBody>
+                    <a:bodyPr/>
+                    <a:lstStyle/>
+                    <a:p>
+                      <a:r>
+                        <a:rPr lang="en-US" sz="1600" dirty="0" smtClean="0">
+                          <a:latin typeface="Lucida Console" pitchFamily="49" charset="0"/>
+                        </a:rPr>
+                        <a:t>0.9731</a:t>
+                      </a:r>
+                      <a:endParaRPr lang="en-US" sz="1600" dirty="0">
+                        <a:latin typeface="Lucida Console" pitchFamily="49" charset="0"/>
+                      </a:endParaRPr>
+                    </a:p>
+                  </a:txBody>
+                  <a:tcPr/>
+                </a:tc>
+              </a:tr>
+            </a:tbl>
+          </a:graphicData>
+        </a:graphic>
+      </p:graphicFrame>
+      <p:graphicFrame>
+        <p:nvGraphicFramePr>
+          <p:cNvPr id="13" name="Table 12"/>
+          <p:cNvGraphicFramePr>
+            <a:graphicFrameLocks noGrp="1"/>
+          </p:cNvGraphicFramePr>
+          <p:nvPr/>
+        </p:nvGraphicFramePr>
+        <p:xfrm>
+          <a:off x="8454569" y="2648615"/>
+          <a:ext cx="2788203" cy="2352040"/>
+        </p:xfrm>
+        <a:graphic>
+          <a:graphicData uri="http://schemas.openxmlformats.org/drawingml/2006/table">
+            <a:tbl>
+              <a:tblPr firstRow="1" bandRow="1">
+                <a:tableStyleId>{5C22544A-7EE6-4342-B048-85BDC9FD1C3A}</a:tableStyleId>
+              </a:tblPr>
+              <a:tblGrid>
+                <a:gridCol w="1734942"/>
+                <a:gridCol w="1053261"/>
+              </a:tblGrid>
+              <a:tr h="370840">
+                <a:tc>
+                  <a:txBody>
+                    <a:bodyPr/>
+                    <a:lstStyle/>
+                    <a:p>
+                      <a:r>
+                        <a:rPr lang="en-US" sz="1600" dirty="0" smtClean="0">
+                          <a:solidFill>
+                            <a:schemeClr val="tx1"/>
+                          </a:solidFill>
+                          <a:latin typeface="Lucida Console" pitchFamily="49" charset="0"/>
+                        </a:rPr>
+                        <a:t>Statistic</a:t>
+                      </a:r>
+                      <a:endParaRPr lang="en-US" sz="1600" dirty="0">
+                        <a:solidFill>
+                          <a:schemeClr val="tx1"/>
+                        </a:solidFill>
+                        <a:latin typeface="Lucida Console" pitchFamily="49" charset="0"/>
+                      </a:endParaRPr>
+                    </a:p>
+                  </a:txBody>
+                  <a:tcPr/>
+                </a:tc>
+                <a:tc>
+                  <a:txBody>
+                    <a:bodyPr/>
+                    <a:lstStyle/>
+                    <a:p>
+                      <a:r>
+                        <a:rPr lang="en-US" sz="1600" dirty="0" smtClean="0">
+                          <a:solidFill>
+                            <a:schemeClr val="tx1"/>
+                          </a:solidFill>
+                          <a:latin typeface="Lucida Console" pitchFamily="49" charset="0"/>
+                        </a:rPr>
+                        <a:t>Value</a:t>
+                      </a:r>
+                      <a:endParaRPr lang="en-US" sz="1600" dirty="0">
+                        <a:solidFill>
+                          <a:schemeClr val="tx1"/>
+                        </a:solidFill>
+                        <a:latin typeface="Lucida Console" pitchFamily="49" charset="0"/>
+                      </a:endParaRPr>
+                    </a:p>
+                  </a:txBody>
+                  <a:tcPr/>
+                </a:tc>
+              </a:tr>
+              <a:tr h="370840">
+                <a:tc>
+                  <a:txBody>
+                    <a:bodyPr/>
+                    <a:lstStyle/>
+                    <a:p>
+                      <a:r>
+                        <a:rPr lang="en-US" sz="1600" dirty="0" smtClean="0">
+                          <a:latin typeface="Lucida Console" pitchFamily="49" charset="0"/>
+                        </a:rPr>
+                        <a:t>Residual standard error</a:t>
+                      </a:r>
+                      <a:endParaRPr lang="en-US" sz="1600" dirty="0">
+                        <a:latin typeface="Lucida Console" pitchFamily="49" charset="0"/>
+                      </a:endParaRPr>
+                    </a:p>
+                  </a:txBody>
+                  <a:tcPr/>
+                </a:tc>
+                <a:tc>
+                  <a:txBody>
+                    <a:bodyPr/>
+                    <a:lstStyle/>
+                    <a:p>
+                      <a:r>
+                        <a:rPr lang="en-US" sz="1600" dirty="0" smtClean="0">
+                          <a:latin typeface="Lucida Console" pitchFamily="49" charset="0"/>
+                        </a:rPr>
+                        <a:t>0.0854</a:t>
+                      </a:r>
+                      <a:endParaRPr lang="en-US" sz="1600" dirty="0">
+                        <a:latin typeface="Lucida Console" pitchFamily="49" charset="0"/>
+                      </a:endParaRPr>
+                    </a:p>
+                  </a:txBody>
+                  <a:tcPr/>
+                </a:tc>
+              </a:tr>
+              <a:tr h="370840">
+                <a:tc>
+                  <a:txBody>
+                    <a:bodyPr/>
+                    <a:lstStyle/>
+                    <a:p>
+                      <a:r>
+                        <a:rPr lang="en-US" sz="1600" dirty="0" smtClean="0">
+                          <a:latin typeface="Lucida Console" pitchFamily="49" charset="0"/>
+                        </a:rPr>
+                        <a:t>Multiple R-squared</a:t>
+                      </a:r>
+                      <a:endParaRPr lang="en-US" sz="1600" dirty="0">
+                        <a:latin typeface="Lucida Console" pitchFamily="49" charset="0"/>
+                      </a:endParaRPr>
+                    </a:p>
+                  </a:txBody>
+                  <a:tcPr/>
+                </a:tc>
+                <a:tc>
+                  <a:txBody>
+                    <a:bodyPr/>
+                    <a:lstStyle/>
+                    <a:p>
+                      <a:r>
+                        <a:rPr lang="en-US" sz="1600" dirty="0" smtClean="0">
+                          <a:latin typeface="Lucida Console" pitchFamily="49" charset="0"/>
+                        </a:rPr>
+                        <a:t>0.9612</a:t>
+                      </a:r>
+                      <a:endParaRPr lang="en-US" sz="1600" dirty="0">
+                        <a:latin typeface="Lucida Console" pitchFamily="49" charset="0"/>
+                      </a:endParaRPr>
+                    </a:p>
+                  </a:txBody>
+                  <a:tcPr/>
+                </a:tc>
+              </a:tr>
+              <a:tr h="370840">
+                <a:tc>
+                  <a:txBody>
+                    <a:bodyPr/>
+                    <a:lstStyle/>
+                    <a:p>
+                      <a:r>
+                        <a:rPr lang="en-US" sz="1600" dirty="0" smtClean="0">
+                          <a:latin typeface="Lucida Console" pitchFamily="49" charset="0"/>
+                        </a:rPr>
+                        <a:t>Adjusted R-squared</a:t>
+                      </a:r>
+                      <a:endParaRPr lang="en-US" sz="1600" dirty="0">
+                        <a:latin typeface="Lucida Console" pitchFamily="49" charset="0"/>
+                      </a:endParaRPr>
+                    </a:p>
+                  </a:txBody>
+                  <a:tcPr/>
+                </a:tc>
+                <a:tc>
+                  <a:txBody>
+                    <a:bodyPr/>
+                    <a:lstStyle/>
+                    <a:p>
+                      <a:r>
+                        <a:rPr lang="en-US" sz="1600" dirty="0" smtClean="0">
+                          <a:latin typeface="Lucida Console" pitchFamily="49" charset="0"/>
+                        </a:rPr>
+                        <a:t>0.9674</a:t>
+                      </a:r>
+                      <a:endParaRPr lang="en-US" sz="1600" dirty="0">
+                        <a:latin typeface="Lucida Console" pitchFamily="49" charset="0"/>
+                      </a:endParaRPr>
+                    </a:p>
+                  </a:txBody>
+                  <a:tcPr/>
+                </a:tc>
+              </a:tr>
+            </a:tbl>
+          </a:graphicData>
+        </a:graphic>
+      </p:graphicFrame>
+      <p:sp>
+        <p:nvSpPr>
+          <p:cNvPr id="15" name="Rounded Rectangle 14"/>
+          <p:cNvSpPr/>
+          <p:nvPr/>
+        </p:nvSpPr>
+        <p:spPr>
+          <a:xfrm>
+            <a:off x="1998617" y="3892731"/>
+            <a:ext cx="966651" cy="1149532"/>
+          </a:xfrm>
+          <a:prstGeom prst="roundRect">
+            <a:avLst/>
+          </a:prstGeom>
+          <a:noFill/>
+          <a:ln w="31750">
+            <a:solidFill>
+              <a:srgbClr val="FF0000"/>
+            </a:solidFill>
+          </a:ln>
+        </p:spPr>
+        <p:style>
+          <a:lnRef idx="2">
+            <a:schemeClr val="accent1">
+              <a:shade val="50000"/>
+            </a:schemeClr>
+          </a:lnRef>
+          <a:fillRef idx="1">
+            <a:schemeClr val="accent1"/>
+          </a:fillRef>
+          <a:effectRef idx="0">
+            <a:schemeClr val="accent1"/>
+          </a:effectRef>
+          <a:fontRef idx="minor">
+            <a:schemeClr val="lt1"/>
+          </a:fontRef>
+        </p:style>
+        <p:txBody>
+          <a:bodyPr rtlCol="0" anchor="ctr"/>
+          <a:lstStyle/>
+          <a:p>
+            <a:pPr algn="ctr"/>
+            <a:endParaRPr lang="en-US" dirty="0"/>
+          </a:p>
+        </p:txBody>
+      </p:sp>
+      <p:sp>
+        <p:nvSpPr>
+          <p:cNvPr id="16" name="Rounded Rectangle 15"/>
+          <p:cNvSpPr/>
+          <p:nvPr/>
+        </p:nvSpPr>
+        <p:spPr>
+          <a:xfrm>
+            <a:off x="6004560" y="3888376"/>
+            <a:ext cx="966651" cy="1149532"/>
+          </a:xfrm>
+          <a:prstGeom prst="roundRect">
+            <a:avLst/>
+          </a:prstGeom>
+          <a:noFill/>
+          <a:ln w="31750">
+            <a:solidFill>
+              <a:srgbClr val="FF0000"/>
+            </a:solidFill>
+          </a:ln>
+        </p:spPr>
+        <p:style>
+          <a:lnRef idx="2">
+            <a:schemeClr val="accent1">
+              <a:shade val="50000"/>
+            </a:schemeClr>
+          </a:lnRef>
+          <a:fillRef idx="1">
+            <a:schemeClr val="accent1"/>
+          </a:fillRef>
+          <a:effectRef idx="0">
+            <a:schemeClr val="accent1"/>
+          </a:effectRef>
+          <a:fontRef idx="minor">
+            <a:schemeClr val="lt1"/>
+          </a:fontRef>
+        </p:style>
+        <p:txBody>
+          <a:bodyPr rtlCol="0" anchor="ctr"/>
+          <a:lstStyle/>
+          <a:p>
+            <a:pPr algn="ctr"/>
+            <a:endParaRPr lang="en-US" dirty="0"/>
+          </a:p>
+        </p:txBody>
+      </p:sp>
+      <p:sp>
+        <p:nvSpPr>
+          <p:cNvPr id="17" name="Rounded Rectangle 16"/>
+          <p:cNvSpPr/>
+          <p:nvPr/>
+        </p:nvSpPr>
+        <p:spPr>
+          <a:xfrm>
+            <a:off x="10245634" y="3818708"/>
+            <a:ext cx="966651" cy="1149532"/>
+          </a:xfrm>
+          <a:prstGeom prst="roundRect">
+            <a:avLst/>
+          </a:prstGeom>
+          <a:noFill/>
+          <a:ln w="31750">
+            <a:solidFill>
+              <a:srgbClr val="FF0000"/>
+            </a:solidFill>
+          </a:ln>
+        </p:spPr>
+        <p:style>
+          <a:lnRef idx="2">
+            <a:schemeClr val="accent1">
+              <a:shade val="50000"/>
+            </a:schemeClr>
+          </a:lnRef>
+          <a:fillRef idx="1">
+            <a:schemeClr val="accent1"/>
+          </a:fillRef>
+          <a:effectRef idx="0">
+            <a:schemeClr val="accent1"/>
+          </a:effectRef>
+          <a:fontRef idx="minor">
+            <a:schemeClr val="lt1"/>
+          </a:fontRef>
+        </p:style>
+        <p:txBody>
+          <a:bodyPr rtlCol="0" anchor="ctr"/>
+          <a:lstStyle/>
+          <a:p>
+            <a:pPr algn="ctr"/>
+            <a:endParaRPr lang="en-US" dirty="0"/>
+          </a:p>
+        </p:txBody>
+      </p:sp>
+      <p:sp>
+        <p:nvSpPr>
+          <p:cNvPr id="18" name="Rounded Rectangle 17"/>
+          <p:cNvSpPr/>
+          <p:nvPr/>
+        </p:nvSpPr>
+        <p:spPr>
+          <a:xfrm>
+            <a:off x="4349931" y="5381898"/>
+            <a:ext cx="2756263" cy="862148"/>
+          </a:xfrm>
+          <a:prstGeom prst="roundRect">
+            <a:avLst/>
+          </a:prstGeom>
+          <a:noFill/>
+          <a:ln w="31750">
+            <a:solidFill>
+              <a:srgbClr val="FF0000"/>
+            </a:solidFill>
+          </a:ln>
+        </p:spPr>
+        <p:style>
+          <a:lnRef idx="2">
+            <a:schemeClr val="accent1">
+              <a:shade val="50000"/>
+            </a:schemeClr>
+          </a:lnRef>
+          <a:fillRef idx="1">
+            <a:schemeClr val="accent1"/>
+          </a:fillRef>
+          <a:effectRef idx="0">
+            <a:schemeClr val="accent1"/>
+          </a:effectRef>
+          <a:fontRef idx="minor">
+            <a:schemeClr val="lt1"/>
+          </a:fontRef>
+        </p:style>
+        <p:txBody>
+          <a:bodyPr rtlCol="0" anchor="ctr"/>
+          <a:lstStyle/>
+          <a:p>
+            <a:pPr algn="ctr"/>
+            <a:r>
+              <a:rPr lang="en-US" dirty="0" smtClean="0">
+                <a:solidFill>
+                  <a:schemeClr val="tx1"/>
+                </a:solidFill>
+                <a:latin typeface="Lucida Console" pitchFamily="49" charset="0"/>
+              </a:rPr>
+              <a:t>Model satisfies the regression criterion</a:t>
+            </a:r>
+            <a:endParaRPr lang="en-US" dirty="0">
+              <a:solidFill>
+                <a:schemeClr val="tx1"/>
+              </a:solidFill>
+              <a:latin typeface="Lucida Console" pitchFamily="49" charset="0"/>
+            </a:endParaRPr>
+          </a:p>
+        </p:txBody>
+      </p:sp>
+      <p:cxnSp>
+        <p:nvCxnSpPr>
+          <p:cNvPr id="19" name="Straight Arrow Connector 18"/>
+          <p:cNvCxnSpPr>
+            <a:endCxn id="18" idx="3"/>
+          </p:cNvCxnSpPr>
+          <p:nvPr/>
+        </p:nvCxnSpPr>
+        <p:spPr>
+          <a:xfrm rot="10800000" flipV="1">
+            <a:off x="7106194" y="4920342"/>
+            <a:ext cx="3196048" cy="892630"/>
+          </a:xfrm>
+          <a:prstGeom prst="straightConnector1">
+            <a:avLst/>
+          </a:prstGeom>
+          <a:ln w="31750">
+            <a:solidFill>
+              <a:srgbClr val="FF0000"/>
+            </a:solidFill>
+            <a:tailEnd type="arrow"/>
+          </a:ln>
+        </p:spPr>
+        <p:style>
+          <a:lnRef idx="1">
+            <a:schemeClr val="accent1"/>
+          </a:lnRef>
+          <a:fillRef idx="0">
+            <a:schemeClr val="accent1"/>
+          </a:fillRef>
+          <a:effectRef idx="0">
+            <a:schemeClr val="accent1"/>
+          </a:effectRef>
+          <a:fontRef idx="minor">
+            <a:schemeClr val="tx1"/>
+          </a:fontRef>
+        </p:style>
+      </p:cxnSp>
+      <p:cxnSp>
+        <p:nvCxnSpPr>
+          <p:cNvPr id="21" name="Straight Arrow Connector 20"/>
+          <p:cNvCxnSpPr>
+            <a:stCxn id="16" idx="2"/>
+          </p:cNvCxnSpPr>
+          <p:nvPr/>
+        </p:nvCxnSpPr>
+        <p:spPr>
+          <a:xfrm rot="16200000" flipH="1">
+            <a:off x="6311537" y="5214256"/>
+            <a:ext cx="357055" cy="4357"/>
+          </a:xfrm>
+          <a:prstGeom prst="straightConnector1">
+            <a:avLst/>
+          </a:prstGeom>
+          <a:ln w="31750">
+            <a:solidFill>
+              <a:srgbClr val="FF0000"/>
+            </a:solidFill>
+            <a:tailEnd type="arrow"/>
+          </a:ln>
+        </p:spPr>
+        <p:style>
+          <a:lnRef idx="1">
+            <a:schemeClr val="accent1"/>
+          </a:lnRef>
+          <a:fillRef idx="0">
+            <a:schemeClr val="accent1"/>
+          </a:fillRef>
+          <a:effectRef idx="0">
+            <a:schemeClr val="accent1"/>
+          </a:effectRef>
+          <a:fontRef idx="minor">
+            <a:schemeClr val="tx1"/>
+          </a:fontRef>
+        </p:style>
+      </p:cxnSp>
+      <p:cxnSp>
+        <p:nvCxnSpPr>
+          <p:cNvPr id="38" name="Straight Arrow Connector 37"/>
+          <p:cNvCxnSpPr/>
+          <p:nvPr/>
+        </p:nvCxnSpPr>
+        <p:spPr>
+          <a:xfrm>
+            <a:off x="2939143" y="5003074"/>
+            <a:ext cx="1436914" cy="457200"/>
+          </a:xfrm>
+          <a:prstGeom prst="straightConnector1">
+            <a:avLst/>
+          </a:prstGeom>
+          <a:ln w="31750">
+            <a:solidFill>
+              <a:srgbClr val="FF0000"/>
+            </a:solidFill>
+            <a:tailEnd type="arrow"/>
+          </a:ln>
+        </p:spPr>
+        <p:style>
+          <a:lnRef idx="1">
+            <a:schemeClr val="accent1"/>
+          </a:lnRef>
+          <a:fillRef idx="0">
+            <a:schemeClr val="accent1"/>
+          </a:fillRef>
+          <a:effectRef idx="0">
+            <a:schemeClr val="accent1"/>
+          </a:effectRef>
+          <a:fontRef idx="minor">
+            <a:schemeClr val="tx1"/>
+          </a:fontRef>
+        </p:style>
+      </p:cxnSp>
     </p:spTree>
   </p:cSld>
   <p:clrMapOvr>
@@ -8639,7 +10844,7 @@
         </p:spPr>
         <p:txBody>
           <a:bodyPr>
-            <a:normAutofit/>
+            <a:normAutofit fontScale="90000"/>
           </a:bodyPr>
           <a:lstStyle/>
           <a:p>
@@ -8651,7 +10856,16 @@
                 </a:solidFill>
                 <a:latin typeface="Lucida Console" pitchFamily="49" charset="0"/>
               </a:rPr>
-              <a:t>The Problem Statement</a:t>
+              <a:t>Multiple Regression Analysis </a:t>
+            </a:r>
+            <a:r>
+              <a:rPr lang="en-US" sz="3600" dirty="0" smtClean="0">
+                <a:solidFill>
+                  <a:schemeClr val="tx1"/>
+                </a:solidFill>
+                <a:latin typeface="Lucida Console" pitchFamily="49" charset="0"/>
+              </a:rPr>
+              <a:t>Results (2)</a:t>
             </a:r>
             <a:endParaRPr lang="en-US" sz="3600" dirty="0">
               <a:solidFill>
@@ -8734,6 +10948,731 @@
           </a:p>
         </p:txBody>
       </p:sp>
+      <p:sp>
+        <p:nvSpPr>
+          <p:cNvPr id="6" name="TextBox 5"/>
+          <p:cNvSpPr txBox="1"/>
+          <p:nvPr/>
+        </p:nvSpPr>
+        <p:spPr>
+          <a:xfrm>
+            <a:off x="418012" y="1110342"/>
+            <a:ext cx="10985862" cy="461665"/>
+          </a:xfrm>
+          <a:prstGeom prst="rect">
+            <a:avLst/>
+          </a:prstGeom>
+          <a:noFill/>
+        </p:spPr>
+        <p:txBody>
+          <a:bodyPr wrap="square" rtlCol="0">
+            <a:spAutoFit/>
+          </a:bodyPr>
+          <a:lstStyle/>
+          <a:p>
+            <a:r>
+              <a:rPr lang="en-US" sz="2400" dirty="0" smtClean="0">
+                <a:latin typeface="Lucida Console" pitchFamily="49" charset="0"/>
+              </a:rPr>
+              <a:t> </a:t>
+            </a:r>
+            <a:r>
+              <a:rPr lang="en-US" sz="2400" dirty="0" smtClean="0">
+                <a:solidFill>
+                  <a:srgbClr val="FF0000"/>
+                </a:solidFill>
+                <a:latin typeface="Lucida Console" pitchFamily="49" charset="0"/>
+              </a:rPr>
+              <a:t>For PF </a:t>
+            </a:r>
+            <a:r>
+              <a:rPr lang="en-US" sz="2400" dirty="0" smtClean="0">
+                <a:solidFill>
+                  <a:srgbClr val="FF0000"/>
+                </a:solidFill>
+                <a:latin typeface="Lucida Console" pitchFamily="49" charset="0"/>
+              </a:rPr>
+              <a:t>						For C</a:t>
+            </a:r>
+            <a:endParaRPr lang="en-US" sz="2400" dirty="0">
+              <a:solidFill>
+                <a:srgbClr val="FF0000"/>
+              </a:solidFill>
+              <a:latin typeface="Lucida Console" pitchFamily="49" charset="0"/>
+            </a:endParaRPr>
+          </a:p>
+        </p:txBody>
+      </p:sp>
+      <p:graphicFrame>
+        <p:nvGraphicFramePr>
+          <p:cNvPr id="8" name="Table 7"/>
+          <p:cNvGraphicFramePr>
+            <a:graphicFrameLocks noGrp="1"/>
+          </p:cNvGraphicFramePr>
+          <p:nvPr/>
+        </p:nvGraphicFramePr>
+        <p:xfrm>
+          <a:off x="477518" y="1816946"/>
+          <a:ext cx="2788203" cy="2352040"/>
+        </p:xfrm>
+        <a:graphic>
+          <a:graphicData uri="http://schemas.openxmlformats.org/drawingml/2006/table">
+            <a:tbl>
+              <a:tblPr firstRow="1" bandRow="1">
+                <a:tableStyleId>{5C22544A-7EE6-4342-B048-85BDC9FD1C3A}</a:tableStyleId>
+              </a:tblPr>
+              <a:tblGrid>
+                <a:gridCol w="1734942"/>
+                <a:gridCol w="1053261"/>
+              </a:tblGrid>
+              <a:tr h="370840">
+                <a:tc>
+                  <a:txBody>
+                    <a:bodyPr/>
+                    <a:lstStyle/>
+                    <a:p>
+                      <a:r>
+                        <a:rPr lang="en-US" sz="1600" dirty="0" smtClean="0">
+                          <a:solidFill>
+                            <a:schemeClr val="tx1"/>
+                          </a:solidFill>
+                          <a:latin typeface="Lucida Console" pitchFamily="49" charset="0"/>
+                        </a:rPr>
+                        <a:t>Statistic</a:t>
+                      </a:r>
+                      <a:endParaRPr lang="en-US" sz="1600" dirty="0">
+                        <a:solidFill>
+                          <a:schemeClr val="tx1"/>
+                        </a:solidFill>
+                        <a:latin typeface="Lucida Console" pitchFamily="49" charset="0"/>
+                      </a:endParaRPr>
+                    </a:p>
+                  </a:txBody>
+                  <a:tcPr/>
+                </a:tc>
+                <a:tc>
+                  <a:txBody>
+                    <a:bodyPr/>
+                    <a:lstStyle/>
+                    <a:p>
+                      <a:r>
+                        <a:rPr lang="en-US" sz="1600" dirty="0" smtClean="0">
+                          <a:solidFill>
+                            <a:schemeClr val="tx1"/>
+                          </a:solidFill>
+                          <a:latin typeface="Lucida Console" pitchFamily="49" charset="0"/>
+                        </a:rPr>
+                        <a:t>Value</a:t>
+                      </a:r>
+                      <a:endParaRPr lang="en-US" sz="1600" dirty="0">
+                        <a:solidFill>
+                          <a:schemeClr val="tx1"/>
+                        </a:solidFill>
+                        <a:latin typeface="Lucida Console" pitchFamily="49" charset="0"/>
+                      </a:endParaRPr>
+                    </a:p>
+                  </a:txBody>
+                  <a:tcPr/>
+                </a:tc>
+              </a:tr>
+              <a:tr h="370840">
+                <a:tc>
+                  <a:txBody>
+                    <a:bodyPr/>
+                    <a:lstStyle/>
+                    <a:p>
+                      <a:r>
+                        <a:rPr lang="en-US" sz="1600" dirty="0" smtClean="0">
+                          <a:latin typeface="Lucida Console" pitchFamily="49" charset="0"/>
+                        </a:rPr>
+                        <a:t>Residual standard error</a:t>
+                      </a:r>
+                      <a:endParaRPr lang="en-US" sz="1600" dirty="0">
+                        <a:latin typeface="Lucida Console" pitchFamily="49" charset="0"/>
+                      </a:endParaRPr>
+                    </a:p>
+                  </a:txBody>
+                  <a:tcPr/>
+                </a:tc>
+                <a:tc>
+                  <a:txBody>
+                    <a:bodyPr/>
+                    <a:lstStyle/>
+                    <a:p>
+                      <a:r>
+                        <a:rPr lang="en-US" sz="1600" dirty="0" smtClean="0">
+                          <a:latin typeface="Lucida Console" pitchFamily="49" charset="0"/>
+                        </a:rPr>
+                        <a:t>0.07124</a:t>
+                      </a:r>
+                      <a:endParaRPr lang="en-US" sz="1600" dirty="0">
+                        <a:latin typeface="Lucida Console" pitchFamily="49" charset="0"/>
+                      </a:endParaRPr>
+                    </a:p>
+                  </a:txBody>
+                  <a:tcPr/>
+                </a:tc>
+              </a:tr>
+              <a:tr h="370840">
+                <a:tc>
+                  <a:txBody>
+                    <a:bodyPr/>
+                    <a:lstStyle/>
+                    <a:p>
+                      <a:r>
+                        <a:rPr lang="en-US" sz="1600" dirty="0" smtClean="0">
+                          <a:latin typeface="Lucida Console" pitchFamily="49" charset="0"/>
+                        </a:rPr>
+                        <a:t>Multiple R-squared</a:t>
+                      </a:r>
+                      <a:endParaRPr lang="en-US" sz="1600" dirty="0">
+                        <a:latin typeface="Lucida Console" pitchFamily="49" charset="0"/>
+                      </a:endParaRPr>
+                    </a:p>
+                  </a:txBody>
+                  <a:tcPr/>
+                </a:tc>
+                <a:tc>
+                  <a:txBody>
+                    <a:bodyPr/>
+                    <a:lstStyle/>
+                    <a:p>
+                      <a:r>
+                        <a:rPr lang="en-US" sz="1600" dirty="0" smtClean="0">
+                          <a:latin typeface="Lucida Console" pitchFamily="49" charset="0"/>
+                        </a:rPr>
+                        <a:t>0.9816</a:t>
+                      </a:r>
+                      <a:endParaRPr lang="en-US" sz="1600" dirty="0">
+                        <a:latin typeface="Lucida Console" pitchFamily="49" charset="0"/>
+                      </a:endParaRPr>
+                    </a:p>
+                  </a:txBody>
+                  <a:tcPr/>
+                </a:tc>
+              </a:tr>
+              <a:tr h="370840">
+                <a:tc>
+                  <a:txBody>
+                    <a:bodyPr/>
+                    <a:lstStyle/>
+                    <a:p>
+                      <a:r>
+                        <a:rPr lang="en-US" sz="1600" dirty="0" smtClean="0">
+                          <a:latin typeface="Lucida Console" pitchFamily="49" charset="0"/>
+                        </a:rPr>
+                        <a:t>Adjusted R-squared</a:t>
+                      </a:r>
+                      <a:endParaRPr lang="en-US" sz="1600" dirty="0">
+                        <a:latin typeface="Lucida Console" pitchFamily="49" charset="0"/>
+                      </a:endParaRPr>
+                    </a:p>
+                  </a:txBody>
+                  <a:tcPr/>
+                </a:tc>
+                <a:tc>
+                  <a:txBody>
+                    <a:bodyPr/>
+                    <a:lstStyle/>
+                    <a:p>
+                      <a:r>
+                        <a:rPr lang="en-US" sz="1600" dirty="0" smtClean="0">
+                          <a:latin typeface="Lucida Console" pitchFamily="49" charset="0"/>
+                        </a:rPr>
+                        <a:t>0.9832</a:t>
+                      </a:r>
+                      <a:endParaRPr lang="en-US" sz="1600" dirty="0">
+                        <a:latin typeface="Lucida Console" pitchFamily="49" charset="0"/>
+                      </a:endParaRPr>
+                    </a:p>
+                  </a:txBody>
+                  <a:tcPr/>
+                </a:tc>
+              </a:tr>
+            </a:tbl>
+          </a:graphicData>
+        </a:graphic>
+      </p:graphicFrame>
+      <p:graphicFrame>
+        <p:nvGraphicFramePr>
+          <p:cNvPr id="9" name="Table 8"/>
+          <p:cNvGraphicFramePr>
+            <a:graphicFrameLocks noGrp="1"/>
+          </p:cNvGraphicFramePr>
+          <p:nvPr/>
+        </p:nvGraphicFramePr>
+        <p:xfrm>
+          <a:off x="4548776" y="1760340"/>
+          <a:ext cx="2788203" cy="2352040"/>
+        </p:xfrm>
+        <a:graphic>
+          <a:graphicData uri="http://schemas.openxmlformats.org/drawingml/2006/table">
+            <a:tbl>
+              <a:tblPr firstRow="1" bandRow="1">
+                <a:tableStyleId>{5C22544A-7EE6-4342-B048-85BDC9FD1C3A}</a:tableStyleId>
+              </a:tblPr>
+              <a:tblGrid>
+                <a:gridCol w="1734942"/>
+                <a:gridCol w="1053261"/>
+              </a:tblGrid>
+              <a:tr h="370840">
+                <a:tc>
+                  <a:txBody>
+                    <a:bodyPr/>
+                    <a:lstStyle/>
+                    <a:p>
+                      <a:r>
+                        <a:rPr lang="en-US" sz="1600" dirty="0" smtClean="0">
+                          <a:solidFill>
+                            <a:schemeClr val="tx1"/>
+                          </a:solidFill>
+                          <a:latin typeface="Lucida Console" pitchFamily="49" charset="0"/>
+                        </a:rPr>
+                        <a:t>Statistic</a:t>
+                      </a:r>
+                      <a:endParaRPr lang="en-US" sz="1600" dirty="0">
+                        <a:solidFill>
+                          <a:schemeClr val="tx1"/>
+                        </a:solidFill>
+                        <a:latin typeface="Lucida Console" pitchFamily="49" charset="0"/>
+                      </a:endParaRPr>
+                    </a:p>
+                  </a:txBody>
+                  <a:tcPr/>
+                </a:tc>
+                <a:tc>
+                  <a:txBody>
+                    <a:bodyPr/>
+                    <a:lstStyle/>
+                    <a:p>
+                      <a:r>
+                        <a:rPr lang="en-US" sz="1600" dirty="0" smtClean="0">
+                          <a:solidFill>
+                            <a:schemeClr val="tx1"/>
+                          </a:solidFill>
+                          <a:latin typeface="Lucida Console" pitchFamily="49" charset="0"/>
+                        </a:rPr>
+                        <a:t>Value</a:t>
+                      </a:r>
+                      <a:endParaRPr lang="en-US" sz="1600" dirty="0">
+                        <a:solidFill>
+                          <a:schemeClr val="tx1"/>
+                        </a:solidFill>
+                        <a:latin typeface="Lucida Console" pitchFamily="49" charset="0"/>
+                      </a:endParaRPr>
+                    </a:p>
+                  </a:txBody>
+                  <a:tcPr/>
+                </a:tc>
+              </a:tr>
+              <a:tr h="370840">
+                <a:tc>
+                  <a:txBody>
+                    <a:bodyPr/>
+                    <a:lstStyle/>
+                    <a:p>
+                      <a:r>
+                        <a:rPr lang="en-US" sz="1600" dirty="0" smtClean="0">
+                          <a:latin typeface="Lucida Console" pitchFamily="49" charset="0"/>
+                        </a:rPr>
+                        <a:t>Residual standard error</a:t>
+                      </a:r>
+                      <a:endParaRPr lang="en-US" sz="1600" dirty="0">
+                        <a:latin typeface="Lucida Console" pitchFamily="49" charset="0"/>
+                      </a:endParaRPr>
+                    </a:p>
+                  </a:txBody>
+                  <a:tcPr/>
+                </a:tc>
+                <a:tc>
+                  <a:txBody>
+                    <a:bodyPr/>
+                    <a:lstStyle/>
+                    <a:p>
+                      <a:r>
+                        <a:rPr lang="en-US" sz="1600" dirty="0" smtClean="0">
+                          <a:latin typeface="Lucida Console" pitchFamily="49" charset="0"/>
+                        </a:rPr>
+                        <a:t>0.09021</a:t>
+                      </a:r>
+                      <a:endParaRPr lang="en-US" sz="1600" dirty="0">
+                        <a:latin typeface="Lucida Console" pitchFamily="49" charset="0"/>
+                      </a:endParaRPr>
+                    </a:p>
+                  </a:txBody>
+                  <a:tcPr/>
+                </a:tc>
+              </a:tr>
+              <a:tr h="370840">
+                <a:tc>
+                  <a:txBody>
+                    <a:bodyPr/>
+                    <a:lstStyle/>
+                    <a:p>
+                      <a:r>
+                        <a:rPr lang="en-US" sz="1600" dirty="0" smtClean="0">
+                          <a:latin typeface="Lucida Console" pitchFamily="49" charset="0"/>
+                        </a:rPr>
+                        <a:t>Multiple R-squared</a:t>
+                      </a:r>
+                      <a:endParaRPr lang="en-US" sz="1600" dirty="0">
+                        <a:latin typeface="Lucida Console" pitchFamily="49" charset="0"/>
+                      </a:endParaRPr>
+                    </a:p>
+                  </a:txBody>
+                  <a:tcPr/>
+                </a:tc>
+                <a:tc>
+                  <a:txBody>
+                    <a:bodyPr/>
+                    <a:lstStyle/>
+                    <a:p>
+                      <a:r>
+                        <a:rPr lang="en-US" sz="1600" dirty="0" smtClean="0">
+                          <a:latin typeface="Lucida Console" pitchFamily="49" charset="0"/>
+                        </a:rPr>
+                        <a:t>0.9936</a:t>
+                      </a:r>
+                      <a:endParaRPr lang="en-US" sz="1600" dirty="0">
+                        <a:latin typeface="Lucida Console" pitchFamily="49" charset="0"/>
+                      </a:endParaRPr>
+                    </a:p>
+                  </a:txBody>
+                  <a:tcPr/>
+                </a:tc>
+              </a:tr>
+              <a:tr h="370840">
+                <a:tc>
+                  <a:txBody>
+                    <a:bodyPr/>
+                    <a:lstStyle/>
+                    <a:p>
+                      <a:r>
+                        <a:rPr lang="en-US" sz="1600" dirty="0" smtClean="0">
+                          <a:latin typeface="Lucida Console" pitchFamily="49" charset="0"/>
+                        </a:rPr>
+                        <a:t>Adjusted R-squared</a:t>
+                      </a:r>
+                      <a:endParaRPr lang="en-US" sz="1600" dirty="0">
+                        <a:latin typeface="Lucida Console" pitchFamily="49" charset="0"/>
+                      </a:endParaRPr>
+                    </a:p>
+                  </a:txBody>
+                  <a:tcPr/>
+                </a:tc>
+                <a:tc>
+                  <a:txBody>
+                    <a:bodyPr/>
+                    <a:lstStyle/>
+                    <a:p>
+                      <a:r>
+                        <a:rPr lang="en-US" sz="1600" dirty="0" smtClean="0">
+                          <a:latin typeface="Lucida Console" pitchFamily="49" charset="0"/>
+                        </a:rPr>
+                        <a:t>0.9974</a:t>
+                      </a:r>
+                      <a:endParaRPr lang="en-US" sz="1600" dirty="0">
+                        <a:latin typeface="Lucida Console" pitchFamily="49" charset="0"/>
+                      </a:endParaRPr>
+                    </a:p>
+                  </a:txBody>
+                  <a:tcPr/>
+                </a:tc>
+              </a:tr>
+            </a:tbl>
+          </a:graphicData>
+        </a:graphic>
+      </p:graphicFrame>
+      <p:pic>
+        <p:nvPicPr>
+          <p:cNvPr id="10" name="Picture 9"/>
+          <p:cNvPicPr/>
+          <p:nvPr/>
+        </p:nvPicPr>
+        <p:blipFill>
+          <a:blip r:embed="rId2" cstate="print"/>
+          <a:srcRect/>
+          <a:stretch>
+            <a:fillRect/>
+          </a:stretch>
+        </p:blipFill>
+        <p:spPr bwMode="auto">
+          <a:xfrm>
+            <a:off x="8101148" y="1881998"/>
+            <a:ext cx="3079630" cy="2156603"/>
+          </a:xfrm>
+          <a:prstGeom prst="rect">
+            <a:avLst/>
+          </a:prstGeom>
+          <a:noFill/>
+          <a:ln w="9525">
+            <a:noFill/>
+            <a:miter lim="800000"/>
+            <a:headEnd/>
+            <a:tailEnd/>
+          </a:ln>
+        </p:spPr>
+      </p:pic>
+      <p:sp>
+        <p:nvSpPr>
+          <p:cNvPr id="12" name="TextBox 11"/>
+          <p:cNvSpPr txBox="1"/>
+          <p:nvPr/>
+        </p:nvSpPr>
+        <p:spPr>
+          <a:xfrm>
+            <a:off x="8125097" y="4376055"/>
+            <a:ext cx="3592286" cy="1477328"/>
+          </a:xfrm>
+          <a:prstGeom prst="rect">
+            <a:avLst/>
+          </a:prstGeom>
+          <a:noFill/>
+        </p:spPr>
+        <p:txBody>
+          <a:bodyPr wrap="square" rtlCol="0">
+            <a:spAutoFit/>
+          </a:bodyPr>
+          <a:lstStyle/>
+          <a:p>
+            <a:r>
+              <a:rPr lang="en-US" dirty="0" smtClean="0">
+                <a:latin typeface="Lucida Console" pitchFamily="49" charset="0"/>
+              </a:rPr>
+              <a:t>Residual graph for C position showing fairly linear distribution between PPI and predicted variables</a:t>
+            </a:r>
+            <a:endParaRPr lang="en-US" dirty="0">
+              <a:latin typeface="Lucida Console" pitchFamily="49" charset="0"/>
+            </a:endParaRPr>
+          </a:p>
+        </p:txBody>
+      </p:sp>
+      <p:sp>
+        <p:nvSpPr>
+          <p:cNvPr id="13" name="Rounded Rectangle 12">
+            <a:hlinkClick r:id="" action="ppaction://noaction" highlightClick="1"/>
+          </p:cNvPr>
+          <p:cNvSpPr/>
+          <p:nvPr/>
+        </p:nvSpPr>
+        <p:spPr>
+          <a:xfrm>
+            <a:off x="2246811" y="3030582"/>
+            <a:ext cx="966651" cy="1149532"/>
+          </a:xfrm>
+          <a:prstGeom prst="roundRect">
+            <a:avLst/>
+          </a:prstGeom>
+          <a:noFill/>
+          <a:ln w="31750">
+            <a:solidFill>
+              <a:srgbClr val="FF0000"/>
+            </a:solidFill>
+          </a:ln>
+        </p:spPr>
+        <p:style>
+          <a:lnRef idx="2">
+            <a:schemeClr val="accent1">
+              <a:shade val="50000"/>
+            </a:schemeClr>
+          </a:lnRef>
+          <a:fillRef idx="1">
+            <a:schemeClr val="accent1"/>
+          </a:fillRef>
+          <a:effectRef idx="0">
+            <a:schemeClr val="accent1"/>
+          </a:effectRef>
+          <a:fontRef idx="minor">
+            <a:schemeClr val="lt1"/>
+          </a:fontRef>
+        </p:style>
+        <p:txBody>
+          <a:bodyPr rtlCol="0" anchor="ctr"/>
+          <a:lstStyle/>
+          <a:p>
+            <a:pPr algn="ctr"/>
+            <a:endParaRPr lang="en-US" dirty="0"/>
+          </a:p>
+        </p:txBody>
+      </p:sp>
+      <p:sp>
+        <p:nvSpPr>
+          <p:cNvPr id="14" name="Rounded Rectangle 13"/>
+          <p:cNvSpPr/>
+          <p:nvPr/>
+        </p:nvSpPr>
+        <p:spPr>
+          <a:xfrm>
+            <a:off x="6309360" y="2952205"/>
+            <a:ext cx="966651" cy="1149532"/>
+          </a:xfrm>
+          <a:prstGeom prst="roundRect">
+            <a:avLst/>
+          </a:prstGeom>
+          <a:noFill/>
+          <a:ln w="31750">
+            <a:solidFill>
+              <a:srgbClr val="FF0000"/>
+            </a:solidFill>
+          </a:ln>
+        </p:spPr>
+        <p:style>
+          <a:lnRef idx="2">
+            <a:schemeClr val="accent1">
+              <a:shade val="50000"/>
+            </a:schemeClr>
+          </a:lnRef>
+          <a:fillRef idx="1">
+            <a:schemeClr val="accent1"/>
+          </a:fillRef>
+          <a:effectRef idx="0">
+            <a:schemeClr val="accent1"/>
+          </a:effectRef>
+          <a:fontRef idx="minor">
+            <a:schemeClr val="lt1"/>
+          </a:fontRef>
+        </p:style>
+        <p:txBody>
+          <a:bodyPr rtlCol="0" anchor="ctr"/>
+          <a:lstStyle/>
+          <a:p>
+            <a:pPr algn="ctr"/>
+            <a:endParaRPr lang="en-US" dirty="0"/>
+          </a:p>
+        </p:txBody>
+      </p:sp>
+      <p:sp>
+        <p:nvSpPr>
+          <p:cNvPr id="16" name="Rounded Rectangle 15"/>
+          <p:cNvSpPr/>
+          <p:nvPr/>
+        </p:nvSpPr>
+        <p:spPr>
+          <a:xfrm>
+            <a:off x="3030582" y="4924698"/>
+            <a:ext cx="2756263" cy="862148"/>
+          </a:xfrm>
+          <a:prstGeom prst="roundRect">
+            <a:avLst/>
+          </a:prstGeom>
+          <a:noFill/>
+          <a:ln w="31750">
+            <a:solidFill>
+              <a:srgbClr val="FF0000"/>
+            </a:solidFill>
+          </a:ln>
+        </p:spPr>
+        <p:style>
+          <a:lnRef idx="2">
+            <a:schemeClr val="accent1">
+              <a:shade val="50000"/>
+            </a:schemeClr>
+          </a:lnRef>
+          <a:fillRef idx="1">
+            <a:schemeClr val="accent1"/>
+          </a:fillRef>
+          <a:effectRef idx="0">
+            <a:schemeClr val="accent1"/>
+          </a:effectRef>
+          <a:fontRef idx="minor">
+            <a:schemeClr val="lt1"/>
+          </a:fontRef>
+        </p:style>
+        <p:txBody>
+          <a:bodyPr rtlCol="0" anchor="ctr"/>
+          <a:lstStyle/>
+          <a:p>
+            <a:pPr algn="ctr"/>
+            <a:r>
+              <a:rPr lang="en-US" dirty="0" smtClean="0">
+                <a:solidFill>
+                  <a:schemeClr val="tx1"/>
+                </a:solidFill>
+                <a:latin typeface="Lucida Console" pitchFamily="49" charset="0"/>
+              </a:rPr>
+              <a:t>Model satisfies the regression criterion</a:t>
+            </a:r>
+            <a:endParaRPr lang="en-US" dirty="0">
+              <a:solidFill>
+                <a:schemeClr val="tx1"/>
+              </a:solidFill>
+              <a:latin typeface="Lucida Console" pitchFamily="49" charset="0"/>
+            </a:endParaRPr>
+          </a:p>
+        </p:txBody>
+      </p:sp>
+      <p:cxnSp>
+        <p:nvCxnSpPr>
+          <p:cNvPr id="20" name="Straight Arrow Connector 19"/>
+          <p:cNvCxnSpPr/>
+          <p:nvPr/>
+        </p:nvCxnSpPr>
+        <p:spPr>
+          <a:xfrm rot="16200000" flipH="1">
+            <a:off x="2521132" y="4454435"/>
+            <a:ext cx="809898" cy="287382"/>
+          </a:xfrm>
+          <a:prstGeom prst="straightConnector1">
+            <a:avLst/>
+          </a:prstGeom>
+          <a:ln w="31750">
+            <a:solidFill>
+              <a:srgbClr val="FF0000"/>
+            </a:solidFill>
+            <a:tailEnd type="arrow"/>
+          </a:ln>
+        </p:spPr>
+        <p:style>
+          <a:lnRef idx="1">
+            <a:schemeClr val="accent1"/>
+          </a:lnRef>
+          <a:fillRef idx="0">
+            <a:schemeClr val="accent1"/>
+          </a:fillRef>
+          <a:effectRef idx="0">
+            <a:schemeClr val="accent1"/>
+          </a:effectRef>
+          <a:fontRef idx="minor">
+            <a:schemeClr val="tx1"/>
+          </a:fontRef>
+        </p:style>
+      </p:cxnSp>
+      <p:cxnSp>
+        <p:nvCxnSpPr>
+          <p:cNvPr id="21" name="Straight Arrow Connector 20"/>
+          <p:cNvCxnSpPr/>
+          <p:nvPr/>
+        </p:nvCxnSpPr>
+        <p:spPr>
+          <a:xfrm rot="10800000" flipV="1">
+            <a:off x="5734594" y="4097382"/>
+            <a:ext cx="975362" cy="905691"/>
+          </a:xfrm>
+          <a:prstGeom prst="straightConnector1">
+            <a:avLst/>
+          </a:prstGeom>
+          <a:ln w="31750">
+            <a:solidFill>
+              <a:srgbClr val="FF0000"/>
+            </a:solidFill>
+            <a:tailEnd type="arrow"/>
+          </a:ln>
+        </p:spPr>
+        <p:style>
+          <a:lnRef idx="1">
+            <a:schemeClr val="accent1"/>
+          </a:lnRef>
+          <a:fillRef idx="0">
+            <a:schemeClr val="accent1"/>
+          </a:fillRef>
+          <a:effectRef idx="0">
+            <a:schemeClr val="accent1"/>
+          </a:effectRef>
+          <a:fontRef idx="minor">
+            <a:schemeClr val="tx1"/>
+          </a:fontRef>
+        </p:style>
+      </p:cxnSp>
     </p:spTree>
   </p:cSld>
   <p:clrMapOvr>
@@ -9022,11 +11961,38 @@
       </a:bgFillStyleLst>
     </a:fmtScheme>
   </a:themeElements>
-  <a:objectDefaults/>
+  <a:objectDefaults>
+    <a:lnDef>
+      <a:spPr>
+        <a:ln w="31750">
+          <a:solidFill>
+            <a:srgbClr val="FF0000"/>
+          </a:solidFill>
+          <a:tailEnd type="arrow"/>
+        </a:ln>
+      </a:spPr>
+      <a:bodyPr/>
+      <a:lstStyle/>
+      <a:style>
+        <a:lnRef idx="1">
+          <a:schemeClr val="accent1"/>
+        </a:lnRef>
+        <a:fillRef idx="0">
+          <a:schemeClr val="accent1"/>
+        </a:fillRef>
+        <a:effectRef idx="0">
+          <a:schemeClr val="accent1"/>
+        </a:effectRef>
+        <a:fontRef idx="minor">
+          <a:schemeClr val="tx1"/>
+        </a:fontRef>
+      </a:style>
+    </a:lnDef>
+  </a:objectDefaults>
   <a:extraClrSchemeLst/>
   <a:extLst>
     <a:ext uri="{05A4C25C-085E-4340-85A3-A5531E510DB2}">
-      <thm15:themeFamily xmlns="" xmlns:thm15="http://schemas.microsoft.com/office/thememl/2012/main" name="Retrospect" id="{5F128B03-DCCA-4EEB-AB3B-CF2899314A46}" vid="{3F1AAB62-24C6-49D2-8E01-B56FAC9A3DCD}"/>
+      <thm15:themeFamily xmlns:thm15="http://schemas.microsoft.com/office/thememl/2012/main" xmlns="" name="Retrospect" id="{5F128B03-DCCA-4EEB-AB3B-CF2899314A46}" vid="{3F1AAB62-24C6-49D2-8E01-B56FAC9A3DCD}"/>
     </a:ext>
   </a:extLst>
 </a:theme>

</xml_diff>

<commit_message>
added draft proposal to the presentation
</commit_message>
<xml_diff>
--- a/NBA-Draft-Scouting.pptx
+++ b/NBA-Draft-Scouting.pptx
@@ -5,7 +5,7 @@
     <p:sldMasterId id="2147483648" r:id="rId1"/>
   </p:sldMasterIdLst>
   <p:notesMasterIdLst>
-    <p:notesMasterId r:id="rId16"/>
+    <p:notesMasterId r:id="rId17"/>
   </p:notesMasterIdLst>
   <p:sldIdLst>
     <p:sldId id="256" r:id="rId2"/>
@@ -22,6 +22,7 @@
     <p:sldId id="267" r:id="rId13"/>
     <p:sldId id="268" r:id="rId14"/>
     <p:sldId id="269" r:id="rId15"/>
+    <p:sldId id="270" r:id="rId16"/>
   </p:sldIdLst>
   <p:sldSz cx="12192000" cy="6858000"/>
   <p:notesSz cx="6858000" cy="9144000"/>
@@ -123,6 +124,958 @@
 </p:presentation>
 </file>
 
+<file path=ppt/charts/chart1.xml><?xml version="1.0" encoding="utf-8"?>
+<c:chartSpace xmlns:c="http://schemas.openxmlformats.org/drawingml/2006/chart" xmlns:a="http://schemas.openxmlformats.org/drawingml/2006/main" xmlns:r="http://schemas.openxmlformats.org/officeDocument/2006/relationships">
+  <c:date1904 val="1"/>
+  <c:lang val="en-US"/>
+  <c:chart>
+    <c:title>
+      <c:layout/>
+    </c:title>
+    <c:plotArea>
+      <c:layout/>
+      <c:barChart>
+        <c:barDir val="bar"/>
+        <c:grouping val="clustered"/>
+        <c:ser>
+          <c:idx val="0"/>
+          <c:order val="0"/>
+          <c:tx>
+            <c:strRef>
+              <c:f>'C'!$B$1</c:f>
+              <c:strCache>
+                <c:ptCount val="1"/>
+                <c:pt idx="0">
+                  <c:v>Normalized PPI</c:v>
+                </c:pt>
+              </c:strCache>
+            </c:strRef>
+          </c:tx>
+          <c:cat>
+            <c:strRef>
+              <c:f>'C'!$A$2:$A$7</c:f>
+              <c:strCache>
+                <c:ptCount val="6"/>
+                <c:pt idx="0">
+                  <c:v>Dakari Johnson, Satnam Singh Bhamara</c:v>
+                </c:pt>
+                <c:pt idx="1">
+                  <c:v>Artūras Gudaitis</c:v>
+                </c:pt>
+                <c:pt idx="2">
+                  <c:v>Myles Turner, Nikola Milutinov</c:v>
+                </c:pt>
+                <c:pt idx="3">
+                  <c:v>Guillermo Hernangómez</c:v>
+                </c:pt>
+                <c:pt idx="4">
+                  <c:v>Willie Cauley-Stein</c:v>
+                </c:pt>
+                <c:pt idx="5">
+                  <c:v>Karl-Anthony Towns, Jahlil Okafor</c:v>
+                </c:pt>
+              </c:strCache>
+            </c:strRef>
+          </c:cat>
+          <c:val>
+            <c:numRef>
+              <c:f>'C'!$B$2:$B$7</c:f>
+              <c:numCache>
+                <c:formatCode>General</c:formatCode>
+                <c:ptCount val="6"/>
+                <c:pt idx="0">
+                  <c:v>4.84</c:v>
+                </c:pt>
+                <c:pt idx="1">
+                  <c:v>4.8599999999999994</c:v>
+                </c:pt>
+                <c:pt idx="2">
+                  <c:v>4.88</c:v>
+                </c:pt>
+                <c:pt idx="3">
+                  <c:v>4.9000000000000004</c:v>
+                </c:pt>
+                <c:pt idx="4">
+                  <c:v>4.95</c:v>
+                </c:pt>
+                <c:pt idx="5">
+                  <c:v>4.9800000000000004</c:v>
+                </c:pt>
+              </c:numCache>
+            </c:numRef>
+          </c:val>
+        </c:ser>
+        <c:axId val="88322816"/>
+        <c:axId val="88324352"/>
+      </c:barChart>
+      <c:catAx>
+        <c:axId val="88322816"/>
+        <c:scaling>
+          <c:orientation val="minMax"/>
+        </c:scaling>
+        <c:axPos val="l"/>
+        <c:tickLblPos val="nextTo"/>
+        <c:crossAx val="88324352"/>
+        <c:crosses val="autoZero"/>
+        <c:auto val="1"/>
+        <c:lblAlgn val="ctr"/>
+        <c:lblOffset val="100"/>
+      </c:catAx>
+      <c:valAx>
+        <c:axId val="88324352"/>
+        <c:scaling>
+          <c:orientation val="minMax"/>
+        </c:scaling>
+        <c:axPos val="b"/>
+        <c:majorGridlines/>
+        <c:numFmt formatCode="General" sourceLinked="1"/>
+        <c:tickLblPos val="nextTo"/>
+        <c:crossAx val="88322816"/>
+        <c:crosses val="autoZero"/>
+        <c:crossBetween val="between"/>
+      </c:valAx>
+      <c:spPr>
+        <a:noFill/>
+        <a:ln w="25400">
+          <a:noFill/>
+        </a:ln>
+      </c:spPr>
+    </c:plotArea>
+    <c:legend>
+      <c:legendPos val="r"/>
+      <c:layout/>
+    </c:legend>
+    <c:plotVisOnly val="1"/>
+  </c:chart>
+  <c:spPr>
+    <a:ln>
+      <a:solidFill>
+        <a:srgbClr val="FF0000"/>
+      </a:solidFill>
+    </a:ln>
+  </c:spPr>
+  <c:txPr>
+    <a:bodyPr/>
+    <a:lstStyle/>
+    <a:p>
+      <a:pPr>
+        <a:defRPr sz="800"/>
+      </a:pPr>
+      <a:endParaRPr lang="en-US"/>
+    </a:p>
+  </c:txPr>
+  <c:externalData r:id="rId1"/>
+</c:chartSpace>
+</file>
+
+<file path=ppt/charts/chart2.xml><?xml version="1.0" encoding="utf-8"?>
+<c:chartSpace xmlns:c="http://schemas.openxmlformats.org/drawingml/2006/chart" xmlns:a="http://schemas.openxmlformats.org/drawingml/2006/main" xmlns:r="http://schemas.openxmlformats.org/officeDocument/2006/relationships">
+  <c:lang val="en-US"/>
+  <c:chart>
+    <c:title>
+      <c:layout/>
+    </c:title>
+    <c:plotArea>
+      <c:layout/>
+      <c:barChart>
+        <c:barDir val="bar"/>
+        <c:grouping val="clustered"/>
+        <c:ser>
+          <c:idx val="0"/>
+          <c:order val="0"/>
+          <c:tx>
+            <c:strRef>
+              <c:f>PG!$B$1</c:f>
+              <c:strCache>
+                <c:ptCount val="1"/>
+                <c:pt idx="0">
+                  <c:v>Normalized PPI</c:v>
+                </c:pt>
+              </c:strCache>
+            </c:strRef>
+          </c:tx>
+          <c:cat>
+            <c:strRef>
+              <c:f>PG!$A$2:$A$8</c:f>
+              <c:strCache>
+                <c:ptCount val="7"/>
+                <c:pt idx="0">
+                  <c:v>Nikola Radičević</c:v>
+                </c:pt>
+                <c:pt idx="1">
+                  <c:v>Tyus Jones, Olivier Hanlan, Joseph Young</c:v>
+                </c:pt>
+                <c:pt idx="2">
+                  <c:v>Tyler Harvey</c:v>
+                </c:pt>
+                <c:pt idx="3">
+                  <c:v>Andrew Harrison, Marcus Thornton</c:v>
+                </c:pt>
+                <c:pt idx="4">
+                  <c:v>Cameron Payne, Delon Wright</c:v>
+                </c:pt>
+                <c:pt idx="5">
+                  <c:v>Terry Rozier, Jerian Grant</c:v>
+                </c:pt>
+                <c:pt idx="6">
+                  <c:v>D'Angelo Russell, Emmanuel Mudiay</c:v>
+                </c:pt>
+              </c:strCache>
+            </c:strRef>
+          </c:cat>
+          <c:val>
+            <c:numRef>
+              <c:f>PG!$B$2:$B$8</c:f>
+              <c:numCache>
+                <c:formatCode>General</c:formatCode>
+                <c:ptCount val="7"/>
+                <c:pt idx="0">
+                  <c:v>4.76</c:v>
+                </c:pt>
+                <c:pt idx="1">
+                  <c:v>4.8</c:v>
+                </c:pt>
+                <c:pt idx="2">
+                  <c:v>4.84</c:v>
+                </c:pt>
+                <c:pt idx="3">
+                  <c:v>4.87</c:v>
+                </c:pt>
+                <c:pt idx="4">
+                  <c:v>4.91</c:v>
+                </c:pt>
+                <c:pt idx="5">
+                  <c:v>4.9400000000000004</c:v>
+                </c:pt>
+                <c:pt idx="6">
+                  <c:v>4.9700000000000006</c:v>
+                </c:pt>
+              </c:numCache>
+            </c:numRef>
+          </c:val>
+        </c:ser>
+        <c:axId val="88340352"/>
+        <c:axId val="88341888"/>
+      </c:barChart>
+      <c:catAx>
+        <c:axId val="88340352"/>
+        <c:scaling>
+          <c:orientation val="minMax"/>
+        </c:scaling>
+        <c:axPos val="l"/>
+        <c:tickLblPos val="nextTo"/>
+        <c:crossAx val="88341888"/>
+        <c:crosses val="autoZero"/>
+        <c:auto val="1"/>
+        <c:lblAlgn val="ctr"/>
+        <c:lblOffset val="100"/>
+      </c:catAx>
+      <c:valAx>
+        <c:axId val="88341888"/>
+        <c:scaling>
+          <c:orientation val="minMax"/>
+        </c:scaling>
+        <c:axPos val="b"/>
+        <c:majorGridlines/>
+        <c:numFmt formatCode="General" sourceLinked="1"/>
+        <c:tickLblPos val="nextTo"/>
+        <c:crossAx val="88340352"/>
+        <c:crosses val="autoZero"/>
+        <c:crossBetween val="between"/>
+      </c:valAx>
+      <c:spPr>
+        <a:ln>
+          <a:noFill/>
+        </a:ln>
+      </c:spPr>
+    </c:plotArea>
+    <c:legend>
+      <c:legendPos val="r"/>
+      <c:layout/>
+    </c:legend>
+    <c:plotVisOnly val="1"/>
+  </c:chart>
+  <c:spPr>
+    <a:ln>
+      <a:solidFill>
+        <a:srgbClr val="FF0000"/>
+      </a:solidFill>
+    </a:ln>
+  </c:spPr>
+  <c:txPr>
+    <a:bodyPr/>
+    <a:lstStyle/>
+    <a:p>
+      <a:pPr>
+        <a:defRPr sz="800"/>
+      </a:pPr>
+      <a:endParaRPr lang="en-US"/>
+    </a:p>
+  </c:txPr>
+  <c:externalData r:id="rId1"/>
+</c:chartSpace>
+</file>
+
+<file path=ppt/charts/chart3.xml><?xml version="1.0" encoding="utf-8"?>
+<c:chartSpace xmlns:c="http://schemas.openxmlformats.org/drawingml/2006/chart" xmlns:a="http://schemas.openxmlformats.org/drawingml/2006/main" xmlns:r="http://schemas.openxmlformats.org/officeDocument/2006/relationships">
+  <c:lang val="en-US"/>
+  <c:chart>
+    <c:title>
+      <c:layout/>
+    </c:title>
+    <c:plotArea>
+      <c:layout/>
+      <c:barChart>
+        <c:barDir val="bar"/>
+        <c:grouping val="clustered"/>
+        <c:ser>
+          <c:idx val="0"/>
+          <c:order val="0"/>
+          <c:tx>
+            <c:strRef>
+              <c:f>PF!$B$1</c:f>
+              <c:strCache>
+                <c:ptCount val="1"/>
+                <c:pt idx="0">
+                  <c:v>Normalized PPI</c:v>
+                </c:pt>
+              </c:strCache>
+            </c:strRef>
+          </c:tx>
+          <c:cat>
+            <c:strRef>
+              <c:f>PF!$A$2:$A$8</c:f>
+              <c:strCache>
+                <c:ptCount val="7"/>
+                <c:pt idx="0">
+                  <c:v>Dimitrios Agravanis, Luka Mitrović</c:v>
+                </c:pt>
+                <c:pt idx="1">
+                  <c:v>Cady Lalanne</c:v>
+                </c:pt>
+                <c:pt idx="2">
+                  <c:v>Aaron White</c:v>
+                </c:pt>
+                <c:pt idx="3">
+                  <c:v>Montrezl Harrell, Jordan Mickey</c:v>
+                </c:pt>
+                <c:pt idx="4">
+                  <c:v>Jarell Martin, Chris McCullough, Kevon Looney</c:v>
+                </c:pt>
+                <c:pt idx="5">
+                  <c:v>Bobby Portis, Larry Nance, Jr.</c:v>
+                </c:pt>
+                <c:pt idx="6">
+                  <c:v>Trey Lyles</c:v>
+                </c:pt>
+              </c:strCache>
+            </c:strRef>
+          </c:cat>
+          <c:val>
+            <c:numRef>
+              <c:f>PF!$B$2:$B$8</c:f>
+              <c:numCache>
+                <c:formatCode>General</c:formatCode>
+                <c:ptCount val="7"/>
+                <c:pt idx="0">
+                  <c:v>4.6899999999999995</c:v>
+                </c:pt>
+                <c:pt idx="1">
+                  <c:v>4.72</c:v>
+                </c:pt>
+                <c:pt idx="2">
+                  <c:v>4.8499999999999996</c:v>
+                </c:pt>
+                <c:pt idx="3">
+                  <c:v>4.88</c:v>
+                </c:pt>
+                <c:pt idx="4">
+                  <c:v>4.92</c:v>
+                </c:pt>
+                <c:pt idx="5">
+                  <c:v>4.96</c:v>
+                </c:pt>
+                <c:pt idx="6">
+                  <c:v>4.9800000000000004</c:v>
+                </c:pt>
+              </c:numCache>
+            </c:numRef>
+          </c:val>
+        </c:ser>
+        <c:axId val="88899968"/>
+        <c:axId val="88901504"/>
+      </c:barChart>
+      <c:catAx>
+        <c:axId val="88899968"/>
+        <c:scaling>
+          <c:orientation val="minMax"/>
+        </c:scaling>
+        <c:axPos val="l"/>
+        <c:tickLblPos val="nextTo"/>
+        <c:crossAx val="88901504"/>
+        <c:crosses val="autoZero"/>
+        <c:auto val="1"/>
+        <c:lblAlgn val="ctr"/>
+        <c:lblOffset val="100"/>
+      </c:catAx>
+      <c:valAx>
+        <c:axId val="88901504"/>
+        <c:scaling>
+          <c:orientation val="minMax"/>
+          <c:max val="5"/>
+        </c:scaling>
+        <c:axPos val="b"/>
+        <c:majorGridlines/>
+        <c:numFmt formatCode="General" sourceLinked="1"/>
+        <c:tickLblPos val="nextTo"/>
+        <c:crossAx val="88899968"/>
+        <c:crosses val="autoZero"/>
+        <c:crossBetween val="between"/>
+      </c:valAx>
+    </c:plotArea>
+    <c:legend>
+      <c:legendPos val="r"/>
+      <c:layout/>
+    </c:legend>
+    <c:plotVisOnly val="1"/>
+  </c:chart>
+  <c:spPr>
+    <a:ln>
+      <a:solidFill>
+        <a:srgbClr val="FF0000"/>
+      </a:solidFill>
+    </a:ln>
+  </c:spPr>
+  <c:txPr>
+    <a:bodyPr/>
+    <a:lstStyle/>
+    <a:p>
+      <a:pPr>
+        <a:defRPr sz="800"/>
+      </a:pPr>
+      <a:endParaRPr lang="en-US"/>
+    </a:p>
+  </c:txPr>
+  <c:externalData r:id="rId1"/>
+</c:chartSpace>
+</file>
+
+<file path=ppt/charts/chart4.xml><?xml version="1.0" encoding="utf-8"?>
+<c:chartSpace xmlns:c="http://schemas.openxmlformats.org/drawingml/2006/chart" xmlns:a="http://schemas.openxmlformats.org/drawingml/2006/main" xmlns:r="http://schemas.openxmlformats.org/officeDocument/2006/relationships">
+  <c:date1904 val="1"/>
+  <c:lang val="en-US"/>
+  <c:chart>
+    <c:title>
+      <c:layout/>
+    </c:title>
+    <c:plotArea>
+      <c:layout/>
+      <c:barChart>
+        <c:barDir val="bar"/>
+        <c:grouping val="clustered"/>
+        <c:ser>
+          <c:idx val="0"/>
+          <c:order val="0"/>
+          <c:tx>
+            <c:strRef>
+              <c:f>SF!$B$1</c:f>
+              <c:strCache>
+                <c:ptCount val="1"/>
+                <c:pt idx="0">
+                  <c:v>Normalized PPI</c:v>
+                </c:pt>
+              </c:strCache>
+            </c:strRef>
+          </c:tx>
+          <c:cat>
+            <c:strRef>
+              <c:f>SF!$A$2:$A$8</c:f>
+              <c:strCache>
+                <c:ptCount val="7"/>
+                <c:pt idx="0">
+                  <c:v>Stanley Johnson</c:v>
+                </c:pt>
+                <c:pt idx="1">
+                  <c:v>Justise Winslow</c:v>
+                </c:pt>
+                <c:pt idx="2">
+                  <c:v>Sam Dekker, Justin Anderson</c:v>
+                </c:pt>
+                <c:pt idx="3">
+                  <c:v>Rondae Hollis-Jefferson, Anthony Brown</c:v>
+                </c:pt>
+                <c:pt idx="4">
+                  <c:v>Juan Pablo Vaulet</c:v>
+                </c:pt>
+                <c:pt idx="5">
+                  <c:v>Pat Connaughton</c:v>
+                </c:pt>
+                <c:pt idx="6">
+                  <c:v>Sir'Dominic Pointer, Dani Díez, Branden Dawson, Richaun Holmes</c:v>
+                </c:pt>
+              </c:strCache>
+            </c:strRef>
+          </c:cat>
+          <c:val>
+            <c:numRef>
+              <c:f>SF!$B$2:$B$8</c:f>
+              <c:numCache>
+                <c:formatCode>General</c:formatCode>
+                <c:ptCount val="7"/>
+                <c:pt idx="0">
+                  <c:v>4.6899999999999995</c:v>
+                </c:pt>
+                <c:pt idx="1">
+                  <c:v>4.74</c:v>
+                </c:pt>
+                <c:pt idx="2">
+                  <c:v>4.76</c:v>
+                </c:pt>
+                <c:pt idx="3">
+                  <c:v>4.8199999999999994</c:v>
+                </c:pt>
+                <c:pt idx="4">
+                  <c:v>4.8599999999999994</c:v>
+                </c:pt>
+                <c:pt idx="5">
+                  <c:v>4.9300000000000006</c:v>
+                </c:pt>
+                <c:pt idx="6">
+                  <c:v>4.95</c:v>
+                </c:pt>
+              </c:numCache>
+            </c:numRef>
+          </c:val>
+        </c:ser>
+        <c:axId val="88925696"/>
+        <c:axId val="88927232"/>
+      </c:barChart>
+      <c:catAx>
+        <c:axId val="88925696"/>
+        <c:scaling>
+          <c:orientation val="minMax"/>
+        </c:scaling>
+        <c:axPos val="l"/>
+        <c:tickLblPos val="nextTo"/>
+        <c:crossAx val="88927232"/>
+        <c:crosses val="autoZero"/>
+        <c:auto val="1"/>
+        <c:lblAlgn val="ctr"/>
+        <c:lblOffset val="100"/>
+      </c:catAx>
+      <c:valAx>
+        <c:axId val="88927232"/>
+        <c:scaling>
+          <c:orientation val="minMax"/>
+        </c:scaling>
+        <c:axPos val="b"/>
+        <c:majorGridlines/>
+        <c:numFmt formatCode="General" sourceLinked="1"/>
+        <c:tickLblPos val="nextTo"/>
+        <c:crossAx val="88925696"/>
+        <c:crosses val="autoZero"/>
+        <c:crossBetween val="between"/>
+      </c:valAx>
+    </c:plotArea>
+    <c:legend>
+      <c:legendPos val="r"/>
+      <c:layout/>
+    </c:legend>
+    <c:plotVisOnly val="1"/>
+  </c:chart>
+  <c:spPr>
+    <a:ln>
+      <a:solidFill>
+        <a:srgbClr val="FF0000"/>
+      </a:solidFill>
+    </a:ln>
+  </c:spPr>
+  <c:txPr>
+    <a:bodyPr/>
+    <a:lstStyle/>
+    <a:p>
+      <a:pPr>
+        <a:defRPr sz="800"/>
+      </a:pPr>
+      <a:endParaRPr lang="en-US"/>
+    </a:p>
+  </c:txPr>
+  <c:externalData r:id="rId1"/>
+</c:chartSpace>
+</file>
+
+<file path=ppt/charts/chart5.xml><?xml version="1.0" encoding="utf-8"?>
+<c:chartSpace xmlns:c="http://schemas.openxmlformats.org/drawingml/2006/chart" xmlns:a="http://schemas.openxmlformats.org/drawingml/2006/main" xmlns:r="http://schemas.openxmlformats.org/officeDocument/2006/relationships">
+  <c:lang val="en-US"/>
+  <c:chart>
+    <c:title>
+      <c:layout/>
+    </c:title>
+    <c:plotArea>
+      <c:layout/>
+      <c:barChart>
+        <c:barDir val="bar"/>
+        <c:grouping val="clustered"/>
+        <c:ser>
+          <c:idx val="0"/>
+          <c:order val="0"/>
+          <c:tx>
+            <c:strRef>
+              <c:f>SG!$B$1</c:f>
+              <c:strCache>
+                <c:ptCount val="1"/>
+                <c:pt idx="0">
+                  <c:v>Normalized PPI</c:v>
+                </c:pt>
+              </c:strCache>
+            </c:strRef>
+          </c:tx>
+          <c:cat>
+            <c:strRef>
+              <c:f>SG!$A$2:$A$6</c:f>
+              <c:strCache>
+                <c:ptCount val="5"/>
+                <c:pt idx="0">
+                  <c:v>Cedi Osman, J. P. Tokoto, </c:v>
+                </c:pt>
+                <c:pt idx="1">
+                  <c:v>Norman Powell, Marcus Eriksson, Mario Hezonja</c:v>
+                </c:pt>
+                <c:pt idx="2">
+                  <c:v>Darrun Hilliard, Josh Richardson</c:v>
+                </c:pt>
+                <c:pt idx="3">
+                  <c:v>Rashad Vaughn, R. J. Hunter</c:v>
+                </c:pt>
+                <c:pt idx="4">
+                  <c:v>Devin Booker, Kelly Oubre Jr.</c:v>
+                </c:pt>
+              </c:strCache>
+            </c:strRef>
+          </c:cat>
+          <c:val>
+            <c:numRef>
+              <c:f>SG!$B$2:$B$6</c:f>
+              <c:numCache>
+                <c:formatCode>General</c:formatCode>
+                <c:ptCount val="5"/>
+                <c:pt idx="0">
+                  <c:v>4.75</c:v>
+                </c:pt>
+                <c:pt idx="1">
+                  <c:v>4.79</c:v>
+                </c:pt>
+                <c:pt idx="2">
+                  <c:v>4.84</c:v>
+                </c:pt>
+                <c:pt idx="3">
+                  <c:v>4.8899999999999997</c:v>
+                </c:pt>
+                <c:pt idx="4">
+                  <c:v>4.9800000000000004</c:v>
+                </c:pt>
+              </c:numCache>
+            </c:numRef>
+          </c:val>
+        </c:ser>
+        <c:axId val="89063808"/>
+        <c:axId val="89065344"/>
+      </c:barChart>
+      <c:catAx>
+        <c:axId val="89063808"/>
+        <c:scaling>
+          <c:orientation val="minMax"/>
+        </c:scaling>
+        <c:axPos val="l"/>
+        <c:tickLblPos val="nextTo"/>
+        <c:crossAx val="89065344"/>
+        <c:crosses val="autoZero"/>
+        <c:auto val="1"/>
+        <c:lblAlgn val="ctr"/>
+        <c:lblOffset val="100"/>
+      </c:catAx>
+      <c:valAx>
+        <c:axId val="89065344"/>
+        <c:scaling>
+          <c:orientation val="minMax"/>
+        </c:scaling>
+        <c:axPos val="b"/>
+        <c:majorGridlines/>
+        <c:numFmt formatCode="General" sourceLinked="1"/>
+        <c:tickLblPos val="nextTo"/>
+        <c:crossAx val="89063808"/>
+        <c:crosses val="autoZero"/>
+        <c:crossBetween val="between"/>
+      </c:valAx>
+    </c:plotArea>
+    <c:legend>
+      <c:legendPos val="r"/>
+      <c:layout/>
+    </c:legend>
+    <c:plotVisOnly val="1"/>
+  </c:chart>
+  <c:spPr>
+    <a:ln>
+      <a:solidFill>
+        <a:srgbClr val="FF0000"/>
+      </a:solidFill>
+    </a:ln>
+  </c:spPr>
+  <c:txPr>
+    <a:bodyPr/>
+    <a:lstStyle/>
+    <a:p>
+      <a:pPr>
+        <a:defRPr sz="800"/>
+      </a:pPr>
+      <a:endParaRPr lang="en-US"/>
+    </a:p>
+  </c:txPr>
+  <c:externalData r:id="rId1"/>
+</c:chartSpace>
+</file>
+
+<file path=ppt/charts/chart6.xml><?xml version="1.0" encoding="utf-8"?>
+<c:chartSpace xmlns:c="http://schemas.openxmlformats.org/drawingml/2006/chart" xmlns:a="http://schemas.openxmlformats.org/drawingml/2006/main" xmlns:r="http://schemas.openxmlformats.org/officeDocument/2006/relationships">
+  <c:lang val="en-US"/>
+  <c:chart>
+    <c:title>
+      <c:tx>
+        <c:rich>
+          <a:bodyPr/>
+          <a:lstStyle/>
+          <a:p>
+            <a:pPr>
+              <a:defRPr/>
+            </a:pPr>
+            <a:r>
+              <a:rPr lang="en-US" dirty="0"/>
+              <a:t>Draft </a:t>
+            </a:r>
+            <a:r>
+              <a:rPr lang="en-US" dirty="0" smtClean="0"/>
+              <a:t>Composition 1</a:t>
+            </a:r>
+            <a:endParaRPr lang="en-US" dirty="0"/>
+          </a:p>
+        </c:rich>
+      </c:tx>
+      <c:layout/>
+    </c:title>
+    <c:plotArea>
+      <c:layout/>
+      <c:pieChart>
+        <c:varyColors val="1"/>
+        <c:ser>
+          <c:idx val="0"/>
+          <c:order val="0"/>
+          <c:tx>
+            <c:strRef>
+              <c:f>Sheet1!$B$1</c:f>
+              <c:strCache>
+                <c:ptCount val="1"/>
+                <c:pt idx="0">
+                  <c:v>Draft Composition</c:v>
+                </c:pt>
+              </c:strCache>
+            </c:strRef>
+          </c:tx>
+          <c:spPr>
+            <a:ln>
+              <a:solidFill>
+                <a:srgbClr val="0070C0"/>
+              </a:solidFill>
+            </a:ln>
+          </c:spPr>
+          <c:cat>
+            <c:strRef>
+              <c:f>Sheet1!$A$2:$A$6</c:f>
+              <c:strCache>
+                <c:ptCount val="5"/>
+                <c:pt idx="0">
+                  <c:v>PF</c:v>
+                </c:pt>
+                <c:pt idx="1">
+                  <c:v>C</c:v>
+                </c:pt>
+                <c:pt idx="2">
+                  <c:v>PG</c:v>
+                </c:pt>
+                <c:pt idx="3">
+                  <c:v>SF</c:v>
+                </c:pt>
+                <c:pt idx="4">
+                  <c:v>SG</c:v>
+                </c:pt>
+              </c:strCache>
+            </c:strRef>
+          </c:cat>
+          <c:val>
+            <c:numRef>
+              <c:f>Sheet1!$B$2:$B$6</c:f>
+              <c:numCache>
+                <c:formatCode>General</c:formatCode>
+                <c:ptCount val="5"/>
+                <c:pt idx="0">
+                  <c:v>3</c:v>
+                </c:pt>
+                <c:pt idx="1">
+                  <c:v>2</c:v>
+                </c:pt>
+                <c:pt idx="2">
+                  <c:v>1</c:v>
+                </c:pt>
+                <c:pt idx="3">
+                  <c:v>1</c:v>
+                </c:pt>
+                <c:pt idx="4">
+                  <c:v>1</c:v>
+                </c:pt>
+              </c:numCache>
+            </c:numRef>
+          </c:val>
+        </c:ser>
+        <c:firstSliceAng val="0"/>
+      </c:pieChart>
+    </c:plotArea>
+    <c:legend>
+      <c:legendPos val="r"/>
+      <c:layout/>
+    </c:legend>
+    <c:plotVisOnly val="1"/>
+  </c:chart>
+  <c:spPr>
+    <a:ln>
+      <a:solidFill>
+        <a:srgbClr val="FF0000"/>
+      </a:solidFill>
+    </a:ln>
+  </c:spPr>
+  <c:txPr>
+    <a:bodyPr/>
+    <a:lstStyle/>
+    <a:p>
+      <a:pPr>
+        <a:defRPr sz="1800"/>
+      </a:pPr>
+      <a:endParaRPr lang="en-US"/>
+    </a:p>
+  </c:txPr>
+  <c:externalData r:id="rId1"/>
+</c:chartSpace>
+</file>
+
+<file path=ppt/charts/chart7.xml><?xml version="1.0" encoding="utf-8"?>
+<c:chartSpace xmlns:c="http://schemas.openxmlformats.org/drawingml/2006/chart" xmlns:a="http://schemas.openxmlformats.org/drawingml/2006/main" xmlns:r="http://schemas.openxmlformats.org/officeDocument/2006/relationships">
+  <c:lang val="en-US"/>
+  <c:chart>
+    <c:title>
+      <c:layout/>
+    </c:title>
+    <c:plotArea>
+      <c:layout/>
+      <c:pieChart>
+        <c:varyColors val="1"/>
+        <c:ser>
+          <c:idx val="0"/>
+          <c:order val="0"/>
+          <c:tx>
+            <c:strRef>
+              <c:f>Sheet1!$B$1</c:f>
+              <c:strCache>
+                <c:ptCount val="1"/>
+                <c:pt idx="0">
+                  <c:v>Draft Composition 2</c:v>
+                </c:pt>
+              </c:strCache>
+            </c:strRef>
+          </c:tx>
+          <c:spPr>
+            <a:ln>
+              <a:solidFill>
+                <a:srgbClr val="0070C0"/>
+              </a:solidFill>
+            </a:ln>
+          </c:spPr>
+          <c:cat>
+            <c:strRef>
+              <c:f>Sheet1!$A$2:$A$6</c:f>
+              <c:strCache>
+                <c:ptCount val="5"/>
+                <c:pt idx="0">
+                  <c:v>PF</c:v>
+                </c:pt>
+                <c:pt idx="1">
+                  <c:v>C</c:v>
+                </c:pt>
+                <c:pt idx="2">
+                  <c:v>PG</c:v>
+                </c:pt>
+                <c:pt idx="3">
+                  <c:v>SF</c:v>
+                </c:pt>
+                <c:pt idx="4">
+                  <c:v>SG</c:v>
+                </c:pt>
+              </c:strCache>
+            </c:strRef>
+          </c:cat>
+          <c:val>
+            <c:numRef>
+              <c:f>Sheet1!$B$2:$B$6</c:f>
+              <c:numCache>
+                <c:formatCode>General</c:formatCode>
+                <c:ptCount val="5"/>
+                <c:pt idx="0">
+                  <c:v>2</c:v>
+                </c:pt>
+                <c:pt idx="1">
+                  <c:v>3</c:v>
+                </c:pt>
+                <c:pt idx="2">
+                  <c:v>2</c:v>
+                </c:pt>
+                <c:pt idx="3">
+                  <c:v>1</c:v>
+                </c:pt>
+                <c:pt idx="4">
+                  <c:v>1</c:v>
+                </c:pt>
+              </c:numCache>
+            </c:numRef>
+          </c:val>
+        </c:ser>
+        <c:firstSliceAng val="0"/>
+      </c:pieChart>
+    </c:plotArea>
+    <c:legend>
+      <c:legendPos val="r"/>
+      <c:layout/>
+    </c:legend>
+    <c:plotVisOnly val="1"/>
+  </c:chart>
+  <c:spPr>
+    <a:noFill/>
+    <a:ln>
+      <a:solidFill>
+        <a:srgbClr val="FF0000"/>
+      </a:solidFill>
+    </a:ln>
+  </c:spPr>
+  <c:txPr>
+    <a:bodyPr/>
+    <a:lstStyle/>
+    <a:p>
+      <a:pPr>
+        <a:defRPr sz="1800"/>
+      </a:pPr>
+      <a:endParaRPr lang="en-US"/>
+    </a:p>
+  </c:txPr>
+  <c:externalData r:id="rId1"/>
+</c:chartSpace>
+</file>
+
 <file path=ppt/notesMasters/notesMaster1.xml><?xml version="1.0" encoding="utf-8"?>
 <p:notesMaster xmlns:a="http://schemas.openxmlformats.org/drawingml/2006/main" xmlns:r="http://schemas.openxmlformats.org/officeDocument/2006/relationships" xmlns:p="http://schemas.openxmlformats.org/presentationml/2006/main">
   <p:cSld>
@@ -206,7 +1159,7 @@
             <a:fld id="{8017A0A4-B233-440E-B5C4-66498F24515F}" type="datetimeFigureOut">
               <a:rPr lang="en-US" smtClean="0"/>
               <a:pPr/>
-              <a:t>9/13/2016</a:t>
+              <a:t>9/15/2016</a:t>
             </a:fld>
             <a:endParaRPr lang="en-US" dirty="0"/>
           </a:p>
@@ -699,7 +1652,7 @@
             <a:fld id="{272070E0-19FA-42E7-A14D-7AAA8E3D8015}" type="datetime1">
               <a:rPr lang="en-US" smtClean="0"/>
               <a:pPr/>
-              <a:t>9/13/2016</a:t>
+              <a:t>9/15/2016</a:t>
             </a:fld>
             <a:endParaRPr lang="en-US" dirty="0"/>
           </a:p>
@@ -908,7 +1861,7 @@
             <a:fld id="{24982A6A-BB1C-4E36-8BBF-A4E9185A4C94}" type="datetime1">
               <a:rPr lang="en-US" smtClean="0"/>
               <a:pPr/>
-              <a:t>9/13/2016</a:t>
+              <a:t>9/15/2016</a:t>
             </a:fld>
             <a:endParaRPr lang="en-US" dirty="0"/>
           </a:p>
@@ -1165,7 +2118,7 @@
             <a:fld id="{0FF0B491-FA27-4F2C-91DF-5131D7232A7E}" type="datetime1">
               <a:rPr lang="en-US" smtClean="0"/>
               <a:pPr/>
-              <a:t>9/13/2016</a:t>
+              <a:t>9/15/2016</a:t>
             </a:fld>
             <a:endParaRPr lang="en-US" dirty="0"/>
           </a:p>
@@ -1340,7 +2293,7 @@
             <a:fld id="{38760DFB-E819-4906-B6F3-1E512F7EF445}" type="datetime1">
               <a:rPr lang="en-US" smtClean="0"/>
               <a:pPr/>
-              <a:t>9/13/2016</a:t>
+              <a:t>9/15/2016</a:t>
             </a:fld>
             <a:endParaRPr lang="en-US" dirty="0"/>
           </a:p>
@@ -1684,7 +2637,7 @@
             <a:fld id="{68EBB65B-B722-4308-A938-A080543A84D0}" type="datetime1">
               <a:rPr lang="en-US" smtClean="0"/>
               <a:pPr/>
-              <a:t>9/13/2016</a:t>
+              <a:t>9/15/2016</a:t>
             </a:fld>
             <a:endParaRPr lang="en-US" dirty="0"/>
           </a:p>
@@ -1960,7 +2913,7 @@
             <a:fld id="{99B6280E-2F5A-4E91-B5C3-6DF230DF610F}" type="datetime1">
               <a:rPr lang="en-US" smtClean="0"/>
               <a:pPr/>
-              <a:t>9/13/2016</a:t>
+              <a:t>9/15/2016</a:t>
             </a:fld>
             <a:endParaRPr lang="en-US" dirty="0"/>
           </a:p>
@@ -2340,7 +3293,7 @@
             <a:fld id="{02F3BAD2-7BC1-4DB3-AC05-D2EB96E74654}" type="datetime1">
               <a:rPr lang="en-US" smtClean="0"/>
               <a:pPr/>
-              <a:t>9/13/2016</a:t>
+              <a:t>9/15/2016</a:t>
             </a:fld>
             <a:endParaRPr lang="en-US" dirty="0"/>
           </a:p>
@@ -2459,7 +3412,7 @@
             <a:fld id="{ADE28265-8FD0-48A8-A3E0-BE5C71EA2A0B}" type="datetime1">
               <a:rPr lang="en-US" smtClean="0"/>
               <a:pPr/>
-              <a:t>9/13/2016</a:t>
+              <a:t>9/15/2016</a:t>
             </a:fld>
             <a:endParaRPr lang="en-US" dirty="0"/>
           </a:p>
@@ -2631,7 +3584,7 @@
             <a:fld id="{F1426E64-C49E-483A-A1E7-FB677D74B245}" type="datetime1">
               <a:rPr lang="en-US" smtClean="0"/>
               <a:pPr/>
-              <a:t>9/13/2016</a:t>
+              <a:t>9/15/2016</a:t>
             </a:fld>
             <a:endParaRPr lang="en-US" dirty="0"/>
           </a:p>
@@ -2986,7 +3939,7 @@
             <a:fld id="{DCAE782F-3659-4CAD-B6B6-F05EA40A666E}" type="datetime1">
               <a:rPr lang="en-US" smtClean="0"/>
               <a:pPr/>
-              <a:t>9/13/2016</a:t>
+              <a:t>9/15/2016</a:t>
             </a:fld>
             <a:endParaRPr lang="en-US" dirty="0"/>
           </a:p>
@@ -3366,7 +4319,7 @@
             <a:fld id="{436EFD29-8B74-4188-908A-6D2C9BFB72BD}" type="datetime1">
               <a:rPr lang="en-US" smtClean="0"/>
               <a:pPr/>
-              <a:t>9/13/2016</a:t>
+              <a:t>9/15/2016</a:t>
             </a:fld>
             <a:endParaRPr lang="en-US" dirty="0"/>
           </a:p>
@@ -3654,7 +4607,7 @@
             <a:fld id="{9D0BA1F6-C614-43DB-89DA-83B3C90B5AD9}" type="datetime1">
               <a:rPr lang="en-US" smtClean="0"/>
               <a:pPr/>
-              <a:t>9/13/2016</a:t>
+              <a:t>9/15/2016</a:t>
             </a:fld>
             <a:endParaRPr lang="en-US" dirty="0"/>
           </a:p>
@@ -4593,6 +5546,9 @@
           <a:p>
             <a:r>
               <a:rPr lang="en-US" dirty="0" smtClean="0">
+                <a:solidFill>
+                  <a:srgbClr val="0070C0"/>
+                </a:solidFill>
                 <a:latin typeface="Lucida Console" pitchFamily="49" charset="0"/>
               </a:rPr>
               <a:t>Actual NBA Draft top picks for 2015 season</a:t>
@@ -5181,16 +6137,126 @@
           <a:p>
             <a:r>
               <a:rPr lang="en-US" dirty="0" smtClean="0">
+                <a:solidFill>
+                  <a:srgbClr val="0070C0"/>
+                </a:solidFill>
                 <a:latin typeface="Lucida Console" pitchFamily="49" charset="0"/>
               </a:rPr>
               <a:t>Player Ranking based on normalized PPI</a:t>
             </a:r>
             <a:endParaRPr lang="en-US" dirty="0">
+              <a:solidFill>
+                <a:srgbClr val="0070C0"/>
+              </a:solidFill>
               <a:latin typeface="Lucida Console" pitchFamily="49" charset="0"/>
             </a:endParaRPr>
           </a:p>
         </p:txBody>
       </p:sp>
+      <p:graphicFrame>
+        <p:nvGraphicFramePr>
+          <p:cNvPr id="14" name="Chart 13"/>
+          <p:cNvGraphicFramePr/>
+          <p:nvPr/>
+        </p:nvGraphicFramePr>
+        <p:xfrm>
+          <a:off x="5150168" y="1440725"/>
+          <a:ext cx="5822631" cy="2033995"/>
+        </p:xfrm>
+        <a:graphic>
+          <a:graphicData uri="http://schemas.openxmlformats.org/drawingml/2006/chart">
+            <c:chart xmlns:c="http://schemas.openxmlformats.org/drawingml/2006/chart" xmlns:r="http://schemas.openxmlformats.org/officeDocument/2006/relationships" r:id="rId2"/>
+          </a:graphicData>
+        </a:graphic>
+      </p:graphicFrame>
+      <p:graphicFrame>
+        <p:nvGraphicFramePr>
+          <p:cNvPr id="15" name="Chart 14"/>
+          <p:cNvGraphicFramePr/>
+          <p:nvPr/>
+        </p:nvGraphicFramePr>
+        <p:xfrm>
+          <a:off x="5088390" y="3799659"/>
+          <a:ext cx="5934077" cy="2457449"/>
+        </p:xfrm>
+        <a:graphic>
+          <a:graphicData uri="http://schemas.openxmlformats.org/drawingml/2006/chart">
+            <c:chart xmlns:c="http://schemas.openxmlformats.org/drawingml/2006/chart" xmlns:r="http://schemas.openxmlformats.org/officeDocument/2006/relationships" r:id="rId3"/>
+          </a:graphicData>
+        </a:graphic>
+      </p:graphicFrame>
+      <p:cxnSp>
+        <p:nvCxnSpPr>
+          <p:cNvPr id="16" name="Straight Arrow Connector 15"/>
+          <p:cNvCxnSpPr/>
+          <p:nvPr/>
+        </p:nvCxnSpPr>
+        <p:spPr>
+          <a:xfrm rot="5400000" flipH="1" flipV="1">
+            <a:off x="4415250" y="1463040"/>
+            <a:ext cx="744580" cy="718458"/>
+          </a:xfrm>
+          <a:prstGeom prst="straightConnector1">
+            <a:avLst/>
+          </a:prstGeom>
+          <a:ln w="31750">
+            <a:solidFill>
+              <a:srgbClr val="FF0000"/>
+            </a:solidFill>
+            <a:tailEnd type="arrow"/>
+          </a:ln>
+        </p:spPr>
+        <p:style>
+          <a:lnRef idx="1">
+            <a:schemeClr val="accent1"/>
+          </a:lnRef>
+          <a:fillRef idx="0">
+            <a:schemeClr val="accent1"/>
+          </a:fillRef>
+          <a:effectRef idx="0">
+            <a:schemeClr val="accent1"/>
+          </a:effectRef>
+          <a:fontRef idx="minor">
+            <a:schemeClr val="tx1"/>
+          </a:fontRef>
+        </p:style>
+      </p:cxnSp>
+      <p:cxnSp>
+        <p:nvCxnSpPr>
+          <p:cNvPr id="19" name="Straight Arrow Connector 18"/>
+          <p:cNvCxnSpPr/>
+          <p:nvPr/>
+        </p:nvCxnSpPr>
+        <p:spPr>
+          <a:xfrm rot="5400000" flipH="1" flipV="1">
+            <a:off x="4397832" y="3823064"/>
+            <a:ext cx="744580" cy="718458"/>
+          </a:xfrm>
+          <a:prstGeom prst="straightConnector1">
+            <a:avLst/>
+          </a:prstGeom>
+          <a:ln w="31750">
+            <a:solidFill>
+              <a:srgbClr val="FF0000"/>
+            </a:solidFill>
+            <a:tailEnd type="arrow"/>
+          </a:ln>
+        </p:spPr>
+        <p:style>
+          <a:lnRef idx="1">
+            <a:schemeClr val="accent1"/>
+          </a:lnRef>
+          <a:fillRef idx="0">
+            <a:schemeClr val="accent1"/>
+          </a:fillRef>
+          <a:effectRef idx="0">
+            <a:schemeClr val="accent1"/>
+          </a:effectRef>
+          <a:fontRef idx="minor">
+            <a:schemeClr val="tx1"/>
+          </a:fontRef>
+        </p:style>
+      </p:cxnSp>
     </p:spTree>
   </p:cSld>
   <p:clrMapOvr>
@@ -5331,16 +6397,7 @@
                 </a:solidFill>
                 <a:latin typeface="Lucida Console" pitchFamily="49" charset="0"/>
               </a:rPr>
-              <a:t>Model Accuracy Test </a:t>
-            </a:r>
-            <a:r>
-              <a:rPr lang="en-US" sz="3600" dirty="0" smtClean="0">
-                <a:solidFill>
-                  <a:schemeClr val="tx1"/>
-                </a:solidFill>
-                <a:latin typeface="Lucida Console" pitchFamily="49" charset="0"/>
-              </a:rPr>
-              <a:t>Results (2)</a:t>
+              <a:t>Model Accuracy Test Results (2)</a:t>
             </a:r>
             <a:endParaRPr lang="en-US" sz="3600" dirty="0">
               <a:solidFill>
@@ -5977,6 +7034,110 @@
           </a:graphicData>
         </a:graphic>
       </p:graphicFrame>
+      <p:graphicFrame>
+        <p:nvGraphicFramePr>
+          <p:cNvPr id="9" name="Chart 8"/>
+          <p:cNvGraphicFramePr/>
+          <p:nvPr/>
+        </p:nvGraphicFramePr>
+        <p:xfrm>
+          <a:off x="5338354" y="907868"/>
+          <a:ext cx="5464628" cy="2566851"/>
+        </p:xfrm>
+        <a:graphic>
+          <a:graphicData uri="http://schemas.openxmlformats.org/drawingml/2006/chart">
+            <c:chart xmlns:c="http://schemas.openxmlformats.org/drawingml/2006/chart" xmlns:r="http://schemas.openxmlformats.org/officeDocument/2006/relationships" r:id="rId2"/>
+          </a:graphicData>
+        </a:graphic>
+      </p:graphicFrame>
+      <p:cxnSp>
+        <p:nvCxnSpPr>
+          <p:cNvPr id="10" name="Straight Arrow Connector 9"/>
+          <p:cNvCxnSpPr/>
+          <p:nvPr/>
+        </p:nvCxnSpPr>
+        <p:spPr>
+          <a:xfrm flipV="1">
+            <a:off x="4428309" y="953590"/>
+            <a:ext cx="927463" cy="679268"/>
+          </a:xfrm>
+          <a:prstGeom prst="straightConnector1">
+            <a:avLst/>
+          </a:prstGeom>
+          <a:ln w="31750">
+            <a:solidFill>
+              <a:srgbClr val="FF0000"/>
+            </a:solidFill>
+            <a:tailEnd type="arrow"/>
+          </a:ln>
+        </p:spPr>
+        <p:style>
+          <a:lnRef idx="1">
+            <a:schemeClr val="accent1"/>
+          </a:lnRef>
+          <a:fillRef idx="0">
+            <a:schemeClr val="accent1"/>
+          </a:fillRef>
+          <a:effectRef idx="0">
+            <a:schemeClr val="accent1"/>
+          </a:effectRef>
+          <a:fontRef idx="minor">
+            <a:schemeClr val="tx1"/>
+          </a:fontRef>
+        </p:style>
+      </p:cxnSp>
+      <p:graphicFrame>
+        <p:nvGraphicFramePr>
+          <p:cNvPr id="12" name="Chart 11"/>
+          <p:cNvGraphicFramePr/>
+          <p:nvPr/>
+        </p:nvGraphicFramePr>
+        <p:xfrm>
+          <a:off x="5338353" y="3585754"/>
+          <a:ext cx="5595258" cy="2671354"/>
+        </p:xfrm>
+        <a:graphic>
+          <a:graphicData uri="http://schemas.openxmlformats.org/drawingml/2006/chart">
+            <c:chart xmlns:c="http://schemas.openxmlformats.org/drawingml/2006/chart" xmlns:r="http://schemas.openxmlformats.org/officeDocument/2006/relationships" r:id="rId3"/>
+          </a:graphicData>
+        </a:graphic>
+      </p:graphicFrame>
+      <p:cxnSp>
+        <p:nvCxnSpPr>
+          <p:cNvPr id="14" name="Straight Arrow Connector 13"/>
+          <p:cNvCxnSpPr/>
+          <p:nvPr/>
+        </p:nvCxnSpPr>
+        <p:spPr>
+          <a:xfrm flipV="1">
+            <a:off x="4428309" y="3587933"/>
+            <a:ext cx="923112" cy="370113"/>
+          </a:xfrm>
+          <a:prstGeom prst="straightConnector1">
+            <a:avLst/>
+          </a:prstGeom>
+          <a:ln w="31750">
+            <a:solidFill>
+              <a:srgbClr val="FF0000"/>
+            </a:solidFill>
+            <a:tailEnd type="arrow"/>
+          </a:ln>
+        </p:spPr>
+        <p:style>
+          <a:lnRef idx="1">
+            <a:schemeClr val="accent1"/>
+          </a:lnRef>
+          <a:fillRef idx="0">
+            <a:schemeClr val="accent1"/>
+          </a:fillRef>
+          <a:effectRef idx="0">
+            <a:schemeClr val="accent1"/>
+          </a:effectRef>
+          <a:fontRef idx="minor">
+            <a:schemeClr val="tx1"/>
+          </a:fontRef>
+        </p:style>
+      </p:cxnSp>
     </p:spTree>
   </p:cSld>
   <p:clrMapOvr>
@@ -6117,16 +7278,7 @@
                 </a:solidFill>
                 <a:latin typeface="Lucida Console" pitchFamily="49" charset="0"/>
               </a:rPr>
-              <a:t>Model Accuracy Test Results </a:t>
-            </a:r>
-            <a:r>
-              <a:rPr lang="en-US" sz="3600" dirty="0" smtClean="0">
-                <a:solidFill>
-                  <a:schemeClr val="tx1"/>
-                </a:solidFill>
-                <a:latin typeface="Lucida Console" pitchFamily="49" charset="0"/>
-              </a:rPr>
-              <a:t>(3)</a:t>
+              <a:t>Model Accuracy Test Results (3)</a:t>
             </a:r>
             <a:endParaRPr lang="en-US" sz="3600" dirty="0">
               <a:solidFill>
@@ -6513,6 +7665,442 @@
           </a:graphicData>
         </a:graphic>
       </p:graphicFrame>
+      <p:graphicFrame>
+        <p:nvGraphicFramePr>
+          <p:cNvPr id="9" name="Chart 8"/>
+          <p:cNvGraphicFramePr/>
+          <p:nvPr/>
+        </p:nvGraphicFramePr>
+        <p:xfrm>
+          <a:off x="5482045" y="1103811"/>
+          <a:ext cx="6000205" cy="2331720"/>
+        </p:xfrm>
+        <a:graphic>
+          <a:graphicData uri="http://schemas.openxmlformats.org/drawingml/2006/chart">
+            <c:chart xmlns:c="http://schemas.openxmlformats.org/drawingml/2006/chart" xmlns:r="http://schemas.openxmlformats.org/officeDocument/2006/relationships" r:id="rId2"/>
+          </a:graphicData>
+        </a:graphic>
+      </p:graphicFrame>
+      <p:sp>
+        <p:nvSpPr>
+          <p:cNvPr id="17" name="Right Brace 16"/>
+          <p:cNvSpPr/>
+          <p:nvPr/>
+        </p:nvSpPr>
+        <p:spPr>
+          <a:xfrm>
+            <a:off x="4454434" y="1541417"/>
+            <a:ext cx="209006" cy="731520"/>
+          </a:xfrm>
+          <a:prstGeom prst="rightBrace">
+            <a:avLst/>
+          </a:prstGeom>
+          <a:ln w="31750">
+            <a:solidFill>
+              <a:srgbClr val="FF0000"/>
+            </a:solidFill>
+            <a:tailEnd type="arrow"/>
+          </a:ln>
+        </p:spPr>
+        <p:style>
+          <a:lnRef idx="1">
+            <a:schemeClr val="accent1"/>
+          </a:lnRef>
+          <a:fillRef idx="0">
+            <a:schemeClr val="accent1"/>
+          </a:fillRef>
+          <a:effectRef idx="0">
+            <a:schemeClr val="accent1"/>
+          </a:effectRef>
+          <a:fontRef idx="minor">
+            <a:schemeClr val="tx1"/>
+          </a:fontRef>
+        </p:style>
+        <p:txBody>
+          <a:bodyPr rtlCol="0" anchor="ctr"/>
+          <a:lstStyle/>
+          <a:p>
+            <a:pPr algn="ctr"/>
+            <a:endParaRPr lang="en-US" dirty="0"/>
+          </a:p>
+        </p:txBody>
+      </p:sp>
+      <p:cxnSp>
+        <p:nvCxnSpPr>
+          <p:cNvPr id="18" name="Straight Arrow Connector 17"/>
+          <p:cNvCxnSpPr>
+            <a:stCxn id="17" idx="1"/>
+          </p:cNvCxnSpPr>
+          <p:nvPr/>
+        </p:nvCxnSpPr>
+        <p:spPr>
+          <a:xfrm rot="10800000" flipH="1">
+            <a:off x="4663440" y="1606731"/>
+            <a:ext cx="1711234" cy="300446"/>
+          </a:xfrm>
+          <a:prstGeom prst="straightConnector1">
+            <a:avLst/>
+          </a:prstGeom>
+          <a:ln w="31750">
+            <a:solidFill>
+              <a:srgbClr val="FF0000"/>
+            </a:solidFill>
+            <a:tailEnd type="arrow"/>
+          </a:ln>
+        </p:spPr>
+        <p:style>
+          <a:lnRef idx="1">
+            <a:schemeClr val="accent1"/>
+          </a:lnRef>
+          <a:fillRef idx="0">
+            <a:schemeClr val="accent1"/>
+          </a:fillRef>
+          <a:effectRef idx="0">
+            <a:schemeClr val="accent1"/>
+          </a:effectRef>
+          <a:fontRef idx="minor">
+            <a:schemeClr val="tx1"/>
+          </a:fontRef>
+        </p:style>
+      </p:cxnSp>
+      <p:sp>
+        <p:nvSpPr>
+          <p:cNvPr id="21" name="Right Brace 20"/>
+          <p:cNvSpPr/>
+          <p:nvPr/>
+        </p:nvSpPr>
+        <p:spPr>
+          <a:xfrm>
+            <a:off x="4480559" y="2351314"/>
+            <a:ext cx="129323" cy="796835"/>
+          </a:xfrm>
+          <a:prstGeom prst="rightBrace">
+            <a:avLst/>
+          </a:prstGeom>
+          <a:ln w="31750">
+            <a:solidFill>
+              <a:srgbClr val="0070C0"/>
+            </a:solidFill>
+            <a:tailEnd type="arrow"/>
+          </a:ln>
+        </p:spPr>
+        <p:style>
+          <a:lnRef idx="1">
+            <a:schemeClr val="accent1"/>
+          </a:lnRef>
+          <a:fillRef idx="0">
+            <a:schemeClr val="accent1"/>
+          </a:fillRef>
+          <a:effectRef idx="0">
+            <a:schemeClr val="accent1"/>
+          </a:effectRef>
+          <a:fontRef idx="minor">
+            <a:schemeClr val="tx1"/>
+          </a:fontRef>
+        </p:style>
+        <p:txBody>
+          <a:bodyPr rtlCol="0" anchor="ctr"/>
+          <a:lstStyle/>
+          <a:p>
+            <a:pPr algn="ctr"/>
+            <a:endParaRPr lang="en-US" dirty="0"/>
+          </a:p>
+        </p:txBody>
+      </p:sp>
+      <p:cxnSp>
+        <p:nvCxnSpPr>
+          <p:cNvPr id="22" name="Straight Arrow Connector 21"/>
+          <p:cNvCxnSpPr/>
+          <p:nvPr/>
+        </p:nvCxnSpPr>
+        <p:spPr>
+          <a:xfrm flipV="1">
+            <a:off x="4619897" y="1946366"/>
+            <a:ext cx="1780903" cy="805543"/>
+          </a:xfrm>
+          <a:prstGeom prst="straightConnector1">
+            <a:avLst/>
+          </a:prstGeom>
+          <a:ln w="31750">
+            <a:solidFill>
+              <a:srgbClr val="0070C0"/>
+            </a:solidFill>
+            <a:tailEnd type="arrow"/>
+          </a:ln>
+        </p:spPr>
+        <p:style>
+          <a:lnRef idx="1">
+            <a:schemeClr val="accent1"/>
+          </a:lnRef>
+          <a:fillRef idx="0">
+            <a:schemeClr val="accent1"/>
+          </a:fillRef>
+          <a:effectRef idx="0">
+            <a:schemeClr val="accent1"/>
+          </a:effectRef>
+          <a:fontRef idx="minor">
+            <a:schemeClr val="tx1"/>
+          </a:fontRef>
+        </p:style>
+      </p:cxnSp>
+      <p:sp>
+        <p:nvSpPr>
+          <p:cNvPr id="24" name="Right Brace 23"/>
+          <p:cNvSpPr/>
+          <p:nvPr/>
+        </p:nvSpPr>
+        <p:spPr>
+          <a:xfrm>
+            <a:off x="4389121" y="3174275"/>
+            <a:ext cx="130628" cy="339634"/>
+          </a:xfrm>
+          <a:prstGeom prst="rightBrace">
+            <a:avLst/>
+          </a:prstGeom>
+          <a:ln w="31750">
+            <a:solidFill>
+              <a:srgbClr val="00B050"/>
+            </a:solidFill>
+            <a:tailEnd type="arrow"/>
+          </a:ln>
+        </p:spPr>
+        <p:style>
+          <a:lnRef idx="1">
+            <a:schemeClr val="accent1"/>
+          </a:lnRef>
+          <a:fillRef idx="0">
+            <a:schemeClr val="accent1"/>
+          </a:fillRef>
+          <a:effectRef idx="0">
+            <a:schemeClr val="accent1"/>
+          </a:effectRef>
+          <a:fontRef idx="minor">
+            <a:schemeClr val="tx1"/>
+          </a:fontRef>
+        </p:style>
+        <p:txBody>
+          <a:bodyPr rtlCol="0" anchor="ctr"/>
+          <a:lstStyle/>
+          <a:p>
+            <a:pPr algn="ctr"/>
+            <a:endParaRPr lang="en-US" dirty="0"/>
+          </a:p>
+        </p:txBody>
+      </p:sp>
+      <p:cxnSp>
+        <p:nvCxnSpPr>
+          <p:cNvPr id="25" name="Straight Arrow Connector 24"/>
+          <p:cNvCxnSpPr/>
+          <p:nvPr/>
+        </p:nvCxnSpPr>
+        <p:spPr>
+          <a:xfrm flipV="1">
+            <a:off x="4515395" y="2377440"/>
+            <a:ext cx="2159725" cy="1001486"/>
+          </a:xfrm>
+          <a:prstGeom prst="straightConnector1">
+            <a:avLst/>
+          </a:prstGeom>
+          <a:ln w="31750">
+            <a:solidFill>
+              <a:srgbClr val="00B050"/>
+            </a:solidFill>
+            <a:tailEnd type="arrow"/>
+          </a:ln>
+        </p:spPr>
+        <p:style>
+          <a:lnRef idx="1">
+            <a:schemeClr val="accent1"/>
+          </a:lnRef>
+          <a:fillRef idx="0">
+            <a:schemeClr val="accent1"/>
+          </a:fillRef>
+          <a:effectRef idx="0">
+            <a:schemeClr val="accent1"/>
+          </a:effectRef>
+          <a:fontRef idx="minor">
+            <a:schemeClr val="tx1"/>
+          </a:fontRef>
+        </p:style>
+      </p:cxnSp>
+      <p:sp>
+        <p:nvSpPr>
+          <p:cNvPr id="28" name="Rounded Rectangle 27"/>
+          <p:cNvSpPr/>
+          <p:nvPr/>
+        </p:nvSpPr>
+        <p:spPr>
+          <a:xfrm>
+            <a:off x="7694023" y="2455818"/>
+            <a:ext cx="2090057" cy="574765"/>
+          </a:xfrm>
+          <a:prstGeom prst="roundRect">
+            <a:avLst/>
+          </a:prstGeom>
+          <a:noFill/>
+          <a:ln w="31750">
+            <a:solidFill>
+              <a:srgbClr val="7030A0">
+                <a:alpha val="99000"/>
+              </a:srgbClr>
+            </a:solidFill>
+          </a:ln>
+        </p:spPr>
+        <p:style>
+          <a:lnRef idx="2">
+            <a:schemeClr val="accent1">
+              <a:shade val="50000"/>
+            </a:schemeClr>
+          </a:lnRef>
+          <a:fillRef idx="1">
+            <a:schemeClr val="accent1"/>
+          </a:fillRef>
+          <a:effectRef idx="0">
+            <a:schemeClr val="accent1"/>
+          </a:effectRef>
+          <a:fontRef idx="minor">
+            <a:schemeClr val="lt1"/>
+          </a:fontRef>
+        </p:style>
+        <p:txBody>
+          <a:bodyPr rtlCol="0" anchor="ctr"/>
+          <a:lstStyle/>
+          <a:p>
+            <a:pPr algn="ctr"/>
+            <a:endParaRPr lang="en-US" dirty="0"/>
+          </a:p>
+        </p:txBody>
+      </p:sp>
+      <p:cxnSp>
+        <p:nvCxnSpPr>
+          <p:cNvPr id="29" name="Straight Arrow Connector 28"/>
+          <p:cNvCxnSpPr/>
+          <p:nvPr/>
+        </p:nvCxnSpPr>
+        <p:spPr>
+          <a:xfrm rot="16200000" flipH="1">
+            <a:off x="8754293" y="3437707"/>
+            <a:ext cx="827319" cy="4356"/>
+          </a:xfrm>
+          <a:prstGeom prst="straightConnector1">
+            <a:avLst/>
+          </a:prstGeom>
+          <a:ln w="31750">
+            <a:solidFill>
+              <a:srgbClr val="7030A0"/>
+            </a:solidFill>
+            <a:tailEnd type="arrow"/>
+          </a:ln>
+        </p:spPr>
+        <p:style>
+          <a:lnRef idx="1">
+            <a:schemeClr val="accent1"/>
+          </a:lnRef>
+          <a:fillRef idx="0">
+            <a:schemeClr val="accent1"/>
+          </a:fillRef>
+          <a:effectRef idx="0">
+            <a:schemeClr val="accent1"/>
+          </a:effectRef>
+          <a:fontRef idx="minor">
+            <a:schemeClr val="tx1"/>
+          </a:fontRef>
+        </p:style>
+      </p:cxnSp>
+      <p:sp>
+        <p:nvSpPr>
+          <p:cNvPr id="33" name="Rounded Rectangle 32"/>
+          <p:cNvSpPr/>
+          <p:nvPr/>
+        </p:nvSpPr>
+        <p:spPr>
+          <a:xfrm>
+            <a:off x="7210695" y="3879670"/>
+            <a:ext cx="4193179" cy="862148"/>
+          </a:xfrm>
+          <a:prstGeom prst="roundRect">
+            <a:avLst/>
+          </a:prstGeom>
+          <a:noFill/>
+          <a:ln w="31750">
+            <a:solidFill>
+              <a:srgbClr val="7030A0"/>
+            </a:solidFill>
+          </a:ln>
+        </p:spPr>
+        <p:style>
+          <a:lnRef idx="2">
+            <a:schemeClr val="accent1">
+              <a:shade val="50000"/>
+            </a:schemeClr>
+          </a:lnRef>
+          <a:fillRef idx="1">
+            <a:schemeClr val="accent1"/>
+          </a:fillRef>
+          <a:effectRef idx="0">
+            <a:schemeClr val="accent1"/>
+          </a:effectRef>
+          <a:fontRef idx="minor">
+            <a:schemeClr val="lt1"/>
+          </a:fontRef>
+        </p:style>
+        <p:txBody>
+          <a:bodyPr rtlCol="0" anchor="ctr"/>
+          <a:lstStyle/>
+          <a:p>
+            <a:pPr algn="ctr"/>
+            <a:r>
+              <a:rPr lang="en-US" dirty="0" smtClean="0">
+                <a:solidFill>
+                  <a:schemeClr val="tx1"/>
+                </a:solidFill>
+                <a:latin typeface="Lucida Console" pitchFamily="49" charset="0"/>
+              </a:rPr>
+              <a:t>Cluster of players who can be included in draft with +-2% difference in performance</a:t>
+            </a:r>
+            <a:endParaRPr lang="en-US" dirty="0">
+              <a:solidFill>
+                <a:schemeClr val="tx1"/>
+              </a:solidFill>
+              <a:latin typeface="Lucida Console" pitchFamily="49" charset="0"/>
+            </a:endParaRPr>
+          </a:p>
+        </p:txBody>
+      </p:sp>
+      <p:sp>
+        <p:nvSpPr>
+          <p:cNvPr id="35" name="TextBox 34"/>
+          <p:cNvSpPr txBox="1"/>
+          <p:nvPr/>
+        </p:nvSpPr>
+        <p:spPr>
+          <a:xfrm>
+            <a:off x="627018" y="4924697"/>
+            <a:ext cx="9875520" cy="1200329"/>
+          </a:xfrm>
+          <a:prstGeom prst="rect">
+            <a:avLst/>
+          </a:prstGeom>
+          <a:noFill/>
+        </p:spPr>
+        <p:txBody>
+          <a:bodyPr wrap="square" rtlCol="0">
+            <a:spAutoFit/>
+          </a:bodyPr>
+          <a:lstStyle/>
+          <a:p>
+            <a:r>
+              <a:rPr lang="en-US" sz="2400" dirty="0" smtClean="0">
+                <a:latin typeface="Lucida Console" pitchFamily="49" charset="0"/>
+              </a:rPr>
+              <a:t>The player ranking developed by predictive model derived PPI match to 98% of the actual NBA draft for 2015 season</a:t>
+            </a:r>
+            <a:endParaRPr lang="en-US" sz="2400" dirty="0">
+              <a:latin typeface="Lucida Console" pitchFamily="49" charset="0"/>
+            </a:endParaRPr>
+          </a:p>
+        </p:txBody>
+      </p:sp>
     </p:spTree>
   </p:cSld>
   <p:clrMapOvr>
@@ -6736,6 +8324,219 @@
           </a:p>
         </p:txBody>
       </p:sp>
+      <p:sp>
+        <p:nvSpPr>
+          <p:cNvPr id="8" name="TextBox 7"/>
+          <p:cNvSpPr txBox="1"/>
+          <p:nvPr/>
+        </p:nvSpPr>
+        <p:spPr>
+          <a:xfrm>
+            <a:off x="770708" y="1489165"/>
+            <a:ext cx="10593978" cy="1477328"/>
+          </a:xfrm>
+          <a:prstGeom prst="rect">
+            <a:avLst/>
+          </a:prstGeom>
+          <a:noFill/>
+        </p:spPr>
+        <p:txBody>
+          <a:bodyPr wrap="square" rtlCol="0">
+            <a:spAutoFit/>
+          </a:bodyPr>
+          <a:lstStyle/>
+          <a:p>
+            <a:r>
+              <a:rPr lang="en-US" dirty="0" smtClean="0">
+                <a:solidFill>
+                  <a:srgbClr val="0070C0"/>
+                </a:solidFill>
+                <a:latin typeface="Lucida Console" pitchFamily="49" charset="0"/>
+              </a:rPr>
+              <a:t>List of the players classified as per their PPI’s and position of play</a:t>
+            </a:r>
+          </a:p>
+          <a:p>
+            <a:endParaRPr lang="en-US" dirty="0" smtClean="0">
+              <a:solidFill>
+                <a:srgbClr val="0070C0"/>
+              </a:solidFill>
+              <a:latin typeface="Lucida Console" pitchFamily="49" charset="0"/>
+            </a:endParaRPr>
+          </a:p>
+          <a:p>
+            <a:endParaRPr lang="en-US" dirty="0" smtClean="0">
+              <a:solidFill>
+                <a:srgbClr val="0070C0"/>
+              </a:solidFill>
+              <a:latin typeface="Lucida Console" pitchFamily="49" charset="0"/>
+            </a:endParaRPr>
+          </a:p>
+          <a:p>
+            <a:endParaRPr lang="en-US" dirty="0" smtClean="0">
+              <a:solidFill>
+                <a:srgbClr val="0070C0"/>
+              </a:solidFill>
+              <a:latin typeface="Lucida Console" pitchFamily="49" charset="0"/>
+            </a:endParaRPr>
+          </a:p>
+          <a:p>
+            <a:r>
+              <a:rPr lang="en-US" dirty="0" smtClean="0">
+                <a:solidFill>
+                  <a:srgbClr val="0070C0"/>
+                </a:solidFill>
+                <a:latin typeface="Lucida Console" pitchFamily="49" charset="0"/>
+              </a:rPr>
+              <a:t> </a:t>
+            </a:r>
+            <a:endParaRPr lang="en-US" dirty="0">
+              <a:solidFill>
+                <a:srgbClr val="0070C0"/>
+              </a:solidFill>
+              <a:latin typeface="Lucida Console" pitchFamily="49" charset="0"/>
+            </a:endParaRPr>
+          </a:p>
+        </p:txBody>
+      </p:sp>
+      <p:graphicFrame>
+        <p:nvGraphicFramePr>
+          <p:cNvPr id="10" name="Object 9"/>
+          <p:cNvGraphicFramePr>
+            <a:graphicFrameLocks noChangeAspect="1"/>
+          </p:cNvGraphicFramePr>
+          <p:nvPr/>
+        </p:nvGraphicFramePr>
+        <p:xfrm>
+          <a:off x="1314993" y="1905182"/>
+          <a:ext cx="1715589" cy="771525"/>
+        </p:xfrm>
+        <a:graphic>
+          <a:graphicData uri="http://schemas.openxmlformats.org/presentationml/2006/ole">
+            <p:oleObj spid="_x0000_s1027" name="Worksheet" showAsIcon="1" r:id="rId3" imgW="914400" imgH="771480" progId="Excel.Sheet.12">
+              <p:link updateAutomatic="1"/>
+            </p:oleObj>
+          </a:graphicData>
+        </a:graphic>
+      </p:graphicFrame>
+      <p:sp>
+        <p:nvSpPr>
+          <p:cNvPr id="12" name="TextBox 11"/>
+          <p:cNvSpPr txBox="1"/>
+          <p:nvPr/>
+        </p:nvSpPr>
+        <p:spPr>
+          <a:xfrm>
+            <a:off x="809896" y="3148148"/>
+            <a:ext cx="9392195" cy="646331"/>
+          </a:xfrm>
+          <a:prstGeom prst="rect">
+            <a:avLst/>
+          </a:prstGeom>
+          <a:noFill/>
+        </p:spPr>
+        <p:txBody>
+          <a:bodyPr wrap="square" rtlCol="0">
+            <a:spAutoFit/>
+          </a:bodyPr>
+          <a:lstStyle/>
+          <a:p>
+            <a:r>
+              <a:rPr lang="en-US" dirty="0" smtClean="0">
+                <a:solidFill>
+                  <a:srgbClr val="0070C0"/>
+                </a:solidFill>
+                <a:latin typeface="Lucida Console" pitchFamily="49" charset="0"/>
+              </a:rPr>
+              <a:t>Proposed team selection with emphasis on shooting and athleticism</a:t>
+            </a:r>
+            <a:r>
+              <a:rPr lang="en-US" dirty="0" smtClean="0">
+                <a:latin typeface="Lucida Console" pitchFamily="49" charset="0"/>
+              </a:rPr>
+              <a:t> </a:t>
+            </a:r>
+          </a:p>
+          <a:p>
+            <a:endParaRPr lang="en-US" dirty="0">
+              <a:latin typeface="Lucida Console" pitchFamily="49" charset="0"/>
+            </a:endParaRPr>
+          </a:p>
+        </p:txBody>
+      </p:sp>
+      <p:graphicFrame>
+        <p:nvGraphicFramePr>
+          <p:cNvPr id="13" name="Chart 12"/>
+          <p:cNvGraphicFramePr/>
+          <p:nvPr/>
+        </p:nvGraphicFramePr>
+        <p:xfrm>
+          <a:off x="1240972" y="3683727"/>
+          <a:ext cx="3135085" cy="2455817"/>
+        </p:xfrm>
+        <a:graphic>
+          <a:graphicData uri="http://schemas.openxmlformats.org/drawingml/2006/chart">
+            <c:chart xmlns:c="http://schemas.openxmlformats.org/drawingml/2006/chart" xmlns:r="http://schemas.openxmlformats.org/officeDocument/2006/relationships" r:id="rId4"/>
+          </a:graphicData>
+        </a:graphic>
+      </p:graphicFrame>
+      <p:sp>
+        <p:nvSpPr>
+          <p:cNvPr id="11" name="TextBox 10"/>
+          <p:cNvSpPr txBox="1"/>
+          <p:nvPr/>
+        </p:nvSpPr>
+        <p:spPr>
+          <a:xfrm>
+            <a:off x="4833257" y="4715691"/>
+            <a:ext cx="1567543" cy="369332"/>
+          </a:xfrm>
+          <a:prstGeom prst="rect">
+            <a:avLst/>
+          </a:prstGeom>
+          <a:noFill/>
+        </p:spPr>
+        <p:txBody>
+          <a:bodyPr wrap="square" rtlCol="0">
+            <a:spAutoFit/>
+          </a:bodyPr>
+          <a:lstStyle/>
+          <a:p>
+            <a:pPr algn="ctr"/>
+            <a:r>
+              <a:rPr lang="en-US" dirty="0" smtClean="0">
+                <a:solidFill>
+                  <a:srgbClr val="0070C0"/>
+                </a:solidFill>
+                <a:latin typeface="Lucida Console" pitchFamily="49" charset="0"/>
+              </a:rPr>
+              <a:t>OR</a:t>
+            </a:r>
+            <a:endParaRPr lang="en-US" dirty="0">
+              <a:solidFill>
+                <a:srgbClr val="0070C0"/>
+              </a:solidFill>
+              <a:latin typeface="Lucida Console" pitchFamily="49" charset="0"/>
+            </a:endParaRPr>
+          </a:p>
+        </p:txBody>
+      </p:sp>
+      <p:graphicFrame>
+        <p:nvGraphicFramePr>
+          <p:cNvPr id="14" name="Chart 13"/>
+          <p:cNvGraphicFramePr/>
+          <p:nvPr/>
+        </p:nvGraphicFramePr>
+        <p:xfrm>
+          <a:off x="6648994" y="3709851"/>
+          <a:ext cx="3331029" cy="2376231"/>
+        </p:xfrm>
+        <a:graphic>
+          <a:graphicData uri="http://schemas.openxmlformats.org/drawingml/2006/chart">
+            <c:chart xmlns:c="http://schemas.openxmlformats.org/drawingml/2006/chart" xmlns:r="http://schemas.openxmlformats.org/officeDocument/2006/relationships" r:id="rId5"/>
+          </a:graphicData>
+        </a:graphic>
+      </p:graphicFrame>
     </p:spTree>
   </p:cSld>
   <p:clrMapOvr>
@@ -6986,6 +8787,508 @@
 </p:sld>
 </file>
 
+<file path=ppt/slides/slide15.xml><?xml version="1.0" encoding="utf-8"?>
+<p:sld xmlns:a="http://schemas.openxmlformats.org/drawingml/2006/main" xmlns:r="http://schemas.openxmlformats.org/officeDocument/2006/relationships" xmlns:p="http://schemas.openxmlformats.org/presentationml/2006/main">
+  <p:cSld>
+    <p:spTree>
+      <p:nvGrpSpPr>
+        <p:cNvPr id="1" name=""/>
+        <p:cNvGrpSpPr/>
+        <p:nvPr/>
+      </p:nvGrpSpPr>
+      <p:grpSpPr>
+        <a:xfrm>
+          <a:off x="0" y="0"/>
+          <a:ext cx="0" cy="0"/>
+          <a:chOff x="0" y="0"/>
+          <a:chExt cx="0" cy="0"/>
+        </a:xfrm>
+      </p:grpSpPr>
+      <p:graphicFrame>
+        <p:nvGraphicFramePr>
+          <p:cNvPr id="4" name="Table 3"/>
+          <p:cNvGraphicFramePr>
+            <a:graphicFrameLocks noGrp="1"/>
+          </p:cNvGraphicFramePr>
+          <p:nvPr/>
+        </p:nvGraphicFramePr>
+        <p:xfrm>
+          <a:off x="1470297" y="966652"/>
+          <a:ext cx="7334070" cy="5318143"/>
+        </p:xfrm>
+        <a:graphic>
+          <a:graphicData uri="http://schemas.openxmlformats.org/drawingml/2006/table">
+            <a:tbl>
+              <a:tblPr firstRow="1" bandRow="1">
+                <a:tableStyleId>{5C22544A-7EE6-4342-B048-85BDC9FD1C3A}</a:tableStyleId>
+              </a:tblPr>
+              <a:tblGrid>
+                <a:gridCol w="3667035"/>
+                <a:gridCol w="3667035"/>
+              </a:tblGrid>
+              <a:tr h="480503">
+                <a:tc>
+                  <a:txBody>
+                    <a:bodyPr/>
+                    <a:lstStyle/>
+                    <a:p>
+                      <a:r>
+                        <a:rPr lang="en-US" sz="2800" dirty="0" smtClean="0">
+                          <a:solidFill>
+                            <a:schemeClr val="tx1"/>
+                          </a:solidFill>
+                          <a:latin typeface="Lucida Console" pitchFamily="49" charset="0"/>
+                        </a:rPr>
+                        <a:t>Position</a:t>
+                      </a:r>
+                      <a:endParaRPr lang="en-US" sz="2800" dirty="0">
+                        <a:solidFill>
+                          <a:schemeClr val="tx1"/>
+                        </a:solidFill>
+                        <a:latin typeface="Lucida Console" pitchFamily="49" charset="0"/>
+                      </a:endParaRPr>
+                    </a:p>
+                  </a:txBody>
+                  <a:tcPr/>
+                </a:tc>
+                <a:tc>
+                  <a:txBody>
+                    <a:bodyPr/>
+                    <a:lstStyle/>
+                    <a:p>
+                      <a:r>
+                        <a:rPr lang="en-US" sz="2800" dirty="0" smtClean="0">
+                          <a:solidFill>
+                            <a:schemeClr val="tx1"/>
+                          </a:solidFill>
+                          <a:latin typeface="Lucida Console" pitchFamily="49" charset="0"/>
+                        </a:rPr>
+                        <a:t>Description</a:t>
+                      </a:r>
+                      <a:endParaRPr lang="en-US" sz="2800" dirty="0">
+                        <a:solidFill>
+                          <a:schemeClr val="tx1"/>
+                        </a:solidFill>
+                        <a:latin typeface="Lucida Console" pitchFamily="49" charset="0"/>
+                      </a:endParaRPr>
+                    </a:p>
+                  </a:txBody>
+                  <a:tcPr/>
+                </a:tc>
+              </a:tr>
+              <a:tr h="658758">
+                <a:tc>
+                  <a:txBody>
+                    <a:bodyPr/>
+                    <a:lstStyle/>
+                    <a:p>
+                      <a:r>
+                        <a:rPr lang="en-US" sz="1000" dirty="0" smtClean="0">
+                          <a:latin typeface="Lucida Console" pitchFamily="49" charset="0"/>
+                        </a:rPr>
+                        <a:t>Power Forward (PF)</a:t>
+                      </a:r>
+                      <a:endParaRPr lang="en-US" sz="1000" dirty="0">
+                        <a:latin typeface="Lucida Console" pitchFamily="49" charset="0"/>
+                      </a:endParaRPr>
+                    </a:p>
+                  </a:txBody>
+                  <a:tcPr/>
+                </a:tc>
+                <a:tc>
+                  <a:txBody>
+                    <a:bodyPr/>
+                    <a:lstStyle/>
+                    <a:p>
+                      <a:r>
+                        <a:rPr lang="en-US" sz="1000" dirty="0" smtClean="0">
+                          <a:latin typeface="Lucida Console" pitchFamily="49" charset="0"/>
+                        </a:rPr>
+                        <a:t>The larger of the two forwards, the power forward specializes in the rebounds and defense.</a:t>
+                      </a:r>
+                    </a:p>
+                    <a:p>
+                      <a:endParaRPr lang="en-US" sz="1000" dirty="0">
+                        <a:latin typeface="Lucida Console" pitchFamily="49" charset="0"/>
+                      </a:endParaRPr>
+                    </a:p>
+                  </a:txBody>
+                  <a:tcPr/>
+                </a:tc>
+              </a:tr>
+              <a:tr h="1683495">
+                <a:tc>
+                  <a:txBody>
+                    <a:bodyPr/>
+                    <a:lstStyle/>
+                    <a:p>
+                      <a:r>
+                        <a:rPr lang="en-US" sz="1000" dirty="0" smtClean="0">
+                          <a:latin typeface="Lucida Console" pitchFamily="49" charset="0"/>
+                        </a:rPr>
+                        <a:t>Center (C)</a:t>
+                      </a:r>
+                      <a:endParaRPr lang="en-US" sz="1000" dirty="0">
+                        <a:latin typeface="Lucida Console" pitchFamily="49" charset="0"/>
+                      </a:endParaRPr>
+                    </a:p>
+                  </a:txBody>
+                  <a:tcPr/>
+                </a:tc>
+                <a:tc>
+                  <a:txBody>
+                    <a:bodyPr/>
+                    <a:lstStyle/>
+                    <a:p>
+                      <a:r>
+                        <a:rPr lang="en-US" sz="1000" dirty="0" smtClean="0">
+                          <a:latin typeface="Lucida Console" pitchFamily="49" charset="0"/>
+                        </a:rPr>
+                        <a:t>The center is likely to be the tallest player.  During an attack, the center will usually take a position under the hoop and with his back to it, in order to receive the pass or protect a team-mate in possession. The other players tend to revolve around the center in these situations. In defense, the center will take on shot blocking and rebound duties. They are often called the big man or post player.</a:t>
+                      </a:r>
+                      <a:endParaRPr lang="en-US" sz="1000" dirty="0">
+                        <a:latin typeface="Lucida Console" pitchFamily="49" charset="0"/>
+                      </a:endParaRPr>
+                    </a:p>
+                  </a:txBody>
+                  <a:tcPr/>
+                </a:tc>
+              </a:tr>
+              <a:tr h="658758">
+                <a:tc>
+                  <a:txBody>
+                    <a:bodyPr/>
+                    <a:lstStyle/>
+                    <a:p>
+                      <a:r>
+                        <a:rPr lang="en-US" sz="1000" dirty="0" smtClean="0">
+                          <a:latin typeface="Lucida Console" pitchFamily="49" charset="0"/>
+                        </a:rPr>
+                        <a:t>Point Guard (PG)</a:t>
+                      </a:r>
+                      <a:endParaRPr lang="en-US" sz="1000" dirty="0">
+                        <a:latin typeface="Lucida Console" pitchFamily="49" charset="0"/>
+                      </a:endParaRPr>
+                    </a:p>
+                  </a:txBody>
+                  <a:tcPr/>
+                </a:tc>
+                <a:tc>
+                  <a:txBody>
+                    <a:bodyPr/>
+                    <a:lstStyle/>
+                    <a:p>
+                      <a:r>
+                        <a:rPr lang="en-US" sz="1000" dirty="0" smtClean="0">
+                          <a:latin typeface="Lucida Console" pitchFamily="49" charset="0"/>
+                        </a:rPr>
+                        <a:t>The point guard will be an excellent ball-handler and essentially the ‘playmaker’ running most of the side’s attacking plays.</a:t>
+                      </a:r>
+                      <a:endParaRPr lang="en-US" sz="1000" dirty="0">
+                        <a:latin typeface="Lucida Console" pitchFamily="49" charset="0"/>
+                      </a:endParaRPr>
+                    </a:p>
+                  </a:txBody>
+                  <a:tcPr/>
+                </a:tc>
+              </a:tr>
+              <a:tr h="805150">
+                <a:tc>
+                  <a:txBody>
+                    <a:bodyPr/>
+                    <a:lstStyle/>
+                    <a:p>
+                      <a:r>
+                        <a:rPr lang="en-US" sz="1000" dirty="0" smtClean="0">
+                          <a:latin typeface="Lucida Console" pitchFamily="49" charset="0"/>
+                        </a:rPr>
+                        <a:t>Shooting Guard (SG)</a:t>
+                      </a:r>
+                      <a:endParaRPr lang="en-US" sz="1000" dirty="0">
+                        <a:latin typeface="Lucida Console" pitchFamily="49" charset="0"/>
+                      </a:endParaRPr>
+                    </a:p>
+                  </a:txBody>
+                  <a:tcPr/>
+                </a:tc>
+                <a:tc>
+                  <a:txBody>
+                    <a:bodyPr/>
+                    <a:lstStyle/>
+                    <a:p>
+                      <a:r>
+                        <a:rPr lang="en-US" sz="1000" dirty="0" smtClean="0">
+                          <a:latin typeface="Lucida Console" pitchFamily="49" charset="0"/>
+                        </a:rPr>
+                        <a:t>Skilled long-range shooter, and shares duties in attack and defense with the point guard, but can also play in tandem with the ‘small forward’ in a wide offensive role.</a:t>
+                      </a:r>
+                      <a:endParaRPr lang="en-US" sz="1000" dirty="0">
+                        <a:latin typeface="Lucida Console" pitchFamily="49" charset="0"/>
+                      </a:endParaRPr>
+                    </a:p>
+                  </a:txBody>
+                  <a:tcPr/>
+                </a:tc>
+              </a:tr>
+              <a:tr h="951540">
+                <a:tc>
+                  <a:txBody>
+                    <a:bodyPr/>
+                    <a:lstStyle/>
+                    <a:p>
+                      <a:r>
+                        <a:rPr lang="en-US" sz="1000" dirty="0" smtClean="0">
+                          <a:latin typeface="Lucida Console" pitchFamily="49" charset="0"/>
+                        </a:rPr>
+                        <a:t>Small Forward (SF)</a:t>
+                      </a:r>
+                      <a:endParaRPr lang="en-US" sz="1000" dirty="0">
+                        <a:latin typeface="Lucida Console" pitchFamily="49" charset="0"/>
+                      </a:endParaRPr>
+                    </a:p>
+                  </a:txBody>
+                  <a:tcPr/>
+                </a:tc>
+                <a:tc>
+                  <a:txBody>
+                    <a:bodyPr/>
+                    <a:lstStyle/>
+                    <a:p>
+                      <a:r>
+                        <a:rPr lang="en-US" sz="1000" dirty="0" smtClean="0">
+                          <a:latin typeface="Lucida Console" pitchFamily="49" charset="0"/>
+                        </a:rPr>
+                        <a:t>A vital skill in the locker should be the ability to score with medium-range shot, but the small forward will also be expected to get his fair share of rebounds as well as covering defensive duties.</a:t>
+                      </a:r>
+                      <a:endParaRPr lang="en-US" sz="1000" dirty="0">
+                        <a:latin typeface="Lucida Console" pitchFamily="49" charset="0"/>
+                      </a:endParaRPr>
+                    </a:p>
+                  </a:txBody>
+                  <a:tcPr/>
+                </a:tc>
+              </a:tr>
+            </a:tbl>
+          </a:graphicData>
+        </a:graphic>
+      </p:graphicFrame>
+      <p:sp>
+        <p:nvSpPr>
+          <p:cNvPr id="5" name="Title 1"/>
+          <p:cNvSpPr txBox="1">
+            <a:spLocks/>
+          </p:cNvSpPr>
+          <p:nvPr/>
+        </p:nvSpPr>
+        <p:spPr>
+          <a:xfrm>
+            <a:off x="527231" y="195898"/>
+            <a:ext cx="10071100" cy="692150"/>
+          </a:xfrm>
+          <a:prstGeom prst="rect">
+            <a:avLst/>
+          </a:prstGeom>
+        </p:spPr>
+        <p:txBody>
+          <a:bodyPr vert="horz" lIns="91440" tIns="45720" rIns="91440" bIns="45720" rtlCol="0" anchor="b">
+            <a:normAutofit fontScale="77500" lnSpcReduction="20000"/>
+          </a:bodyPr>
+          <a:lstStyle/>
+          <a:p>
+            <a:pPr marL="0" marR="0" lvl="0" indent="0" algn="ctr" defTabSz="914400" rtl="0" eaLnBrk="1" fontAlgn="auto" latinLnBrk="0" hangingPunct="1">
+              <a:lnSpc>
+                <a:spcPct val="85000"/>
+              </a:lnSpc>
+              <a:spcBef>
+                <a:spcPct val="0"/>
+              </a:spcBef>
+              <a:spcAft>
+                <a:spcPts val="0"/>
+              </a:spcAft>
+              <a:buClrTx/>
+              <a:buSzTx/>
+              <a:buFontTx/>
+              <a:buNone/>
+              <a:tabLst/>
+              <a:defRPr/>
+            </a:pPr>
+            <a:r>
+              <a:rPr kumimoji="0" lang="en-US" sz="3600" b="0" i="0" u="none" strike="noStrike" kern="1200" cap="none" spc="-50" normalizeH="0" baseline="0" noProof="0" dirty="0" smtClean="0">
+                <a:ln>
+                  <a:noFill/>
+                </a:ln>
+                <a:solidFill>
+                  <a:schemeClr val="tx1"/>
+                </a:solidFill>
+                <a:effectLst/>
+                <a:uLnTx/>
+                <a:uFillTx/>
+                <a:latin typeface="Lucida Console" pitchFamily="49" charset="0"/>
+                <a:ea typeface="+mj-ea"/>
+                <a:cs typeface="+mj-cs"/>
+              </a:rPr>
+              <a:t>Appendix A – Basketball</a:t>
+            </a:r>
+            <a:r>
+              <a:rPr kumimoji="0" lang="en-US" sz="3600" b="0" i="0" u="none" strike="noStrike" kern="1200" cap="none" spc="-50" normalizeH="0" noProof="0" dirty="0" smtClean="0">
+                <a:ln>
+                  <a:noFill/>
+                </a:ln>
+                <a:solidFill>
+                  <a:schemeClr val="tx1"/>
+                </a:solidFill>
+                <a:effectLst/>
+                <a:uLnTx/>
+                <a:uFillTx/>
+                <a:latin typeface="Lucida Console" pitchFamily="49" charset="0"/>
+                <a:ea typeface="+mj-ea"/>
+                <a:cs typeface="+mj-cs"/>
+              </a:rPr>
+              <a:t> Position Description</a:t>
+            </a:r>
+            <a:endParaRPr kumimoji="0" lang="en-US" sz="3600" b="0" i="0" u="none" strike="noStrike" kern="1200" cap="none" spc="-50" normalizeH="0" baseline="0" noProof="0" dirty="0">
+              <a:ln>
+                <a:noFill/>
+              </a:ln>
+              <a:solidFill>
+                <a:schemeClr val="tx1"/>
+              </a:solidFill>
+              <a:effectLst/>
+              <a:uLnTx/>
+              <a:uFillTx/>
+              <a:latin typeface="Lucida Console" pitchFamily="49" charset="0"/>
+              <a:ea typeface="+mj-ea"/>
+              <a:cs typeface="+mj-cs"/>
+            </a:endParaRPr>
+          </a:p>
+        </p:txBody>
+      </p:sp>
+      <p:sp>
+        <p:nvSpPr>
+          <p:cNvPr id="8" name="Footer Placeholder 3"/>
+          <p:cNvSpPr>
+            <a:spLocks noGrp="1"/>
+          </p:cNvSpPr>
+          <p:nvPr>
+            <p:ph type="ftr" sz="quarter" idx="11"/>
+          </p:nvPr>
+        </p:nvSpPr>
+        <p:spPr>
+          <a:xfrm>
+            <a:off x="156754" y="6492875"/>
+            <a:ext cx="4822804" cy="365125"/>
+          </a:xfrm>
+        </p:spPr>
+        <p:txBody>
+          <a:bodyPr/>
+          <a:lstStyle/>
+          <a:p>
+            <a:pPr algn="l"/>
+            <a:r>
+              <a:rPr lang="en-US" sz="1100" dirty="0" smtClean="0">
+                <a:solidFill>
+                  <a:schemeClr val="tx1"/>
+                </a:solidFill>
+                <a:latin typeface="Lucida Console" pitchFamily="49" charset="0"/>
+              </a:rPr>
+              <a:t>NBA Draft Strategy 2016-17  -- Vijay Raghunath</a:t>
+            </a:r>
+            <a:endParaRPr lang="en-US" sz="1100" dirty="0">
+              <a:solidFill>
+                <a:schemeClr val="tx1"/>
+              </a:solidFill>
+              <a:latin typeface="Lucida Console" pitchFamily="49" charset="0"/>
+            </a:endParaRPr>
+          </a:p>
+        </p:txBody>
+      </p:sp>
+      <p:sp>
+        <p:nvSpPr>
+          <p:cNvPr id="10" name="Footer Placeholder 3"/>
+          <p:cNvSpPr txBox="1">
+            <a:spLocks/>
+          </p:cNvSpPr>
+          <p:nvPr/>
+        </p:nvSpPr>
+        <p:spPr>
+          <a:xfrm>
+            <a:off x="5973439" y="6492875"/>
+            <a:ext cx="4127863" cy="365125"/>
+          </a:xfrm>
+          <a:prstGeom prst="rect">
+            <a:avLst/>
+          </a:prstGeom>
+        </p:spPr>
+        <p:txBody>
+          <a:bodyPr vert="horz" lIns="91440" tIns="45720" rIns="91440" bIns="45720" rtlCol="0" anchor="ctr"/>
+          <a:lstStyle/>
+          <a:p>
+            <a:pPr marL="0" marR="0" lvl="0" indent="0" algn="ctr" defTabSz="457200" rtl="0" eaLnBrk="1" fontAlgn="auto" latinLnBrk="0" hangingPunct="1">
+              <a:lnSpc>
+                <a:spcPct val="100000"/>
+              </a:lnSpc>
+              <a:spcBef>
+                <a:spcPts val="0"/>
+              </a:spcBef>
+              <a:spcAft>
+                <a:spcPts val="0"/>
+              </a:spcAft>
+              <a:buClrTx/>
+              <a:buSzTx/>
+              <a:buFontTx/>
+              <a:buNone/>
+              <a:tabLst/>
+              <a:defRPr/>
+            </a:pPr>
+            <a:r>
+              <a:rPr kumimoji="0" lang="en-US" sz="1100" b="0" i="0" u="none" strike="noStrike" kern="1200" cap="all" spc="0" normalizeH="0" baseline="0" noProof="0" dirty="0" smtClean="0">
+                <a:ln>
+                  <a:noFill/>
+                </a:ln>
+                <a:solidFill>
+                  <a:schemeClr val="tx1"/>
+                </a:solidFill>
+                <a:effectLst/>
+                <a:uLnTx/>
+                <a:uFillTx/>
+                <a:latin typeface="Lucida Console" pitchFamily="49" charset="0"/>
+                <a:ea typeface="+mn-ea"/>
+                <a:cs typeface="+mn-cs"/>
+              </a:rPr>
+              <a:t>15/09/2016</a:t>
+            </a:r>
+            <a:endParaRPr kumimoji="0" lang="en-US" sz="1100" b="0" i="0" u="none" strike="noStrike" kern="1200" cap="all" spc="0" normalizeH="0" baseline="0" noProof="0" dirty="0">
+              <a:ln>
+                <a:noFill/>
+              </a:ln>
+              <a:solidFill>
+                <a:schemeClr val="tx1"/>
+              </a:solidFill>
+              <a:effectLst/>
+              <a:uLnTx/>
+              <a:uFillTx/>
+              <a:latin typeface="Lucida Console" pitchFamily="49" charset="0"/>
+              <a:ea typeface="+mn-ea"/>
+              <a:cs typeface="+mn-cs"/>
+            </a:endParaRPr>
+          </a:p>
+        </p:txBody>
+      </p:sp>
+    </p:spTree>
+  </p:cSld>
+  <p:clrMapOvr>
+    <a:masterClrMapping/>
+  </p:clrMapOvr>
+  <p:timing>
+    <p:tnLst>
+      <p:par>
+        <p:cTn id="1" dur="indefinite" restart="never" nodeType="tmRoot"/>
+      </p:par>
+    </p:tnLst>
+  </p:timing>
+</p:sld>
+</file>
+
 <file path=ppt/slides/slide2.xml><?xml version="1.0" encoding="utf-8"?>
 <p:sld xmlns:a="http://schemas.openxmlformats.org/drawingml/2006/main" xmlns:r="http://schemas.openxmlformats.org/officeDocument/2006/relationships" xmlns:p="http://schemas.openxmlformats.org/presentationml/2006/main">
   <p:cSld>
@@ -7497,7 +9800,7 @@
         </p:nvSpPr>
         <p:spPr>
           <a:xfrm>
-            <a:off x="566420" y="287338"/>
+            <a:off x="566420" y="169772"/>
             <a:ext cx="10071100" cy="692150"/>
           </a:xfrm>
         </p:spPr>
@@ -7606,8 +9909,8 @@
         </p:nvSpPr>
         <p:spPr>
           <a:xfrm>
-            <a:off x="299293" y="1108806"/>
-            <a:ext cx="11470341" cy="6555641"/>
+            <a:off x="287383" y="483325"/>
+            <a:ext cx="11560628" cy="7417415"/>
           </a:xfrm>
           <a:prstGeom prst="rect">
             <a:avLst/>
@@ -7649,7 +9952,85 @@
               <a:rPr lang="en-US" sz="2800" dirty="0" smtClean="0">
                 <a:latin typeface="Lucida Console" pitchFamily="49" charset="0"/>
               </a:rPr>
-              <a:t>There are 5 playing positions point guard (PG), shooting guard (SG), small forward (SF), power forward (PF), and center (C) in a NBA basket ball team. </a:t>
+              <a:t>There are 5 </a:t>
+            </a:r>
+            <a:r>
+              <a:rPr lang="en-US" sz="2800" dirty="0" smtClean="0">
+                <a:latin typeface="Lucida Console" pitchFamily="49" charset="0"/>
+              </a:rPr>
+              <a:t>in </a:t>
+            </a:r>
+            <a:r>
+              <a:rPr lang="en-US" sz="2800" dirty="0" smtClean="0">
+                <a:latin typeface="Lucida Console" pitchFamily="49" charset="0"/>
+              </a:rPr>
+              <a:t>a NBA basket ball </a:t>
+            </a:r>
+            <a:r>
+              <a:rPr lang="en-US" sz="2800" dirty="0" smtClean="0">
+                <a:latin typeface="Lucida Console" pitchFamily="49" charset="0"/>
+              </a:rPr>
+              <a:t>team.</a:t>
+            </a:r>
+          </a:p>
+          <a:p>
+            <a:pPr lvl="2">
+              <a:buFont typeface="Wingdings" pitchFamily="2" charset="2"/>
+              <a:buChar char="Ø"/>
+            </a:pPr>
+            <a:r>
+              <a:rPr lang="en-US" sz="2800" dirty="0" smtClean="0">
+                <a:latin typeface="Lucida Console" pitchFamily="49" charset="0"/>
+              </a:rPr>
+              <a:t>Power Forward (PF)</a:t>
+            </a:r>
+          </a:p>
+          <a:p>
+            <a:pPr lvl="2">
+              <a:buFont typeface="Wingdings" pitchFamily="2" charset="2"/>
+              <a:buChar char="Ø"/>
+            </a:pPr>
+            <a:r>
+              <a:rPr lang="en-US" sz="2800" dirty="0" smtClean="0">
+                <a:latin typeface="Lucida Console" pitchFamily="49" charset="0"/>
+              </a:rPr>
+              <a:t>Center (C)</a:t>
+            </a:r>
+          </a:p>
+          <a:p>
+            <a:pPr lvl="2">
+              <a:buFont typeface="Wingdings" pitchFamily="2" charset="2"/>
+              <a:buChar char="Ø"/>
+            </a:pPr>
+            <a:r>
+              <a:rPr lang="en-US" sz="2800" dirty="0" smtClean="0">
+                <a:latin typeface="Lucida Console" pitchFamily="49" charset="0"/>
+              </a:rPr>
+              <a:t>Shooting Guard (SG)</a:t>
+            </a:r>
+          </a:p>
+          <a:p>
+            <a:pPr lvl="2">
+              <a:buFont typeface="Wingdings" pitchFamily="2" charset="2"/>
+              <a:buChar char="Ø"/>
+            </a:pPr>
+            <a:r>
+              <a:rPr lang="en-US" sz="2800" dirty="0" smtClean="0">
+                <a:latin typeface="Lucida Console" pitchFamily="49" charset="0"/>
+              </a:rPr>
+              <a:t>Small Forward (SF)</a:t>
+            </a:r>
+          </a:p>
+          <a:p>
+            <a:pPr lvl="2">
+              <a:buFont typeface="Wingdings" pitchFamily="2" charset="2"/>
+              <a:buChar char="Ø"/>
+            </a:pPr>
+            <a:r>
+              <a:rPr lang="en-US" sz="2800" dirty="0" smtClean="0">
+                <a:latin typeface="Lucida Console" pitchFamily="49" charset="0"/>
+              </a:rPr>
+              <a:t>Point Guard (PG)</a:t>
             </a:r>
           </a:p>
           <a:p>
@@ -7682,14 +10063,40 @@
               <a:rPr lang="en-US" sz="2800" dirty="0" smtClean="0">
                 <a:latin typeface="Lucida Console" pitchFamily="49" charset="0"/>
               </a:rPr>
-              <a:t>Based on key historical data create a player performance index (PPI) for each player.</a:t>
-            </a:r>
-          </a:p>
-          <a:p>
-            <a:pPr>
-              <a:buFont typeface="Arial" pitchFamily="34" charset="0"/>
-              <a:buChar char="•"/>
-            </a:pPr>
+              <a:t>Based on key historical data create a </a:t>
+            </a:r>
+            <a:r>
+              <a:rPr lang="en-US" sz="2800" dirty="0" smtClean="0">
+                <a:latin typeface="Lucida Console" pitchFamily="49" charset="0"/>
+              </a:rPr>
+              <a:t>Player Performance </a:t>
+            </a:r>
+            <a:r>
+              <a:rPr lang="en-US" sz="2800" dirty="0" smtClean="0">
+                <a:latin typeface="Lucida Console" pitchFamily="49" charset="0"/>
+              </a:rPr>
+              <a:t>I</a:t>
+            </a:r>
+            <a:r>
+              <a:rPr lang="en-US" sz="2800" dirty="0" smtClean="0">
+                <a:latin typeface="Lucida Console" pitchFamily="49" charset="0"/>
+              </a:rPr>
+              <a:t>ndex </a:t>
+            </a:r>
+            <a:r>
+              <a:rPr lang="en-US" sz="2800" dirty="0" smtClean="0">
+                <a:latin typeface="Lucida Console" pitchFamily="49" charset="0"/>
+              </a:rPr>
+              <a:t>(PPI) for each player</a:t>
+            </a:r>
+            <a:r>
+              <a:rPr lang="en-US" sz="2800" dirty="0" smtClean="0">
+                <a:latin typeface="Lucida Console" pitchFamily="49" charset="0"/>
+              </a:rPr>
+              <a:t>.</a:t>
+            </a:r>
+          </a:p>
+          <a:p>
             <a:endParaRPr lang="en-US" sz="2800" dirty="0" smtClean="0">
               <a:latin typeface="Lucida Console" pitchFamily="49" charset="0"/>
             </a:endParaRPr>
@@ -8003,7 +10410,7 @@
         <p:spPr>
           <a:xfrm>
             <a:off x="299293" y="1108806"/>
-            <a:ext cx="11470341" cy="5693866"/>
+            <a:ext cx="11470341" cy="6124754"/>
           </a:xfrm>
           <a:prstGeom prst="rect">
             <a:avLst/>
@@ -8045,7 +10452,31 @@
               <a:rPr lang="en-US" sz="2800" dirty="0" smtClean="0">
                 <a:latin typeface="Lucida Console" pitchFamily="49" charset="0"/>
               </a:rPr>
-              <a:t>Create a pool of top 15 players within each playing positions, in a manner that selection within the group will produce a performance swing of +-2%. </a:t>
+              <a:t>Create a pool of top </a:t>
+            </a:r>
+            <a:r>
+              <a:rPr lang="en-US" sz="2800" dirty="0" smtClean="0">
+                <a:latin typeface="Lucida Console" pitchFamily="49" charset="0"/>
+              </a:rPr>
+              <a:t>ranking players, based on </a:t>
+            </a:r>
+            <a:r>
+              <a:rPr lang="en-US" sz="2800" smtClean="0">
+                <a:latin typeface="Lucida Console" pitchFamily="49" charset="0"/>
+              </a:rPr>
+              <a:t>a quantifiable </a:t>
+            </a:r>
+            <a:r>
+              <a:rPr lang="en-US" sz="2800" dirty="0" smtClean="0">
+                <a:latin typeface="Lucida Console" pitchFamily="49" charset="0"/>
+              </a:rPr>
+              <a:t>factor, </a:t>
+            </a:r>
+            <a:r>
+              <a:rPr lang="en-US" sz="2800" dirty="0" smtClean="0">
+                <a:latin typeface="Lucida Console" pitchFamily="49" charset="0"/>
+              </a:rPr>
+              <a:t>within each playing positions, in a manner that selection within the group will produce a performance swing of +-2%. </a:t>
             </a:r>
           </a:p>
           <a:p>
@@ -8357,7 +10788,7 @@
         <p:spPr>
           <a:xfrm>
             <a:off x="403796" y="1017368"/>
-            <a:ext cx="11470341" cy="1631216"/>
+            <a:ext cx="11470341" cy="2062103"/>
           </a:xfrm>
           <a:prstGeom prst="rect">
             <a:avLst/>
@@ -8374,7 +10805,19 @@
               <a:rPr lang="en-US" sz="2800" dirty="0" smtClean="0">
                 <a:latin typeface="Lucida Console" pitchFamily="49" charset="0"/>
               </a:rPr>
-              <a:t>Glimpse of the data sets used to build the model</a:t>
+              <a:t>Glimpse of the </a:t>
+            </a:r>
+            <a:r>
+              <a:rPr lang="en-US" sz="2800" dirty="0" smtClean="0">
+                <a:latin typeface="Lucida Console" pitchFamily="49" charset="0"/>
+              </a:rPr>
+              <a:t>sample data </a:t>
+            </a:r>
+            <a:r>
+              <a:rPr lang="en-US" sz="2800" dirty="0" smtClean="0">
+                <a:latin typeface="Lucida Console" pitchFamily="49" charset="0"/>
+              </a:rPr>
+              <a:t>sets used to build the model</a:t>
             </a:r>
           </a:p>
           <a:p>
@@ -9386,7 +11829,7 @@
         <p:spPr>
           <a:xfrm>
             <a:off x="286229" y="808360"/>
-            <a:ext cx="11470341" cy="6124754"/>
+            <a:ext cx="11470341" cy="6555641"/>
           </a:xfrm>
           <a:prstGeom prst="rect">
             <a:avLst/>
@@ -9498,12 +11941,23 @@
               <a:rPr lang="en-US" sz="2800" dirty="0" smtClean="0">
                 <a:latin typeface="Lucida Console" pitchFamily="49" charset="0"/>
               </a:rPr>
-              <a:t>Based on PPI ratings a cluster of similar ranking players is created for each player position.</a:t>
-            </a:r>
-            <a:endParaRPr lang="en-US" sz="2800" dirty="0" smtClean="0">
-              <a:solidFill>
-                <a:srgbClr val="FF3300"/>
-              </a:solidFill>
+              <a:t>Based on PPI ratings a cluster of similar ranking players is created for each player position</a:t>
+            </a:r>
+            <a:r>
+              <a:rPr lang="en-US" sz="2800" dirty="0" smtClean="0">
+                <a:latin typeface="Lucida Console" pitchFamily="49" charset="0"/>
+              </a:rPr>
+              <a:t>.</a:t>
+            </a:r>
+          </a:p>
+          <a:p>
+            <a:r>
+              <a:rPr lang="en-US" sz="1600" dirty="0" smtClean="0">
+                <a:latin typeface="Lucida Console" pitchFamily="49" charset="0"/>
+              </a:rPr>
+              <a:t>(Clustering is done after filtering out the  draft selections from the previous seasons)</a:t>
+            </a:r>
+            <a:endParaRPr lang="en-US" sz="1600" dirty="0" smtClean="0">
               <a:latin typeface="Lucida Console" pitchFamily="49" charset="0"/>
             </a:endParaRPr>
           </a:p>
@@ -9787,15 +12241,51 @@
             <a:r>
               <a:rPr lang="en-US" sz="2400" dirty="0" smtClean="0">
                 <a:solidFill>
+                  <a:srgbClr val="0070C0"/>
+                </a:solidFill>
+                <a:latin typeface="Lucida Console" pitchFamily="49" charset="0"/>
+              </a:rPr>
+              <a:t>For PG</a:t>
+            </a:r>
+            <a:r>
+              <a:rPr lang="en-US" sz="2400" dirty="0" smtClean="0">
+                <a:solidFill>
                   <a:srgbClr val="FF0000"/>
                 </a:solidFill>
                 <a:latin typeface="Lucida Console" pitchFamily="49" charset="0"/>
               </a:rPr>
-              <a:t>For PG							For SG							For SF</a:t>
+              <a:t>							</a:t>
+            </a:r>
+            <a:r>
+              <a:rPr lang="en-US" sz="2400" dirty="0" smtClean="0">
+                <a:solidFill>
+                  <a:srgbClr val="0070C0"/>
+                </a:solidFill>
+                <a:latin typeface="Lucida Console" pitchFamily="49" charset="0"/>
+              </a:rPr>
+              <a:t>For SG</a:t>
+            </a:r>
+            <a:r>
+              <a:rPr lang="en-US" sz="2400" dirty="0" smtClean="0">
+                <a:solidFill>
+                  <a:srgbClr val="FF0000"/>
+                </a:solidFill>
+                <a:latin typeface="Lucida Console" pitchFamily="49" charset="0"/>
+              </a:rPr>
+              <a:t>							</a:t>
+            </a:r>
+            <a:r>
+              <a:rPr lang="en-US" sz="2400" dirty="0" smtClean="0">
+                <a:solidFill>
+                  <a:srgbClr val="0070C0"/>
+                </a:solidFill>
+                <a:latin typeface="Lucida Console" pitchFamily="49" charset="0"/>
+              </a:rPr>
+              <a:t>For SF</a:t>
             </a:r>
             <a:endParaRPr lang="en-US" sz="2400" dirty="0">
               <a:solidFill>
-                <a:srgbClr val="FF0000"/>
+                <a:srgbClr val="0070C0"/>
               </a:solidFill>
               <a:latin typeface="Lucida Console" pitchFamily="49" charset="0"/>
             </a:endParaRPr>
@@ -10856,16 +13346,7 @@
                 </a:solidFill>
                 <a:latin typeface="Lucida Console" pitchFamily="49" charset="0"/>
               </a:rPr>
-              <a:t>Multiple Regression Analysis </a:t>
-            </a:r>
-            <a:r>
-              <a:rPr lang="en-US" sz="3600" dirty="0" smtClean="0">
-                <a:solidFill>
-                  <a:schemeClr val="tx1"/>
-                </a:solidFill>
-                <a:latin typeface="Lucida Console" pitchFamily="49" charset="0"/>
-              </a:rPr>
-              <a:t>Results (2)</a:t>
+              <a:t>Multiple Regression Analysis Results (2)</a:t>
             </a:r>
             <a:endParaRPr lang="en-US" sz="3600" dirty="0">
               <a:solidFill>
@@ -10979,7 +13460,7 @@
             <a:r>
               <a:rPr lang="en-US" sz="2400" dirty="0" smtClean="0">
                 <a:solidFill>
-                  <a:srgbClr val="FF0000"/>
+                  <a:srgbClr val="0070C0"/>
                 </a:solidFill>
                 <a:latin typeface="Lucida Console" pitchFamily="49" charset="0"/>
               </a:rPr>
@@ -10992,11 +13473,20 @@
                 </a:solidFill>
                 <a:latin typeface="Lucida Console" pitchFamily="49" charset="0"/>
               </a:rPr>
-              <a:t>						For C</a:t>
+              <a:t>						</a:t>
+            </a:r>
+            <a:r>
+              <a:rPr lang="en-US" sz="2400" dirty="0" smtClean="0">
+                <a:solidFill>
+                  <a:srgbClr val="0070C0"/>
+                </a:solidFill>
+                <a:latin typeface="Lucida Console" pitchFamily="49" charset="0"/>
+              </a:rPr>
+              <a:t>For C</a:t>
             </a:r>
             <a:endParaRPr lang="en-US" sz="2400" dirty="0">
               <a:solidFill>
-                <a:srgbClr val="FF0000"/>
+                <a:srgbClr val="0070C0"/>
               </a:solidFill>
               <a:latin typeface="Lucida Console" pitchFamily="49" charset="0"/>
             </a:endParaRPr>

</xml_diff>